<commit_message>
end of day dump
</commit_message>
<xml_diff>
--- a/Cataract.pptx
+++ b/Cataract.pptx
@@ -5,15 +5,17 @@
     <p:sldMasterId id="2147483660" r:id="rId1"/>
   </p:sldMasterIdLst>
   <p:notesMasterIdLst>
-    <p:notesMasterId r:id="rId8"/>
+    <p:notesMasterId r:id="rId10"/>
   </p:notesMasterIdLst>
   <p:sldIdLst>
     <p:sldId id="256" r:id="rId2"/>
     <p:sldId id="257" r:id="rId3"/>
     <p:sldId id="258" r:id="rId4"/>
     <p:sldId id="259" r:id="rId5"/>
-    <p:sldId id="260" r:id="rId6"/>
-    <p:sldId id="261" r:id="rId7"/>
+    <p:sldId id="265" r:id="rId6"/>
+    <p:sldId id="266" r:id="rId7"/>
+    <p:sldId id="260" r:id="rId8"/>
+    <p:sldId id="261" r:id="rId9"/>
   </p:sldIdLst>
   <p:sldSz cx="9144000" cy="5143500" type="screen16x9"/>
   <p:notesSz cx="6858000" cy="9144000"/>
@@ -993,7 +995,7 @@
   <p:cSld>
     <p:spTree>
       <p:nvGrpSpPr>
-        <p:cNvPr id="1" name="Shape 81"/>
+        <p:cNvPr id="1" name="Shape 75"/>
         <p:cNvGrpSpPr/>
         <p:nvPr/>
       </p:nvGrpSpPr>
@@ -1007,7 +1009,7 @@
       </p:grpSpPr>
       <p:sp>
         <p:nvSpPr>
-          <p:cNvPr id="82" name="Google Shape;82;g5ccef844c9_0_5:notes"/>
+          <p:cNvPr id="76" name="Google Shape;76;g5c1d9bc1b2_0_18:notes"/>
           <p:cNvSpPr>
             <a:spLocks noGrp="1" noRot="1" noChangeAspect="1"/>
           </p:cNvSpPr>
@@ -1048,7 +1050,7 @@
       </p:sp>
       <p:sp>
         <p:nvSpPr>
-          <p:cNvPr id="83" name="Google Shape;83;g5ccef844c9_0_5:notes"/>
+          <p:cNvPr id="77" name="Google Shape;77;g5c1d9bc1b2_0_18:notes"/>
           <p:cNvSpPr txBox="1">
             <a:spLocks noGrp="1"/>
           </p:cNvSpPr>
@@ -1085,6 +1087,11 @@
         </p:txBody>
       </p:sp>
     </p:spTree>
+    <p:extLst>
+      <p:ext uri="{BB962C8B-B14F-4D97-AF65-F5344CB8AC3E}">
+        <p14:creationId xmlns:p14="http://schemas.microsoft.com/office/powerpoint/2010/main" val="2503784434"/>
+      </p:ext>
+    </p:extLst>
   </p:cSld>
   <p:clrMapOvr>
     <a:masterClrMapping/>
@@ -1097,7 +1104,7 @@
   <p:cSld>
     <p:spTree>
       <p:nvGrpSpPr>
-        <p:cNvPr id="1" name="Shape 87"/>
+        <p:cNvPr id="1" name="Shape 75"/>
         <p:cNvGrpSpPr/>
         <p:nvPr/>
       </p:nvGrpSpPr>
@@ -1111,7 +1118,7 @@
       </p:grpSpPr>
       <p:sp>
         <p:nvSpPr>
-          <p:cNvPr id="88" name="Google Shape;88;g5c84791939_0_0:notes"/>
+          <p:cNvPr id="76" name="Google Shape;76;g5c1d9bc1b2_0_18:notes"/>
           <p:cNvSpPr>
             <a:spLocks noGrp="1" noRot="1" noChangeAspect="1"/>
           </p:cNvSpPr>
@@ -1152,6 +1159,219 @@
       </p:sp>
       <p:sp>
         <p:nvSpPr>
+          <p:cNvPr id="77" name="Google Shape;77;g5c1d9bc1b2_0_18:notes"/>
+          <p:cNvSpPr txBox="1">
+            <a:spLocks noGrp="1"/>
+          </p:cNvSpPr>
+          <p:nvPr>
+            <p:ph type="body" idx="1"/>
+          </p:nvPr>
+        </p:nvSpPr>
+        <p:spPr>
+          <a:xfrm>
+            <a:off x="685800" y="4343400"/>
+            <a:ext cx="5486400" cy="4114800"/>
+          </a:xfrm>
+          <a:prstGeom prst="rect">
+            <a:avLst/>
+          </a:prstGeom>
+        </p:spPr>
+        <p:txBody>
+          <a:bodyPr spcFirstLastPara="1" wrap="square" lIns="91425" tIns="91425" rIns="91425" bIns="91425" anchor="t" anchorCtr="0">
+            <a:noAutofit/>
+          </a:bodyPr>
+          <a:lstStyle/>
+          <a:p>
+            <a:pPr marL="0" lvl="0" indent="0" algn="l" rtl="0">
+              <a:spcBef>
+                <a:spcPts val="0"/>
+              </a:spcBef>
+              <a:spcAft>
+                <a:spcPts val="0"/>
+              </a:spcAft>
+              <a:buNone/>
+            </a:pPr>
+            <a:endParaRPr/>
+          </a:p>
+        </p:txBody>
+      </p:sp>
+    </p:spTree>
+    <p:extLst>
+      <p:ext uri="{BB962C8B-B14F-4D97-AF65-F5344CB8AC3E}">
+        <p14:creationId xmlns:p14="http://schemas.microsoft.com/office/powerpoint/2010/main" val="2041249652"/>
+      </p:ext>
+    </p:extLst>
+  </p:cSld>
+  <p:clrMapOvr>
+    <a:masterClrMapping/>
+  </p:clrMapOvr>
+</p:notes>
+</file>
+
+<file path=ppt/notesSlides/notesSlide7.xml><?xml version="1.0" encoding="utf-8"?>
+<p:notes xmlns:a="http://schemas.openxmlformats.org/drawingml/2006/main" xmlns:r="http://schemas.openxmlformats.org/officeDocument/2006/relationships" xmlns:p="http://schemas.openxmlformats.org/presentationml/2006/main" showMasterSp="0" showMasterPhAnim="0">
+  <p:cSld>
+    <p:spTree>
+      <p:nvGrpSpPr>
+        <p:cNvPr id="1" name="Shape 81"/>
+        <p:cNvGrpSpPr/>
+        <p:nvPr/>
+      </p:nvGrpSpPr>
+      <p:grpSpPr>
+        <a:xfrm>
+          <a:off x="0" y="0"/>
+          <a:ext cx="0" cy="0"/>
+          <a:chOff x="0" y="0"/>
+          <a:chExt cx="0" cy="0"/>
+        </a:xfrm>
+      </p:grpSpPr>
+      <p:sp>
+        <p:nvSpPr>
+          <p:cNvPr id="82" name="Google Shape;82;g5ccef844c9_0_5:notes"/>
+          <p:cNvSpPr>
+            <a:spLocks noGrp="1" noRot="1" noChangeAspect="1"/>
+          </p:cNvSpPr>
+          <p:nvPr>
+            <p:ph type="sldImg" idx="2"/>
+          </p:nvPr>
+        </p:nvSpPr>
+        <p:spPr>
+          <a:xfrm>
+            <a:off x="381000" y="685800"/>
+            <a:ext cx="6096000" cy="3429000"/>
+          </a:xfrm>
+          <a:custGeom>
+            <a:avLst/>
+            <a:gdLst/>
+            <a:ahLst/>
+            <a:cxnLst/>
+            <a:rect l="l" t="t" r="r" b="b"/>
+            <a:pathLst>
+              <a:path w="120000" h="120000" extrusionOk="0">
+                <a:moveTo>
+                  <a:pt x="0" y="0"/>
+                </a:moveTo>
+                <a:lnTo>
+                  <a:pt x="120000" y="0"/>
+                </a:lnTo>
+                <a:lnTo>
+                  <a:pt x="120000" y="120000"/>
+                </a:lnTo>
+                <a:lnTo>
+                  <a:pt x="0" y="120000"/>
+                </a:lnTo>
+                <a:close/>
+              </a:path>
+            </a:pathLst>
+          </a:custGeom>
+        </p:spPr>
+      </p:sp>
+      <p:sp>
+        <p:nvSpPr>
+          <p:cNvPr id="83" name="Google Shape;83;g5ccef844c9_0_5:notes"/>
+          <p:cNvSpPr txBox="1">
+            <a:spLocks noGrp="1"/>
+          </p:cNvSpPr>
+          <p:nvPr>
+            <p:ph type="body" idx="1"/>
+          </p:nvPr>
+        </p:nvSpPr>
+        <p:spPr>
+          <a:xfrm>
+            <a:off x="685800" y="4343400"/>
+            <a:ext cx="5486400" cy="4114800"/>
+          </a:xfrm>
+          <a:prstGeom prst="rect">
+            <a:avLst/>
+          </a:prstGeom>
+        </p:spPr>
+        <p:txBody>
+          <a:bodyPr spcFirstLastPara="1" wrap="square" lIns="91425" tIns="91425" rIns="91425" bIns="91425" anchor="t" anchorCtr="0">
+            <a:noAutofit/>
+          </a:bodyPr>
+          <a:lstStyle/>
+          <a:p>
+            <a:pPr marL="0" lvl="0" indent="0" algn="l" rtl="0">
+              <a:spcBef>
+                <a:spcPts val="0"/>
+              </a:spcBef>
+              <a:spcAft>
+                <a:spcPts val="0"/>
+              </a:spcAft>
+              <a:buNone/>
+            </a:pPr>
+            <a:endParaRPr/>
+          </a:p>
+        </p:txBody>
+      </p:sp>
+    </p:spTree>
+  </p:cSld>
+  <p:clrMapOvr>
+    <a:masterClrMapping/>
+  </p:clrMapOvr>
+</p:notes>
+</file>
+
+<file path=ppt/notesSlides/notesSlide8.xml><?xml version="1.0" encoding="utf-8"?>
+<p:notes xmlns:a="http://schemas.openxmlformats.org/drawingml/2006/main" xmlns:r="http://schemas.openxmlformats.org/officeDocument/2006/relationships" xmlns:p="http://schemas.openxmlformats.org/presentationml/2006/main" showMasterSp="0" showMasterPhAnim="0">
+  <p:cSld>
+    <p:spTree>
+      <p:nvGrpSpPr>
+        <p:cNvPr id="1" name="Shape 87"/>
+        <p:cNvGrpSpPr/>
+        <p:nvPr/>
+      </p:nvGrpSpPr>
+      <p:grpSpPr>
+        <a:xfrm>
+          <a:off x="0" y="0"/>
+          <a:ext cx="0" cy="0"/>
+          <a:chOff x="0" y="0"/>
+          <a:chExt cx="0" cy="0"/>
+        </a:xfrm>
+      </p:grpSpPr>
+      <p:sp>
+        <p:nvSpPr>
+          <p:cNvPr id="88" name="Google Shape;88;g5c84791939_0_0:notes"/>
+          <p:cNvSpPr>
+            <a:spLocks noGrp="1" noRot="1" noChangeAspect="1"/>
+          </p:cNvSpPr>
+          <p:nvPr>
+            <p:ph type="sldImg" idx="2"/>
+          </p:nvPr>
+        </p:nvSpPr>
+        <p:spPr>
+          <a:xfrm>
+            <a:off x="381000" y="685800"/>
+            <a:ext cx="6096000" cy="3429000"/>
+          </a:xfrm>
+          <a:custGeom>
+            <a:avLst/>
+            <a:gdLst/>
+            <a:ahLst/>
+            <a:cxnLst/>
+            <a:rect l="l" t="t" r="r" b="b"/>
+            <a:pathLst>
+              <a:path w="120000" h="120000" extrusionOk="0">
+                <a:moveTo>
+                  <a:pt x="0" y="0"/>
+                </a:moveTo>
+                <a:lnTo>
+                  <a:pt x="120000" y="0"/>
+                </a:lnTo>
+                <a:lnTo>
+                  <a:pt x="120000" y="120000"/>
+                </a:lnTo>
+                <a:lnTo>
+                  <a:pt x="0" y="120000"/>
+                </a:lnTo>
+                <a:close/>
+              </a:path>
+            </a:pathLst>
+          </a:custGeom>
+        </p:spPr>
+      </p:sp>
+      <p:sp>
+        <p:nvSpPr>
           <p:cNvPr id="89" name="Google Shape;89;g5c84791939_0_0:notes"/>
           <p:cNvSpPr txBox="1">
             <a:spLocks noGrp="1"/>
@@ -1422,7 +1642,7 @@
           <a:p>
             <a:fld id="{4BDF68E2-58F2-4D09-BE8B-E3BD06533059}" type="datetimeFigureOut">
               <a:rPr lang="en-US" dirty="0"/>
-              <a:t>7/8/2019</a:t>
+              <a:t>7/11/2019</a:t>
             </a:fld>
             <a:endParaRPr lang="en-US" dirty="0"/>
           </a:p>
@@ -1640,7 +1860,7 @@
           <a:p>
             <a:fld id="{2E2D6473-DF6D-4702-B328-E0DD40540A4E}" type="datetimeFigureOut">
               <a:rPr lang="en-US" dirty="0"/>
-              <a:t>7/8/2019</a:t>
+              <a:t>7/11/2019</a:t>
             </a:fld>
             <a:endParaRPr lang="en-US" dirty="0"/>
           </a:p>
@@ -1906,7 +2126,7 @@
           <a:p>
             <a:fld id="{E26F7E3A-B166-407D-9866-32884E7D5B37}" type="datetimeFigureOut">
               <a:rPr lang="en-US" dirty="0"/>
-              <a:t>7/8/2019</a:t>
+              <a:t>7/11/2019</a:t>
             </a:fld>
             <a:endParaRPr lang="en-US" dirty="0"/>
           </a:p>
@@ -2457,7 +2677,7 @@
           <a:p>
             <a:fld id="{528FC5F6-F338-4AE4-BB23-26385BCFC423}" type="datetimeFigureOut">
               <a:rPr lang="en-US" dirty="0"/>
-              <a:t>7/8/2019</a:t>
+              <a:t>7/11/2019</a:t>
             </a:fld>
             <a:endParaRPr lang="en-US" dirty="0"/>
           </a:p>
@@ -2810,7 +3030,7 @@
           <a:p>
             <a:fld id="{20EBB0C4-6273-4C6E-B9BD-2EDC30F1CD52}" type="datetimeFigureOut">
               <a:rPr lang="en-US" dirty="0"/>
-              <a:t>7/8/2019</a:t>
+              <a:t>7/11/2019</a:t>
             </a:fld>
             <a:endParaRPr lang="en-US" dirty="0"/>
           </a:p>
@@ -3095,7 +3315,7 @@
           <a:p>
             <a:fld id="{19AB4D41-86C1-4908-B66A-0B50CEB3BF29}" type="datetimeFigureOut">
               <a:rPr lang="en-US" dirty="0"/>
-              <a:t>7/8/2019</a:t>
+              <a:t>7/11/2019</a:t>
             </a:fld>
             <a:endParaRPr lang="en-US" dirty="0"/>
           </a:p>
@@ -3484,7 +3704,7 @@
           <a:p>
             <a:fld id="{E6426E2C-56C1-4E0D-A793-0088A7FDD37E}" type="datetimeFigureOut">
               <a:rPr lang="en-US" dirty="0"/>
-              <a:t>7/8/2019</a:t>
+              <a:t>7/11/2019</a:t>
             </a:fld>
             <a:endParaRPr lang="en-US" dirty="0"/>
           </a:p>
@@ -3612,7 +3832,7 @@
           <a:p>
             <a:fld id="{C8C39B41-D8B5-4052-B551-9B5525EAA8B6}" type="datetimeFigureOut">
               <a:rPr lang="en-US" dirty="0"/>
-              <a:t>7/8/2019</a:t>
+              <a:t>7/11/2019</a:t>
             </a:fld>
             <a:endParaRPr lang="en-US" dirty="0"/>
           </a:p>
@@ -3793,7 +4013,7 @@
           <a:p>
             <a:fld id="{4D94136C-8742-45B2-AF27-D93DF72833A9}" type="datetimeFigureOut">
               <a:rPr lang="en-US" dirty="0"/>
-              <a:t>7/8/2019</a:t>
+              <a:t>7/11/2019</a:t>
             </a:fld>
             <a:endParaRPr lang="en-US" dirty="0"/>
           </a:p>
@@ -4156,7 +4376,7 @@
           <a:p>
             <a:fld id="{32ABBEA6-7C60-4B02-AE87-00D78D8422AF}" type="datetimeFigureOut">
               <a:rPr lang="en-US" dirty="0"/>
-              <a:t>7/8/2019</a:t>
+              <a:t>7/11/2019</a:t>
             </a:fld>
             <a:endParaRPr lang="en-US" dirty="0"/>
           </a:p>
@@ -4548,7 +4768,7 @@
           <a:p>
             <a:fld id="{C9CAD897-D46E-4AD2-BD9B-49DD3E640873}" type="datetimeFigureOut">
               <a:rPr lang="en-US" dirty="0"/>
-              <a:t>7/8/2019</a:t>
+              <a:t>7/11/2019</a:t>
             </a:fld>
             <a:endParaRPr lang="en-US" dirty="0"/>
           </a:p>
@@ -4845,7 +5065,7 @@
           <a:p>
             <a:fld id="{98624D31-43A5-475A-80CF-332C9F6DCF35}" type="datetimeFigureOut">
               <a:rPr lang="en-US" dirty="0"/>
-              <a:t>7/8/2019</a:t>
+              <a:t>7/11/2019</a:t>
             </a:fld>
             <a:endParaRPr lang="en-US" dirty="0"/>
           </a:p>
@@ -6034,10 +6254,10 @@
               <a:buNone/>
             </a:pPr>
             <a:r>
-              <a:rPr lang="en"/>
+              <a:rPr lang="en" dirty="0"/>
               <a:t>Cataracts</a:t>
             </a:r>
-            <a:endParaRPr/>
+            <a:endParaRPr dirty="0"/>
           </a:p>
         </p:txBody>
       </p:sp>
@@ -6197,24 +6417,11 @@
             </a:pPr>
             <a:r>
               <a:rPr lang="en" sz="1800" dirty="0"/>
-              <a:t>Over time, α-crystallin is used up, and unstabilized βγ-crystallin aggregates desolubilize and form opaque cataracts.</a:t>
-            </a:r>
-            <a:endParaRPr sz="1800" dirty="0"/>
-          </a:p>
-          <a:p>
-            <a:pPr marL="457200" lvl="0" indent="-342900" algn="l" rtl="0">
-              <a:spcBef>
-                <a:spcPts val="0"/>
-              </a:spcBef>
-              <a:spcAft>
-                <a:spcPts val="0"/>
-              </a:spcAft>
-              <a:buSzPts val="1800"/>
-              <a:buChar char="●"/>
-            </a:pPr>
-            <a:r>
-              <a:rPr lang="en" sz="1800" dirty="0"/>
-              <a:t>Additionally, mutations in crystallin genes can increase risk of cataract.</a:t>
+              <a:t>Over time, α-crystallin is used up, and unstabilized βγ-crystallin aggregates desolubilize and form opaque cataracts</a:t>
+            </a:r>
+            <a:r>
+              <a:rPr lang="en" sz="1800" dirty="0" smtClean="0"/>
+              <a:t>.</a:t>
             </a:r>
             <a:endParaRPr sz="1800" dirty="0"/>
           </a:p>
@@ -6229,6 +6436,449 @@
 </file>
 
 <file path=ppt/slides/slide5.xml><?xml version="1.0" encoding="utf-8"?>
+<p:sld xmlns:a="http://schemas.openxmlformats.org/drawingml/2006/main" xmlns:r="http://schemas.openxmlformats.org/officeDocument/2006/relationships" xmlns:p="http://schemas.openxmlformats.org/presentationml/2006/main">
+  <p:cSld>
+    <p:spTree>
+      <p:nvGrpSpPr>
+        <p:cNvPr id="1" name="Shape 78"/>
+        <p:cNvGrpSpPr/>
+        <p:nvPr/>
+      </p:nvGrpSpPr>
+      <p:grpSpPr>
+        <a:xfrm>
+          <a:off x="0" y="0"/>
+          <a:ext cx="0" cy="0"/>
+          <a:chOff x="0" y="0"/>
+          <a:chExt cx="0" cy="0"/>
+        </a:xfrm>
+      </p:grpSpPr>
+      <p:sp>
+        <p:nvSpPr>
+          <p:cNvPr id="79" name="Google Shape;79;p16"/>
+          <p:cNvSpPr txBox="1">
+            <a:spLocks noGrp="1"/>
+          </p:cNvSpPr>
+          <p:nvPr>
+            <p:ph type="title"/>
+          </p:nvPr>
+        </p:nvSpPr>
+        <p:spPr>
+          <a:prstGeom prst="rect">
+            <a:avLst/>
+          </a:prstGeom>
+        </p:spPr>
+        <p:txBody>
+          <a:bodyPr spcFirstLastPara="1" wrap="square" lIns="91425" tIns="91425" rIns="91425" bIns="91425" anchor="t" anchorCtr="0">
+            <a:noAutofit/>
+          </a:bodyPr>
+          <a:lstStyle/>
+          <a:p>
+            <a:pPr marL="0" lvl="0" indent="0" algn="l" rtl="0">
+              <a:spcBef>
+                <a:spcPts val="0"/>
+              </a:spcBef>
+              <a:spcAft>
+                <a:spcPts val="0"/>
+              </a:spcAft>
+              <a:buNone/>
+            </a:pPr>
+            <a:r>
+              <a:rPr lang="en" dirty="0"/>
+              <a:t>Cataracts</a:t>
+            </a:r>
+            <a:endParaRPr dirty="0"/>
+          </a:p>
+        </p:txBody>
+      </p:sp>
+      <p:sp>
+        <p:nvSpPr>
+          <p:cNvPr id="80" name="Google Shape;80;p16"/>
+          <p:cNvSpPr txBox="1">
+            <a:spLocks noGrp="1"/>
+          </p:cNvSpPr>
+          <p:nvPr>
+            <p:ph type="body" idx="1"/>
+          </p:nvPr>
+        </p:nvSpPr>
+        <p:spPr>
+          <a:xfrm>
+            <a:off x="311700" y="1311501"/>
+            <a:ext cx="8520600" cy="3416400"/>
+          </a:xfrm>
+          <a:prstGeom prst="rect">
+            <a:avLst/>
+          </a:prstGeom>
+        </p:spPr>
+        <p:txBody>
+          <a:bodyPr spcFirstLastPara="1" wrap="square" lIns="91425" tIns="91425" rIns="91425" bIns="91425" anchor="t" anchorCtr="0">
+            <a:noAutofit/>
+          </a:bodyPr>
+          <a:lstStyle/>
+          <a:p>
+            <a:pPr marL="457200" lvl="0" indent="-342900" algn="l" rtl="0">
+              <a:lnSpc>
+                <a:spcPct val="100000"/>
+              </a:lnSpc>
+              <a:spcBef>
+                <a:spcPts val="0"/>
+              </a:spcBef>
+              <a:spcAft>
+                <a:spcPts val="0"/>
+              </a:spcAft>
+              <a:buSzPts val="1800"/>
+              <a:buChar char="●"/>
+            </a:pPr>
+            <a:r>
+              <a:rPr lang="en-US" sz="1800" dirty="0" smtClean="0"/>
+              <a:t>There are 2 main factors that lead to cataract:</a:t>
+            </a:r>
+          </a:p>
+          <a:p>
+            <a:pPr lvl="1" indent="-342900">
+              <a:lnSpc>
+                <a:spcPct val="100000"/>
+              </a:lnSpc>
+              <a:spcBef>
+                <a:spcPts val="0"/>
+              </a:spcBef>
+              <a:buSzPts val="1800"/>
+              <a:buChar char="●"/>
+            </a:pPr>
+            <a:r>
+              <a:rPr lang="en-US" sz="1650" dirty="0" smtClean="0"/>
+              <a:t>1: Depletion of glutathione within the lens</a:t>
+            </a:r>
+          </a:p>
+          <a:p>
+            <a:pPr lvl="1" indent="-342900">
+              <a:lnSpc>
+                <a:spcPct val="100000"/>
+              </a:lnSpc>
+              <a:spcBef>
+                <a:spcPts val="0"/>
+              </a:spcBef>
+              <a:buSzPts val="1800"/>
+              <a:buChar char="●"/>
+            </a:pPr>
+            <a:endParaRPr lang="en-US" sz="1650" dirty="0" smtClean="0"/>
+          </a:p>
+          <a:p>
+            <a:pPr lvl="1" indent="-342900">
+              <a:lnSpc>
+                <a:spcPct val="100000"/>
+              </a:lnSpc>
+              <a:spcBef>
+                <a:spcPts val="0"/>
+              </a:spcBef>
+              <a:buSzPts val="1800"/>
+              <a:buChar char="●"/>
+            </a:pPr>
+            <a:r>
+              <a:rPr lang="en-US" sz="1650" dirty="0" smtClean="0"/>
+              <a:t>Glutathione levels decrease for two reasons:</a:t>
+            </a:r>
+          </a:p>
+          <a:p>
+            <a:pPr lvl="2" indent="-342900">
+              <a:lnSpc>
+                <a:spcPct val="100000"/>
+              </a:lnSpc>
+              <a:spcBef>
+                <a:spcPts val="0"/>
+              </a:spcBef>
+              <a:buSzPts val="1800"/>
+              <a:buChar char="●"/>
+            </a:pPr>
+            <a:r>
+              <a:rPr lang="en-US" sz="1350" dirty="0" smtClean="0"/>
+              <a:t>Formation of a lens barrier: </a:t>
+            </a:r>
+            <a:endParaRPr lang="en-US" sz="1350" dirty="0" smtClean="0"/>
+          </a:p>
+          <a:p>
+            <a:pPr lvl="3" indent="-342900">
+              <a:lnSpc>
+                <a:spcPct val="100000"/>
+              </a:lnSpc>
+              <a:spcBef>
+                <a:spcPts val="0"/>
+              </a:spcBef>
+              <a:buSzPts val="1800"/>
+            </a:pPr>
+            <a:r>
+              <a:rPr lang="en-US" sz="1350" dirty="0"/>
+              <a:t>a</a:t>
+            </a:r>
+            <a:endParaRPr lang="en-US" sz="1350" dirty="0" smtClean="0"/>
+          </a:p>
+          <a:p>
+            <a:pPr lvl="2" indent="-342900">
+              <a:lnSpc>
+                <a:spcPct val="100000"/>
+              </a:lnSpc>
+              <a:spcBef>
+                <a:spcPts val="0"/>
+              </a:spcBef>
+              <a:buSzPts val="1800"/>
+              <a:buChar char="●"/>
+            </a:pPr>
+            <a:r>
+              <a:rPr lang="en-US" sz="1350" dirty="0" smtClean="0"/>
+              <a:t>Decreased recycling efficiency:</a:t>
+            </a:r>
+          </a:p>
+          <a:p>
+            <a:pPr lvl="3" indent="-342900">
+              <a:lnSpc>
+                <a:spcPct val="100000"/>
+              </a:lnSpc>
+              <a:spcBef>
+                <a:spcPts val="0"/>
+              </a:spcBef>
+              <a:buSzPts val="1800"/>
+            </a:pPr>
+            <a:r>
+              <a:rPr lang="en-US" sz="1350" dirty="0"/>
+              <a:t>b</a:t>
+            </a:r>
+            <a:endParaRPr lang="en-US" sz="1350" dirty="0" smtClean="0"/>
+          </a:p>
+          <a:p>
+            <a:pPr lvl="3" indent="-342900">
+              <a:lnSpc>
+                <a:spcPct val="100000"/>
+              </a:lnSpc>
+              <a:spcBef>
+                <a:spcPts val="0"/>
+              </a:spcBef>
+              <a:buSzPts val="1800"/>
+            </a:pPr>
+            <a:endParaRPr lang="en-US" sz="1350" dirty="0" smtClean="0"/>
+          </a:p>
+          <a:p>
+            <a:pPr lvl="1" indent="-342900">
+              <a:lnSpc>
+                <a:spcPct val="100000"/>
+              </a:lnSpc>
+              <a:spcBef>
+                <a:spcPts val="0"/>
+              </a:spcBef>
+              <a:buSzPts val="1800"/>
+              <a:buChar char="●"/>
+            </a:pPr>
+            <a:endParaRPr lang="en-US" sz="1650" dirty="0" smtClean="0"/>
+          </a:p>
+          <a:p>
+            <a:pPr marL="1028700" lvl="2" indent="0">
+              <a:lnSpc>
+                <a:spcPct val="100000"/>
+              </a:lnSpc>
+              <a:spcBef>
+                <a:spcPts val="0"/>
+              </a:spcBef>
+              <a:buSzPts val="1800"/>
+              <a:buNone/>
+            </a:pPr>
+            <a:endParaRPr sz="1350" dirty="0"/>
+          </a:p>
+        </p:txBody>
+      </p:sp>
+    </p:spTree>
+    <p:extLst>
+      <p:ext uri="{BB962C8B-B14F-4D97-AF65-F5344CB8AC3E}">
+        <p14:creationId xmlns:p14="http://schemas.microsoft.com/office/powerpoint/2010/main" val="1564613521"/>
+      </p:ext>
+    </p:extLst>
+  </p:cSld>
+  <p:clrMapOvr>
+    <a:masterClrMapping/>
+  </p:clrMapOvr>
+</p:sld>
+</file>
+
+<file path=ppt/slides/slide6.xml><?xml version="1.0" encoding="utf-8"?>
+<p:sld xmlns:a="http://schemas.openxmlformats.org/drawingml/2006/main" xmlns:r="http://schemas.openxmlformats.org/officeDocument/2006/relationships" xmlns:p="http://schemas.openxmlformats.org/presentationml/2006/main">
+  <p:cSld>
+    <p:spTree>
+      <p:nvGrpSpPr>
+        <p:cNvPr id="1" name="Shape 78"/>
+        <p:cNvGrpSpPr/>
+        <p:nvPr/>
+      </p:nvGrpSpPr>
+      <p:grpSpPr>
+        <a:xfrm>
+          <a:off x="0" y="0"/>
+          <a:ext cx="0" cy="0"/>
+          <a:chOff x="0" y="0"/>
+          <a:chExt cx="0" cy="0"/>
+        </a:xfrm>
+      </p:grpSpPr>
+      <p:sp>
+        <p:nvSpPr>
+          <p:cNvPr id="79" name="Google Shape;79;p16"/>
+          <p:cNvSpPr txBox="1">
+            <a:spLocks noGrp="1"/>
+          </p:cNvSpPr>
+          <p:nvPr>
+            <p:ph type="title"/>
+          </p:nvPr>
+        </p:nvSpPr>
+        <p:spPr>
+          <a:prstGeom prst="rect">
+            <a:avLst/>
+          </a:prstGeom>
+        </p:spPr>
+        <p:txBody>
+          <a:bodyPr spcFirstLastPara="1" wrap="square" lIns="91425" tIns="91425" rIns="91425" bIns="91425" anchor="t" anchorCtr="0">
+            <a:noAutofit/>
+          </a:bodyPr>
+          <a:lstStyle/>
+          <a:p>
+            <a:pPr marL="0" lvl="0" indent="0" algn="l" rtl="0">
+              <a:spcBef>
+                <a:spcPts val="0"/>
+              </a:spcBef>
+              <a:spcAft>
+                <a:spcPts val="0"/>
+              </a:spcAft>
+              <a:buNone/>
+            </a:pPr>
+            <a:r>
+              <a:rPr lang="en" dirty="0"/>
+              <a:t>Cataracts</a:t>
+            </a:r>
+            <a:endParaRPr dirty="0"/>
+          </a:p>
+        </p:txBody>
+      </p:sp>
+      <p:sp>
+        <p:nvSpPr>
+          <p:cNvPr id="80" name="Google Shape;80;p16"/>
+          <p:cNvSpPr txBox="1">
+            <a:spLocks noGrp="1"/>
+          </p:cNvSpPr>
+          <p:nvPr>
+            <p:ph type="body" idx="1"/>
+          </p:nvPr>
+        </p:nvSpPr>
+        <p:spPr>
+          <a:xfrm>
+            <a:off x="311700" y="1311501"/>
+            <a:ext cx="8520600" cy="3416400"/>
+          </a:xfrm>
+          <a:prstGeom prst="rect">
+            <a:avLst/>
+          </a:prstGeom>
+        </p:spPr>
+        <p:txBody>
+          <a:bodyPr spcFirstLastPara="1" wrap="square" lIns="91425" tIns="91425" rIns="91425" bIns="91425" anchor="t" anchorCtr="0">
+            <a:noAutofit/>
+          </a:bodyPr>
+          <a:lstStyle/>
+          <a:p>
+            <a:pPr marL="457200" lvl="0" indent="-342900" algn="l" rtl="0">
+              <a:lnSpc>
+                <a:spcPct val="100000"/>
+              </a:lnSpc>
+              <a:spcBef>
+                <a:spcPts val="0"/>
+              </a:spcBef>
+              <a:spcAft>
+                <a:spcPts val="0"/>
+              </a:spcAft>
+              <a:buSzPts val="1800"/>
+              <a:buChar char="●"/>
+            </a:pPr>
+            <a:r>
+              <a:rPr lang="en-US" sz="1800" dirty="0" smtClean="0"/>
+              <a:t>There are 2 main factors that lead to cataract:</a:t>
+            </a:r>
+          </a:p>
+          <a:p>
+            <a:pPr lvl="1" indent="-342900">
+              <a:lnSpc>
+                <a:spcPct val="100000"/>
+              </a:lnSpc>
+              <a:spcBef>
+                <a:spcPts val="0"/>
+              </a:spcBef>
+              <a:buSzPts val="1800"/>
+              <a:buChar char="●"/>
+            </a:pPr>
+            <a:r>
+              <a:rPr lang="en-US" sz="1650" dirty="0" smtClean="0"/>
+              <a:t>2: </a:t>
+            </a:r>
+            <a:r>
+              <a:rPr lang="en-US" sz="1650" dirty="0" err="1" smtClean="0"/>
+              <a:t>Desolubilization</a:t>
+            </a:r>
+            <a:r>
+              <a:rPr lang="en-US" sz="1650" dirty="0" smtClean="0"/>
+              <a:t> of </a:t>
+            </a:r>
+            <a:r>
+              <a:rPr lang="en-US" sz="1650" dirty="0" err="1" smtClean="0"/>
+              <a:t>crystallin</a:t>
+            </a:r>
+            <a:r>
+              <a:rPr lang="en-US" sz="1650" dirty="0" smtClean="0"/>
+              <a:t> </a:t>
+            </a:r>
+            <a:r>
+              <a:rPr lang="en-US" sz="1650" dirty="0" smtClean="0"/>
+              <a:t>proteins</a:t>
+            </a:r>
+          </a:p>
+          <a:p>
+            <a:pPr lvl="2" indent="-342900">
+              <a:lnSpc>
+                <a:spcPct val="100000"/>
+              </a:lnSpc>
+              <a:spcBef>
+                <a:spcPts val="0"/>
+              </a:spcBef>
+              <a:buSzPts val="1800"/>
+              <a:buChar char="●"/>
+            </a:pPr>
+            <a:r>
+              <a:rPr lang="en-US" sz="1350" dirty="0" smtClean="0"/>
+              <a:t>Cells have limited supply of proteins; eventually, </a:t>
+            </a:r>
+            <a:r>
+              <a:rPr lang="en" sz="1400" dirty="0" smtClean="0"/>
+              <a:t>α-crystallin runs out</a:t>
+            </a:r>
+          </a:p>
+          <a:p>
+            <a:pPr lvl="2" indent="-342900">
+              <a:lnSpc>
+                <a:spcPct val="100000"/>
+              </a:lnSpc>
+              <a:spcBef>
+                <a:spcPts val="0"/>
+              </a:spcBef>
+              <a:buSzPts val="1800"/>
+              <a:buChar char="●"/>
+            </a:pPr>
+            <a:endParaRPr sz="1350" dirty="0"/>
+          </a:p>
+        </p:txBody>
+      </p:sp>
+    </p:spTree>
+    <p:extLst>
+      <p:ext uri="{BB962C8B-B14F-4D97-AF65-F5344CB8AC3E}">
+        <p14:creationId xmlns:p14="http://schemas.microsoft.com/office/powerpoint/2010/main" val="2549590270"/>
+      </p:ext>
+    </p:extLst>
+  </p:cSld>
+  <p:clrMapOvr>
+    <a:masterClrMapping/>
+  </p:clrMapOvr>
+</p:sld>
+</file>
+
+<file path=ppt/slides/slide7.xml><?xml version="1.0" encoding="utf-8"?>
 <p:sld xmlns:a="http://schemas.openxmlformats.org/drawingml/2006/main" xmlns:r="http://schemas.openxmlformats.org/officeDocument/2006/relationships" xmlns:p="http://schemas.openxmlformats.org/presentationml/2006/main">
   <p:cSld>
     <p:spTree>
@@ -6365,7 +7015,7 @@
 </p:sld>
 </file>
 
-<file path=ppt/slides/slide6.xml><?xml version="1.0" encoding="utf-8"?>
+<file path=ppt/slides/slide8.xml><?xml version="1.0" encoding="utf-8"?>
 <p:sld xmlns:a="http://schemas.openxmlformats.org/drawingml/2006/main" xmlns:r="http://schemas.openxmlformats.org/officeDocument/2006/relationships" xmlns:p="http://schemas.openxmlformats.org/presentationml/2006/main">
   <p:cSld>
     <p:spTree>

</xml_diff>

<commit_message>
completed ppt and cluster pathway identification
</commit_message>
<xml_diff>
--- a/Cataract.pptx
+++ b/Cataract.pptx
@@ -5,17 +5,16 @@
     <p:sldMasterId id="2147483660" r:id="rId1"/>
   </p:sldMasterIdLst>
   <p:notesMasterIdLst>
-    <p:notesMasterId r:id="rId10"/>
+    <p:notesMasterId r:id="rId9"/>
   </p:notesMasterIdLst>
   <p:sldIdLst>
     <p:sldId id="256" r:id="rId2"/>
     <p:sldId id="257" r:id="rId3"/>
     <p:sldId id="258" r:id="rId4"/>
-    <p:sldId id="259" r:id="rId5"/>
-    <p:sldId id="265" r:id="rId6"/>
-    <p:sldId id="266" r:id="rId7"/>
-    <p:sldId id="260" r:id="rId8"/>
-    <p:sldId id="261" r:id="rId9"/>
+    <p:sldId id="265" r:id="rId5"/>
+    <p:sldId id="266" r:id="rId6"/>
+    <p:sldId id="260" r:id="rId7"/>
+    <p:sldId id="261" r:id="rId8"/>
   </p:sldIdLst>
   <p:sldSz cx="9144000" cy="5143500" type="screen16x9"/>
   <p:notesSz cx="6858000" cy="9144000"/>
@@ -983,6 +982,11 @@
         </p:txBody>
       </p:sp>
     </p:spTree>
+    <p:extLst>
+      <p:ext uri="{BB962C8B-B14F-4D97-AF65-F5344CB8AC3E}">
+        <p14:creationId xmlns:p14="http://schemas.microsoft.com/office/powerpoint/2010/main" val="2503784434"/>
+      </p:ext>
+    </p:extLst>
   </p:cSld>
   <p:clrMapOvr>
     <a:masterClrMapping/>
@@ -1089,7 +1093,7 @@
     </p:spTree>
     <p:extLst>
       <p:ext uri="{BB962C8B-B14F-4D97-AF65-F5344CB8AC3E}">
-        <p14:creationId xmlns:p14="http://schemas.microsoft.com/office/powerpoint/2010/main" val="2503784434"/>
+        <p14:creationId xmlns:p14="http://schemas.microsoft.com/office/powerpoint/2010/main" val="2041249652"/>
       </p:ext>
     </p:extLst>
   </p:cSld>
@@ -1104,7 +1108,7 @@
   <p:cSld>
     <p:spTree>
       <p:nvGrpSpPr>
-        <p:cNvPr id="1" name="Shape 75"/>
+        <p:cNvPr id="1" name="Shape 81"/>
         <p:cNvGrpSpPr/>
         <p:nvPr/>
       </p:nvGrpSpPr>
@@ -1118,7 +1122,7 @@
       </p:grpSpPr>
       <p:sp>
         <p:nvSpPr>
-          <p:cNvPr id="76" name="Google Shape;76;g5c1d9bc1b2_0_18:notes"/>
+          <p:cNvPr id="82" name="Google Shape;82;g5ccef844c9_0_5:notes"/>
           <p:cNvSpPr>
             <a:spLocks noGrp="1" noRot="1" noChangeAspect="1"/>
           </p:cNvSpPr>
@@ -1159,7 +1163,7 @@
       </p:sp>
       <p:sp>
         <p:nvSpPr>
-          <p:cNvPr id="77" name="Google Shape;77;g5c1d9bc1b2_0_18:notes"/>
+          <p:cNvPr id="83" name="Google Shape;83;g5ccef844c9_0_5:notes"/>
           <p:cNvSpPr txBox="1">
             <a:spLocks noGrp="1"/>
           </p:cNvSpPr>
@@ -1196,11 +1200,6 @@
         </p:txBody>
       </p:sp>
     </p:spTree>
-    <p:extLst>
-      <p:ext uri="{BB962C8B-B14F-4D97-AF65-F5344CB8AC3E}">
-        <p14:creationId xmlns:p14="http://schemas.microsoft.com/office/powerpoint/2010/main" val="2041249652"/>
-      </p:ext>
-    </p:extLst>
   </p:cSld>
   <p:clrMapOvr>
     <a:masterClrMapping/>
@@ -1213,7 +1212,7 @@
   <p:cSld>
     <p:spTree>
       <p:nvGrpSpPr>
-        <p:cNvPr id="1" name="Shape 81"/>
+        <p:cNvPr id="1" name="Shape 87"/>
         <p:cNvGrpSpPr/>
         <p:nvPr/>
       </p:nvGrpSpPr>
@@ -1227,7 +1226,7 @@
       </p:grpSpPr>
       <p:sp>
         <p:nvSpPr>
-          <p:cNvPr id="82" name="Google Shape;82;g5ccef844c9_0_5:notes"/>
+          <p:cNvPr id="88" name="Google Shape;88;g5c84791939_0_0:notes"/>
           <p:cNvSpPr>
             <a:spLocks noGrp="1" noRot="1" noChangeAspect="1"/>
           </p:cNvSpPr>
@@ -1268,110 +1267,6 @@
       </p:sp>
       <p:sp>
         <p:nvSpPr>
-          <p:cNvPr id="83" name="Google Shape;83;g5ccef844c9_0_5:notes"/>
-          <p:cNvSpPr txBox="1">
-            <a:spLocks noGrp="1"/>
-          </p:cNvSpPr>
-          <p:nvPr>
-            <p:ph type="body" idx="1"/>
-          </p:nvPr>
-        </p:nvSpPr>
-        <p:spPr>
-          <a:xfrm>
-            <a:off x="685800" y="4343400"/>
-            <a:ext cx="5486400" cy="4114800"/>
-          </a:xfrm>
-          <a:prstGeom prst="rect">
-            <a:avLst/>
-          </a:prstGeom>
-        </p:spPr>
-        <p:txBody>
-          <a:bodyPr spcFirstLastPara="1" wrap="square" lIns="91425" tIns="91425" rIns="91425" bIns="91425" anchor="t" anchorCtr="0">
-            <a:noAutofit/>
-          </a:bodyPr>
-          <a:lstStyle/>
-          <a:p>
-            <a:pPr marL="0" lvl="0" indent="0" algn="l" rtl="0">
-              <a:spcBef>
-                <a:spcPts val="0"/>
-              </a:spcBef>
-              <a:spcAft>
-                <a:spcPts val="0"/>
-              </a:spcAft>
-              <a:buNone/>
-            </a:pPr>
-            <a:endParaRPr/>
-          </a:p>
-        </p:txBody>
-      </p:sp>
-    </p:spTree>
-  </p:cSld>
-  <p:clrMapOvr>
-    <a:masterClrMapping/>
-  </p:clrMapOvr>
-</p:notes>
-</file>
-
-<file path=ppt/notesSlides/notesSlide8.xml><?xml version="1.0" encoding="utf-8"?>
-<p:notes xmlns:a="http://schemas.openxmlformats.org/drawingml/2006/main" xmlns:r="http://schemas.openxmlformats.org/officeDocument/2006/relationships" xmlns:p="http://schemas.openxmlformats.org/presentationml/2006/main" showMasterSp="0" showMasterPhAnim="0">
-  <p:cSld>
-    <p:spTree>
-      <p:nvGrpSpPr>
-        <p:cNvPr id="1" name="Shape 87"/>
-        <p:cNvGrpSpPr/>
-        <p:nvPr/>
-      </p:nvGrpSpPr>
-      <p:grpSpPr>
-        <a:xfrm>
-          <a:off x="0" y="0"/>
-          <a:ext cx="0" cy="0"/>
-          <a:chOff x="0" y="0"/>
-          <a:chExt cx="0" cy="0"/>
-        </a:xfrm>
-      </p:grpSpPr>
-      <p:sp>
-        <p:nvSpPr>
-          <p:cNvPr id="88" name="Google Shape;88;g5c84791939_0_0:notes"/>
-          <p:cNvSpPr>
-            <a:spLocks noGrp="1" noRot="1" noChangeAspect="1"/>
-          </p:cNvSpPr>
-          <p:nvPr>
-            <p:ph type="sldImg" idx="2"/>
-          </p:nvPr>
-        </p:nvSpPr>
-        <p:spPr>
-          <a:xfrm>
-            <a:off x="381000" y="685800"/>
-            <a:ext cx="6096000" cy="3429000"/>
-          </a:xfrm>
-          <a:custGeom>
-            <a:avLst/>
-            <a:gdLst/>
-            <a:ahLst/>
-            <a:cxnLst/>
-            <a:rect l="l" t="t" r="r" b="b"/>
-            <a:pathLst>
-              <a:path w="120000" h="120000" extrusionOk="0">
-                <a:moveTo>
-                  <a:pt x="0" y="0"/>
-                </a:moveTo>
-                <a:lnTo>
-                  <a:pt x="120000" y="0"/>
-                </a:lnTo>
-                <a:lnTo>
-                  <a:pt x="120000" y="120000"/>
-                </a:lnTo>
-                <a:lnTo>
-                  <a:pt x="0" y="120000"/>
-                </a:lnTo>
-                <a:close/>
-              </a:path>
-            </a:pathLst>
-          </a:custGeom>
-        </p:spPr>
-      </p:sp>
-      <p:sp>
-        <p:nvSpPr>
           <p:cNvPr id="89" name="Google Shape;89;g5c84791939_0_0:notes"/>
           <p:cNvSpPr txBox="1">
             <a:spLocks noGrp="1"/>
@@ -1642,7 +1537,7 @@
           <a:p>
             <a:fld id="{4BDF68E2-58F2-4D09-BE8B-E3BD06533059}" type="datetimeFigureOut">
               <a:rPr lang="en-US" dirty="0"/>
-              <a:t>7/12/2019</a:t>
+              <a:t>7/15/2019</a:t>
             </a:fld>
             <a:endParaRPr lang="en-US" dirty="0"/>
           </a:p>
@@ -1860,7 +1755,7 @@
           <a:p>
             <a:fld id="{2E2D6473-DF6D-4702-B328-E0DD40540A4E}" type="datetimeFigureOut">
               <a:rPr lang="en-US" dirty="0"/>
-              <a:t>7/12/2019</a:t>
+              <a:t>7/15/2019</a:t>
             </a:fld>
             <a:endParaRPr lang="en-US" dirty="0"/>
           </a:p>
@@ -2126,7 +2021,7 @@
           <a:p>
             <a:fld id="{E26F7E3A-B166-407D-9866-32884E7D5B37}" type="datetimeFigureOut">
               <a:rPr lang="en-US" dirty="0"/>
-              <a:t>7/12/2019</a:t>
+              <a:t>7/15/2019</a:t>
             </a:fld>
             <a:endParaRPr lang="en-US" dirty="0"/>
           </a:p>
@@ -2677,7 +2572,7 @@
           <a:p>
             <a:fld id="{528FC5F6-F338-4AE4-BB23-26385BCFC423}" type="datetimeFigureOut">
               <a:rPr lang="en-US" dirty="0"/>
-              <a:t>7/12/2019</a:t>
+              <a:t>7/15/2019</a:t>
             </a:fld>
             <a:endParaRPr lang="en-US" dirty="0"/>
           </a:p>
@@ -3030,7 +2925,7 @@
           <a:p>
             <a:fld id="{20EBB0C4-6273-4C6E-B9BD-2EDC30F1CD52}" type="datetimeFigureOut">
               <a:rPr lang="en-US" dirty="0"/>
-              <a:t>7/12/2019</a:t>
+              <a:t>7/15/2019</a:t>
             </a:fld>
             <a:endParaRPr lang="en-US" dirty="0"/>
           </a:p>
@@ -3315,7 +3210,7 @@
           <a:p>
             <a:fld id="{19AB4D41-86C1-4908-B66A-0B50CEB3BF29}" type="datetimeFigureOut">
               <a:rPr lang="en-US" dirty="0"/>
-              <a:t>7/12/2019</a:t>
+              <a:t>7/15/2019</a:t>
             </a:fld>
             <a:endParaRPr lang="en-US" dirty="0"/>
           </a:p>
@@ -3704,7 +3599,7 @@
           <a:p>
             <a:fld id="{E6426E2C-56C1-4E0D-A793-0088A7FDD37E}" type="datetimeFigureOut">
               <a:rPr lang="en-US" dirty="0"/>
-              <a:t>7/12/2019</a:t>
+              <a:t>7/15/2019</a:t>
             </a:fld>
             <a:endParaRPr lang="en-US" dirty="0"/>
           </a:p>
@@ -3832,7 +3727,7 @@
           <a:p>
             <a:fld id="{C8C39B41-D8B5-4052-B551-9B5525EAA8B6}" type="datetimeFigureOut">
               <a:rPr lang="en-US" dirty="0"/>
-              <a:t>7/12/2019</a:t>
+              <a:t>7/15/2019</a:t>
             </a:fld>
             <a:endParaRPr lang="en-US" dirty="0"/>
           </a:p>
@@ -4013,7 +3908,7 @@
           <a:p>
             <a:fld id="{4D94136C-8742-45B2-AF27-D93DF72833A9}" type="datetimeFigureOut">
               <a:rPr lang="en-US" dirty="0"/>
-              <a:t>7/12/2019</a:t>
+              <a:t>7/15/2019</a:t>
             </a:fld>
             <a:endParaRPr lang="en-US" dirty="0"/>
           </a:p>
@@ -4376,7 +4271,7 @@
           <a:p>
             <a:fld id="{32ABBEA6-7C60-4B02-AE87-00D78D8422AF}" type="datetimeFigureOut">
               <a:rPr lang="en-US" dirty="0"/>
-              <a:t>7/12/2019</a:t>
+              <a:t>7/15/2019</a:t>
             </a:fld>
             <a:endParaRPr lang="en-US" dirty="0"/>
           </a:p>
@@ -4768,7 +4663,7 @@
           <a:p>
             <a:fld id="{C9CAD897-D46E-4AD2-BD9B-49DD3E640873}" type="datetimeFigureOut">
               <a:rPr lang="en-US" dirty="0"/>
-              <a:t>7/12/2019</a:t>
+              <a:t>7/15/2019</a:t>
             </a:fld>
             <a:endParaRPr lang="en-US" dirty="0"/>
           </a:p>
@@ -5065,7 +4960,7 @@
           <a:p>
             <a:fld id="{98624D31-43A5-475A-80CF-332C9F6DCF35}" type="datetimeFigureOut">
               <a:rPr lang="en-US" dirty="0"/>
-              <a:t>7/12/2019</a:t>
+              <a:t>7/15/2019</a:t>
             </a:fld>
             <a:endParaRPr lang="en-US" dirty="0"/>
           </a:p>
@@ -5699,6 +5594,90 @@
       </p:grpSpPr>
       <p:sp>
         <p:nvSpPr>
+          <p:cNvPr id="8" name="Google Shape;64;p14"/>
+          <p:cNvSpPr/>
+          <p:nvPr/>
+        </p:nvSpPr>
+        <p:spPr>
+          <a:xfrm>
+            <a:off x="7393097" y="1284226"/>
+            <a:ext cx="1181059" cy="1226292"/>
+          </a:xfrm>
+          <a:prstGeom prst="ellipse">
+            <a:avLst/>
+          </a:prstGeom>
+          <a:solidFill>
+            <a:srgbClr val="00B050">
+              <a:alpha val="19230"/>
+            </a:srgbClr>
+          </a:solidFill>
+          <a:ln>
+            <a:noFill/>
+          </a:ln>
+        </p:spPr>
+        <p:txBody>
+          <a:bodyPr spcFirstLastPara="1" wrap="square" lIns="91425" tIns="91425" rIns="91425" bIns="91425" anchor="ctr" anchorCtr="0">
+            <a:noAutofit/>
+          </a:bodyPr>
+          <a:lstStyle/>
+          <a:p>
+            <a:pPr marL="0" lvl="0" indent="0" algn="l" rtl="0">
+              <a:spcBef>
+                <a:spcPts val="0"/>
+              </a:spcBef>
+              <a:spcAft>
+                <a:spcPts val="0"/>
+              </a:spcAft>
+              <a:buNone/>
+            </a:pPr>
+            <a:endParaRPr/>
+          </a:p>
+        </p:txBody>
+      </p:sp>
+      <p:sp>
+        <p:nvSpPr>
+          <p:cNvPr id="9" name="Google Shape;64;p14"/>
+          <p:cNvSpPr/>
+          <p:nvPr/>
+        </p:nvSpPr>
+        <p:spPr>
+          <a:xfrm>
+            <a:off x="7262191" y="1570383"/>
+            <a:ext cx="439252" cy="642730"/>
+          </a:xfrm>
+          <a:prstGeom prst="ellipse">
+            <a:avLst/>
+          </a:prstGeom>
+          <a:solidFill>
+            <a:srgbClr val="0070C0">
+              <a:alpha val="19230"/>
+            </a:srgbClr>
+          </a:solidFill>
+          <a:ln>
+            <a:noFill/>
+          </a:ln>
+        </p:spPr>
+        <p:txBody>
+          <a:bodyPr spcFirstLastPara="1" wrap="square" lIns="91425" tIns="91425" rIns="91425" bIns="91425" anchor="ctr" anchorCtr="0">
+            <a:noAutofit/>
+          </a:bodyPr>
+          <a:lstStyle/>
+          <a:p>
+            <a:pPr marL="0" lvl="0" indent="0" algn="l" rtl="0">
+              <a:spcBef>
+                <a:spcPts val="0"/>
+              </a:spcBef>
+              <a:spcAft>
+                <a:spcPts val="0"/>
+              </a:spcAft>
+              <a:buNone/>
+            </a:pPr>
+            <a:endParaRPr/>
+          </a:p>
+        </p:txBody>
+      </p:sp>
+      <p:sp>
+        <p:nvSpPr>
           <p:cNvPr id="60" name="Google Shape;60;p14"/>
           <p:cNvSpPr txBox="1">
             <a:spLocks noGrp="1"/>
@@ -5822,7 +5801,7 @@
           <a:xfrm>
             <a:off x="7137706" y="1152427"/>
             <a:ext cx="1857039" cy="1476327"/>
-            <a:chOff x="5974025" y="1152475"/>
+            <a:chOff x="5974024" y="1152475"/>
             <a:chExt cx="3021050" cy="2358350"/>
           </a:xfrm>
         </p:grpSpPr>
@@ -5841,7 +5820,7 @@
           </p:blipFill>
           <p:spPr>
             <a:xfrm>
-              <a:off x="5974025" y="1152475"/>
+              <a:off x="5974024" y="1152475"/>
               <a:ext cx="3021050" cy="2358350"/>
             </a:xfrm>
             <a:prstGeom prst="rect">
@@ -6254,8 +6233,8 @@
               <a:buNone/>
             </a:pPr>
             <a:r>
-              <a:rPr lang="en" dirty="0"/>
-              <a:t>Cataracts</a:t>
+              <a:rPr lang="en" dirty="0" smtClean="0"/>
+              <a:t>Cataract</a:t>
             </a:r>
             <a:endParaRPr dirty="0"/>
           </a:p>
@@ -6287,6 +6266,9 @@
           <a:lstStyle/>
           <a:p>
             <a:pPr marL="457200" lvl="0" indent="-342900" algn="l" rtl="0">
+              <a:lnSpc>
+                <a:spcPct val="100000"/>
+              </a:lnSpc>
               <a:spcBef>
                 <a:spcPts val="0"/>
               </a:spcBef>
@@ -6297,137 +6279,229 @@
               <a:buChar char="●"/>
             </a:pPr>
             <a:r>
-              <a:rPr lang="en" sz="1800" dirty="0"/>
-              <a:t>Caused by buildup of unfolded crystallins (too much for α-crystallin to handle) </a:t>
-            </a:r>
-            <a:endParaRPr sz="1800" dirty="0"/>
-          </a:p>
-          <a:p>
-            <a:pPr marL="457200" lvl="0" indent="-342900" algn="l" rtl="0">
-              <a:spcBef>
-                <a:spcPts val="0"/>
-              </a:spcBef>
-              <a:spcAft>
-                <a:spcPts val="0"/>
-              </a:spcAft>
+              <a:rPr lang="en-US" sz="1800" dirty="0" smtClean="0"/>
+              <a:t>There are 2 main factors that lead to cataract:</a:t>
+            </a:r>
+          </a:p>
+          <a:p>
+            <a:pPr lvl="1" indent="-342900">
+              <a:lnSpc>
+                <a:spcPct val="100000"/>
+              </a:lnSpc>
+              <a:spcBef>
+                <a:spcPts val="0"/>
+              </a:spcBef>
               <a:buSzPts val="1800"/>
               <a:buChar char="●"/>
             </a:pPr>
             <a:r>
-              <a:rPr lang="en" sz="1800" dirty="0"/>
-              <a:t>Oxidative damage is believed to play a large factor</a:t>
-            </a:r>
-            <a:endParaRPr sz="1800" dirty="0"/>
-          </a:p>
-          <a:p>
-            <a:pPr marL="914400" lvl="1" indent="-317500" algn="l" rtl="0">
-              <a:spcBef>
-                <a:spcPts val="0"/>
-              </a:spcBef>
-              <a:spcAft>
-                <a:spcPts val="0"/>
-              </a:spcAft>
-              <a:buSzPts val="1400"/>
-              <a:buChar char="○"/>
-            </a:pPr>
-            <a:r>
-              <a:rPr lang="en" sz="1600" dirty="0"/>
-              <a:t>Glutathione level falls due to 2 reasons:</a:t>
-            </a:r>
-            <a:endParaRPr sz="1600" dirty="0"/>
-          </a:p>
-          <a:p>
-            <a:pPr marL="1371600" lvl="2" indent="-317500" algn="l" rtl="0">
-              <a:spcBef>
-                <a:spcPts val="0"/>
-              </a:spcBef>
-              <a:spcAft>
-                <a:spcPts val="0"/>
-              </a:spcAft>
-              <a:buSzPts val="1400"/>
-              <a:buChar char="■"/>
-            </a:pPr>
-            <a:r>
-              <a:rPr lang="en" sz="1200" dirty="0"/>
-              <a:t>Decreased efficiency of recycling GSH</a:t>
-            </a:r>
-            <a:endParaRPr sz="1200" dirty="0"/>
-          </a:p>
-          <a:p>
-            <a:pPr marL="1371600" lvl="2" indent="-317500" algn="l" rtl="0">
-              <a:spcBef>
-                <a:spcPts val="0"/>
-              </a:spcBef>
-              <a:spcAft>
-                <a:spcPts val="0"/>
-              </a:spcAft>
-              <a:buSzPts val="1400"/>
-              <a:buChar char="■"/>
-            </a:pPr>
-            <a:r>
-              <a:rPr lang="en" sz="1200" dirty="0"/>
-              <a:t>Formation of "barrier" around the lens nucleus, preventing entry of GSH</a:t>
-            </a:r>
-            <a:endParaRPr sz="1200" dirty="0"/>
-          </a:p>
-          <a:p>
-            <a:pPr marL="457200" lvl="0" indent="-342900" algn="l" rtl="0">
-              <a:spcBef>
-                <a:spcPts val="0"/>
-              </a:spcBef>
-              <a:spcAft>
-                <a:spcPts val="0"/>
-              </a:spcAft>
+              <a:rPr lang="en-US" sz="1650" dirty="0" smtClean="0"/>
+              <a:t>1: Depletion of glutathione within the lens</a:t>
+            </a:r>
+          </a:p>
+          <a:p>
+            <a:pPr lvl="1" indent="-342900">
+              <a:lnSpc>
+                <a:spcPct val="100000"/>
+              </a:lnSpc>
+              <a:spcBef>
+                <a:spcPts val="0"/>
+              </a:spcBef>
               <a:buSzPts val="1800"/>
               <a:buChar char="●"/>
             </a:pPr>
-            <a:r>
-              <a:rPr lang="en" sz="1800" dirty="0"/>
-              <a:t>Reactive oxygen species damage crystallin, partially unfolding it.</a:t>
-            </a:r>
-            <a:endParaRPr sz="1800" dirty="0"/>
-          </a:p>
-          <a:p>
-            <a:pPr marL="914400" lvl="1" indent="-317500" algn="l" rtl="0">
-              <a:spcBef>
-                <a:spcPts val="0"/>
-              </a:spcBef>
-              <a:spcAft>
-                <a:spcPts val="0"/>
-              </a:spcAft>
-              <a:buSzPts val="1400"/>
-              <a:buChar char="○"/>
-            </a:pPr>
-            <a:r>
-              <a:rPr lang="en" sz="1600" dirty="0"/>
-              <a:t>This leads to protein-protein interactions and aggregation.</a:t>
-            </a:r>
-            <a:endParaRPr sz="1600" dirty="0"/>
-          </a:p>
-          <a:p>
-            <a:pPr marL="457200" lvl="0" indent="-342900" algn="l" rtl="0">
-              <a:spcBef>
-                <a:spcPts val="0"/>
-              </a:spcBef>
-              <a:spcAft>
-                <a:spcPts val="0"/>
-              </a:spcAft>
+            <a:endParaRPr lang="en-US" sz="1650" dirty="0" smtClean="0"/>
+          </a:p>
+          <a:p>
+            <a:pPr lvl="1" indent="-342900">
+              <a:lnSpc>
+                <a:spcPct val="100000"/>
+              </a:lnSpc>
+              <a:spcBef>
+                <a:spcPts val="0"/>
+              </a:spcBef>
               <a:buSzPts val="1800"/>
               <a:buChar char="●"/>
             </a:pPr>
             <a:r>
-              <a:rPr lang="en" sz="1800" dirty="0"/>
-              <a:t>Over time, α-crystallin is used up, and unstabilized βγ-crystallin aggregates desolubilize and form opaque cataracts</a:t>
-            </a:r>
-            <a:r>
-              <a:rPr lang="en" sz="1800" dirty="0" smtClean="0"/>
-              <a:t>.</a:t>
-            </a:r>
-            <a:endParaRPr sz="1800" dirty="0"/>
+              <a:rPr lang="en-US" sz="1650" dirty="0" smtClean="0"/>
+              <a:t>Glutathione levels decrease for two reasons:</a:t>
+            </a:r>
+          </a:p>
+          <a:p>
+            <a:pPr lvl="2" indent="-342900">
+              <a:lnSpc>
+                <a:spcPct val="100000"/>
+              </a:lnSpc>
+              <a:spcBef>
+                <a:spcPts val="0"/>
+              </a:spcBef>
+              <a:buSzPts val="1800"/>
+              <a:buChar char="●"/>
+            </a:pPr>
+            <a:r>
+              <a:rPr lang="en-US" sz="1350" dirty="0" smtClean="0"/>
+              <a:t>Formation of a lens barrier: </a:t>
+            </a:r>
+          </a:p>
+          <a:p>
+            <a:pPr lvl="3" indent="-342900">
+              <a:lnSpc>
+                <a:spcPct val="100000"/>
+              </a:lnSpc>
+              <a:spcBef>
+                <a:spcPts val="0"/>
+              </a:spcBef>
+              <a:buSzPts val="1800"/>
+            </a:pPr>
+            <a:r>
+              <a:rPr lang="en-US" sz="1350" dirty="0" smtClean="0"/>
+              <a:t>At around age 30-50, the nucleus/cortex barrier becomes impermeable to larger molecules.</a:t>
+            </a:r>
+          </a:p>
+          <a:p>
+            <a:pPr lvl="3" indent="-342900">
+              <a:lnSpc>
+                <a:spcPct val="100000"/>
+              </a:lnSpc>
+              <a:spcBef>
+                <a:spcPts val="0"/>
+              </a:spcBef>
+              <a:buSzPts val="1800"/>
+            </a:pPr>
+            <a:r>
+              <a:rPr lang="en-US" sz="1350" dirty="0" smtClean="0"/>
+              <a:t>Glutathione is blocked from the nucleus, and unstable molecules (ROS) are locked inside.</a:t>
+            </a:r>
+          </a:p>
+          <a:p>
+            <a:pPr lvl="2" indent="-342900">
+              <a:lnSpc>
+                <a:spcPct val="100000"/>
+              </a:lnSpc>
+              <a:spcBef>
+                <a:spcPts val="0"/>
+              </a:spcBef>
+              <a:buSzPts val="1800"/>
+              <a:buChar char="●"/>
+            </a:pPr>
+            <a:r>
+              <a:rPr lang="en-US" sz="1350" dirty="0" smtClean="0"/>
+              <a:t>Decreased recycling efficiency:</a:t>
+            </a:r>
+          </a:p>
+          <a:p>
+            <a:pPr lvl="3" indent="-342900">
+              <a:lnSpc>
+                <a:spcPct val="100000"/>
+              </a:lnSpc>
+              <a:spcBef>
+                <a:spcPts val="0"/>
+              </a:spcBef>
+              <a:buSzPts val="1800"/>
+            </a:pPr>
+            <a:r>
+              <a:rPr lang="en-US" sz="1350" dirty="0" smtClean="0"/>
+              <a:t>Glutathione can be reduced (GSH) or oxidized (GSSG); GSH is responsible for antioxidant properties (electron donor)</a:t>
+            </a:r>
+          </a:p>
+          <a:p>
+            <a:pPr lvl="3" indent="-342900">
+              <a:lnSpc>
+                <a:spcPct val="100000"/>
+              </a:lnSpc>
+              <a:spcBef>
+                <a:spcPts val="0"/>
+              </a:spcBef>
+              <a:buSzPts val="1800"/>
+            </a:pPr>
+            <a:r>
+              <a:rPr lang="en-US" sz="1350" dirty="0" smtClean="0"/>
+              <a:t>GSSG is converted to GSH in the presence of </a:t>
+            </a:r>
+            <a:r>
+              <a:rPr lang="en-US" sz="1350" dirty="0" smtClean="0"/>
+              <a:t>glutathione reductase (GR) and NADPH</a:t>
+            </a:r>
+          </a:p>
+          <a:p>
+            <a:pPr lvl="3" indent="-342900">
+              <a:lnSpc>
+                <a:spcPct val="100000"/>
+              </a:lnSpc>
+              <a:spcBef>
+                <a:spcPts val="0"/>
+              </a:spcBef>
+              <a:buSzPts val="1800"/>
+            </a:pPr>
+            <a:r>
+              <a:rPr lang="en-US" sz="1350" dirty="0" smtClean="0"/>
+              <a:t>With age, GR activit</a:t>
+            </a:r>
+            <a:r>
+              <a:rPr lang="en-US" sz="1350" dirty="0" smtClean="0"/>
+              <a:t>y decreases, resulting in buildup of GSSG and decrease of GSH.</a:t>
+            </a:r>
+            <a:endParaRPr lang="en-US" sz="1350" dirty="0" smtClean="0"/>
+          </a:p>
+          <a:p>
+            <a:pPr lvl="3" indent="-342900">
+              <a:lnSpc>
+                <a:spcPct val="100000"/>
+              </a:lnSpc>
+              <a:spcBef>
+                <a:spcPts val="0"/>
+              </a:spcBef>
+              <a:buSzPts val="1800"/>
+            </a:pPr>
+            <a:endParaRPr lang="en-US" sz="1350" dirty="0" smtClean="0"/>
+          </a:p>
+          <a:p>
+            <a:pPr lvl="3" indent="-342900">
+              <a:lnSpc>
+                <a:spcPct val="100000"/>
+              </a:lnSpc>
+              <a:spcBef>
+                <a:spcPts val="0"/>
+              </a:spcBef>
+              <a:buSzPts val="1800"/>
+            </a:pPr>
+            <a:endParaRPr lang="en-US" sz="1350" dirty="0" smtClean="0"/>
+          </a:p>
+          <a:p>
+            <a:pPr lvl="1" indent="-342900">
+              <a:lnSpc>
+                <a:spcPct val="100000"/>
+              </a:lnSpc>
+              <a:spcBef>
+                <a:spcPts val="0"/>
+              </a:spcBef>
+              <a:buSzPts val="1800"/>
+              <a:buChar char="●"/>
+            </a:pPr>
+            <a:endParaRPr lang="en-US" sz="1650" dirty="0" smtClean="0"/>
+          </a:p>
+          <a:p>
+            <a:pPr marL="1028700" lvl="2" indent="0">
+              <a:lnSpc>
+                <a:spcPct val="100000"/>
+              </a:lnSpc>
+              <a:spcBef>
+                <a:spcPts val="0"/>
+              </a:spcBef>
+              <a:buSzPts val="1800"/>
+              <a:buNone/>
+            </a:pPr>
+            <a:endParaRPr sz="1350" dirty="0"/>
           </a:p>
         </p:txBody>
       </p:sp>
     </p:spTree>
+    <p:extLst>
+      <p:ext uri="{BB962C8B-B14F-4D97-AF65-F5344CB8AC3E}">
+        <p14:creationId xmlns:p14="http://schemas.microsoft.com/office/powerpoint/2010/main" val="1564613521"/>
+      </p:ext>
+    </p:extLst>
   </p:cSld>
   <p:clrMapOvr>
     <a:masterClrMapping/>
@@ -6483,8 +6557,8 @@
               <a:buNone/>
             </a:pPr>
             <a:r>
-              <a:rPr lang="en" dirty="0"/>
-              <a:t>Cataracts</a:t>
+              <a:rPr lang="en" dirty="0" smtClean="0"/>
+              <a:t>Cataract</a:t>
             </a:r>
             <a:endParaRPr dirty="0"/>
           </a:p>
@@ -6546,36 +6620,23 @@
             </a:pPr>
             <a:r>
               <a:rPr lang="en-US" sz="1650" dirty="0" smtClean="0"/>
-              <a:t>1: Depletion of glutathione within the lens</a:t>
-            </a:r>
-          </a:p>
-          <a:p>
-            <a:pPr lvl="1" indent="-342900">
-              <a:lnSpc>
-                <a:spcPct val="100000"/>
-              </a:lnSpc>
-              <a:spcBef>
-                <a:spcPts val="0"/>
-              </a:spcBef>
-              <a:buSzPts val="1800"/>
-              <a:buChar char="●"/>
-            </a:pPr>
-            <a:endParaRPr lang="en-US" sz="1650" dirty="0" smtClean="0"/>
-          </a:p>
-          <a:p>
-            <a:pPr lvl="1" indent="-342900">
-              <a:lnSpc>
-                <a:spcPct val="100000"/>
-              </a:lnSpc>
-              <a:spcBef>
-                <a:spcPts val="0"/>
-              </a:spcBef>
-              <a:buSzPts val="1800"/>
-              <a:buChar char="●"/>
-            </a:pPr>
+              <a:t>2: </a:t>
+            </a:r>
+            <a:r>
+              <a:rPr lang="en-US" sz="1650" dirty="0" err="1" smtClean="0"/>
+              <a:t>Desolubilization</a:t>
+            </a:r>
             <a:r>
               <a:rPr lang="en-US" sz="1650" dirty="0" smtClean="0"/>
-              <a:t>Glutathione levels decrease for two reasons:</a:t>
+              <a:t> of </a:t>
+            </a:r>
+            <a:r>
+              <a:rPr lang="en-US" sz="1650" dirty="0" err="1" smtClean="0"/>
+              <a:t>crystallin</a:t>
+            </a:r>
+            <a:r>
+              <a:rPr lang="en-US" sz="1650" dirty="0" smtClean="0"/>
+              <a:t> proteins</a:t>
             </a:r>
           </a:p>
           <a:p>
@@ -6591,7 +6652,15 @@
             </a:pPr>
             <a:r>
               <a:rPr lang="en-US" sz="1350" dirty="0" smtClean="0"/>
-              <a:t>Formation of a lens barrier: </a:t>
+              <a:t>Cells have limited supply of proteins; eventually, </a:t>
+            </a:r>
+            <a:r>
+              <a:rPr lang="en" sz="1400" dirty="0" smtClean="0"/>
+              <a:t>α-crystallin runs </a:t>
+            </a:r>
+            <a:r>
+              <a:rPr lang="en" sz="1400" dirty="0" smtClean="0"/>
+              <a:t>out</a:t>
             </a:r>
           </a:p>
           <a:p>
@@ -6605,8 +6674,37 @@
               <a:buSzPts val="1800"/>
             </a:pPr>
             <a:r>
-              <a:rPr lang="en-US" sz="1350" dirty="0" smtClean="0"/>
-              <a:t>At around age 30-50, the nucleus/cortex barrier becomes impermeable to larger molecules.</a:t>
+              <a:rPr lang="en" sz="1400" dirty="0" smtClean="0"/>
+              <a:t>No active </a:t>
+            </a:r>
+            <a:r>
+              <a:rPr lang="en" sz="1400" dirty="0"/>
+              <a:t>α-crystallin </a:t>
+            </a:r>
+            <a:r>
+              <a:rPr lang="en" sz="1400" dirty="0" smtClean="0"/>
+              <a:t>remains by age 40.</a:t>
+            </a:r>
+            <a:endParaRPr lang="en" sz="1400" dirty="0" smtClean="0"/>
+          </a:p>
+          <a:p>
+            <a:pPr lvl="2" indent="-342900">
+              <a:lnSpc>
+                <a:spcPct val="100000"/>
+              </a:lnSpc>
+              <a:spcBef>
+                <a:spcPts val="0"/>
+              </a:spcBef>
+              <a:buSzPts val="1800"/>
+              <a:buChar char="●"/>
+            </a:pPr>
+            <a:r>
+              <a:rPr lang="en" sz="1400" dirty="0"/>
+              <a:t>Without </a:t>
+            </a:r>
+            <a:r>
+              <a:rPr lang="en" sz="1400" dirty="0" smtClean="0"/>
+              <a:t>α-crystallin, oxidized βγ-crystallins aggregate and desolubilize</a:t>
             </a:r>
           </a:p>
           <a:p>
@@ -6620,10 +6718,40 @@
               <a:buSzPts val="1800"/>
             </a:pPr>
             <a:r>
-              <a:rPr lang="en-US" sz="1350" dirty="0" smtClean="0"/>
-              <a:t>Glutathione is blocked from the nucleus, and unstable molecules (ROS) are locked inside.</a:t>
-            </a:r>
-            <a:endParaRPr lang="en-US" sz="1350" dirty="0" smtClean="0"/>
+              <a:rPr lang="en" sz="1400" dirty="0" smtClean="0"/>
+              <a:t>Damage from reactive oxygen species, which is no longer prevented by antioxidants.</a:t>
+            </a:r>
+          </a:p>
+          <a:p>
+            <a:pPr lvl="3" indent="-342900">
+              <a:lnSpc>
+                <a:spcPct val="100000"/>
+              </a:lnSpc>
+              <a:spcBef>
+                <a:spcPts val="0"/>
+              </a:spcBef>
+              <a:buSzPts val="1800"/>
+            </a:pPr>
+            <a:r>
+              <a:rPr lang="en" sz="1400" dirty="0" smtClean="0"/>
+              <a:t>Protein-protein interactions, especially crosslinking</a:t>
+            </a:r>
+          </a:p>
+          <a:p>
+            <a:pPr lvl="3" indent="-342900">
+              <a:lnSpc>
+                <a:spcPct val="100000"/>
+              </a:lnSpc>
+              <a:spcBef>
+                <a:spcPts val="0"/>
+              </a:spcBef>
+              <a:buSzPts val="1800"/>
+            </a:pPr>
+            <a:r>
+              <a:rPr lang="en" sz="1400" dirty="0" smtClean="0"/>
+              <a:t>Desolubilized aggregates are opaque, forming cataracts.</a:t>
+            </a:r>
+            <a:endParaRPr lang="en" sz="1400" dirty="0"/>
           </a:p>
           <a:p>
             <a:pPr lvl="2" indent="-342900">
@@ -6637,233 +6765,8 @@
               <a:buChar char="●"/>
             </a:pPr>
             <a:r>
-              <a:rPr lang="en-US" sz="1350" dirty="0" smtClean="0"/>
-              <a:t>Decreased recycling efficiency:</a:t>
-            </a:r>
-          </a:p>
-          <a:p>
-            <a:pPr lvl="3" indent="-342900">
-              <a:lnSpc>
-                <a:spcPct val="100000"/>
-              </a:lnSpc>
-              <a:spcBef>
-                <a:spcPts val="0"/>
-              </a:spcBef>
-              <a:buSzPts val="1800"/>
-            </a:pPr>
-            <a:r>
-              <a:rPr lang="en-US" sz="1350" dirty="0" smtClean="0"/>
-              <a:t>Glutathione can be reduced (GSH) or oxidized (GSSG); GSH is responsible for antioxidant properties (electron donor)</a:t>
-            </a:r>
-          </a:p>
-          <a:p>
-            <a:pPr lvl="3" indent="-342900">
-              <a:lnSpc>
-                <a:spcPct val="100000"/>
-              </a:lnSpc>
-              <a:spcBef>
-                <a:spcPts val="0"/>
-              </a:spcBef>
-              <a:buSzPts val="1800"/>
-            </a:pPr>
-            <a:r>
-              <a:rPr lang="en-US" sz="1350" dirty="0" smtClean="0"/>
-              <a:t>GSSG is converted to GSH in the presence of NADPH</a:t>
-            </a:r>
-          </a:p>
-          <a:p>
-            <a:pPr lvl="3" indent="-342900">
-              <a:lnSpc>
-                <a:spcPct val="100000"/>
-              </a:lnSpc>
-              <a:spcBef>
-                <a:spcPts val="0"/>
-              </a:spcBef>
-              <a:buSzPts val="1800"/>
-            </a:pPr>
-            <a:endParaRPr lang="en-US" sz="1350" dirty="0" smtClean="0"/>
-          </a:p>
-          <a:p>
-            <a:pPr lvl="3" indent="-342900">
-              <a:lnSpc>
-                <a:spcPct val="100000"/>
-              </a:lnSpc>
-              <a:spcBef>
-                <a:spcPts val="0"/>
-              </a:spcBef>
-              <a:buSzPts val="1800"/>
-            </a:pPr>
-            <a:endParaRPr lang="en-US" sz="1350" dirty="0" smtClean="0"/>
-          </a:p>
-          <a:p>
-            <a:pPr lvl="1" indent="-342900">
-              <a:lnSpc>
-                <a:spcPct val="100000"/>
-              </a:lnSpc>
-              <a:spcBef>
-                <a:spcPts val="0"/>
-              </a:spcBef>
-              <a:buSzPts val="1800"/>
-              <a:buChar char="●"/>
-            </a:pPr>
-            <a:endParaRPr lang="en-US" sz="1650" dirty="0" smtClean="0"/>
-          </a:p>
-          <a:p>
-            <a:pPr marL="1028700" lvl="2" indent="0">
-              <a:lnSpc>
-                <a:spcPct val="100000"/>
-              </a:lnSpc>
-              <a:spcBef>
-                <a:spcPts val="0"/>
-              </a:spcBef>
-              <a:buSzPts val="1800"/>
-              <a:buNone/>
-            </a:pPr>
-            <a:endParaRPr sz="1350" dirty="0"/>
-          </a:p>
-        </p:txBody>
-      </p:sp>
-    </p:spTree>
-    <p:extLst>
-      <p:ext uri="{BB962C8B-B14F-4D97-AF65-F5344CB8AC3E}">
-        <p14:creationId xmlns:p14="http://schemas.microsoft.com/office/powerpoint/2010/main" val="1564613521"/>
-      </p:ext>
-    </p:extLst>
-  </p:cSld>
-  <p:clrMapOvr>
-    <a:masterClrMapping/>
-  </p:clrMapOvr>
-</p:sld>
-</file>
-
-<file path=ppt/slides/slide6.xml><?xml version="1.0" encoding="utf-8"?>
-<p:sld xmlns:a="http://schemas.openxmlformats.org/drawingml/2006/main" xmlns:r="http://schemas.openxmlformats.org/officeDocument/2006/relationships" xmlns:p="http://schemas.openxmlformats.org/presentationml/2006/main">
-  <p:cSld>
-    <p:spTree>
-      <p:nvGrpSpPr>
-        <p:cNvPr id="1" name="Shape 78"/>
-        <p:cNvGrpSpPr/>
-        <p:nvPr/>
-      </p:nvGrpSpPr>
-      <p:grpSpPr>
-        <a:xfrm>
-          <a:off x="0" y="0"/>
-          <a:ext cx="0" cy="0"/>
-          <a:chOff x="0" y="0"/>
-          <a:chExt cx="0" cy="0"/>
-        </a:xfrm>
-      </p:grpSpPr>
-      <p:sp>
-        <p:nvSpPr>
-          <p:cNvPr id="79" name="Google Shape;79;p16"/>
-          <p:cNvSpPr txBox="1">
-            <a:spLocks noGrp="1"/>
-          </p:cNvSpPr>
-          <p:nvPr>
-            <p:ph type="title"/>
-          </p:nvPr>
-        </p:nvSpPr>
-        <p:spPr>
-          <a:prstGeom prst="rect">
-            <a:avLst/>
-          </a:prstGeom>
-        </p:spPr>
-        <p:txBody>
-          <a:bodyPr spcFirstLastPara="1" wrap="square" lIns="91425" tIns="91425" rIns="91425" bIns="91425" anchor="t" anchorCtr="0">
-            <a:noAutofit/>
-          </a:bodyPr>
-          <a:lstStyle/>
-          <a:p>
-            <a:pPr marL="0" lvl="0" indent="0" algn="l" rtl="0">
-              <a:spcBef>
-                <a:spcPts val="0"/>
-              </a:spcBef>
-              <a:spcAft>
-                <a:spcPts val="0"/>
-              </a:spcAft>
-              <a:buNone/>
-            </a:pPr>
-            <a:r>
-              <a:rPr lang="en" dirty="0"/>
-              <a:t>Cataracts</a:t>
-            </a:r>
-            <a:endParaRPr dirty="0"/>
-          </a:p>
-        </p:txBody>
-      </p:sp>
-      <p:sp>
-        <p:nvSpPr>
-          <p:cNvPr id="80" name="Google Shape;80;p16"/>
-          <p:cNvSpPr txBox="1">
-            <a:spLocks noGrp="1"/>
-          </p:cNvSpPr>
-          <p:nvPr>
-            <p:ph type="body" idx="1"/>
-          </p:nvPr>
-        </p:nvSpPr>
-        <p:spPr>
-          <a:xfrm>
-            <a:off x="311700" y="1311501"/>
-            <a:ext cx="8520600" cy="3416400"/>
-          </a:xfrm>
-          <a:prstGeom prst="rect">
-            <a:avLst/>
-          </a:prstGeom>
-        </p:spPr>
-        <p:txBody>
-          <a:bodyPr spcFirstLastPara="1" wrap="square" lIns="91425" tIns="91425" rIns="91425" bIns="91425" anchor="t" anchorCtr="0">
-            <a:noAutofit/>
-          </a:bodyPr>
-          <a:lstStyle/>
-          <a:p>
-            <a:pPr marL="457200" lvl="0" indent="-342900" algn="l" rtl="0">
-              <a:lnSpc>
-                <a:spcPct val="100000"/>
-              </a:lnSpc>
-              <a:spcBef>
-                <a:spcPts val="0"/>
-              </a:spcBef>
-              <a:spcAft>
-                <a:spcPts val="0"/>
-              </a:spcAft>
-              <a:buSzPts val="1800"/>
-              <a:buChar char="●"/>
-            </a:pPr>
-            <a:r>
-              <a:rPr lang="en-US" sz="1800" dirty="0" smtClean="0"/>
-              <a:t>There are 2 main factors that lead to cataract:</a:t>
-            </a:r>
-          </a:p>
-          <a:p>
-            <a:pPr lvl="1" indent="-342900">
-              <a:lnSpc>
-                <a:spcPct val="100000"/>
-              </a:lnSpc>
-              <a:spcBef>
-                <a:spcPts val="0"/>
-              </a:spcBef>
-              <a:buSzPts val="1800"/>
-              <a:buChar char="●"/>
-            </a:pPr>
-            <a:r>
-              <a:rPr lang="en-US" sz="1650" dirty="0" smtClean="0"/>
-              <a:t>2: </a:t>
-            </a:r>
-            <a:r>
-              <a:rPr lang="en-US" sz="1650" dirty="0" err="1" smtClean="0"/>
-              <a:t>Desolubilization</a:t>
-            </a:r>
-            <a:r>
-              <a:rPr lang="en-US" sz="1650" dirty="0" smtClean="0"/>
-              <a:t> of </a:t>
-            </a:r>
-            <a:r>
-              <a:rPr lang="en-US" sz="1650" dirty="0" err="1" smtClean="0"/>
-              <a:t>crystallin</a:t>
-            </a:r>
-            <a:r>
-              <a:rPr lang="en-US" sz="1650" dirty="0" smtClean="0"/>
-              <a:t> proteins</a:t>
+              <a:rPr lang="en" sz="1400" dirty="0" smtClean="0"/>
+              <a:t> </a:t>
             </a:r>
           </a:p>
           <a:p>
@@ -6877,14 +6780,20 @@
               <a:buSzPts val="1800"/>
               <a:buChar char="●"/>
             </a:pPr>
-            <a:r>
-              <a:rPr lang="en-US" sz="1350" dirty="0" smtClean="0"/>
-              <a:t>Cells have limited supply of proteins; eventually, </a:t>
-            </a:r>
-            <a:r>
-              <a:rPr lang="en" sz="1400" dirty="0" smtClean="0"/>
-              <a:t>α-crystallin runs out</a:t>
-            </a:r>
+            <a:endParaRPr lang="en" sz="1400" dirty="0" smtClean="0"/>
+          </a:p>
+          <a:p>
+            <a:pPr lvl="2" indent="-342900">
+              <a:lnSpc>
+                <a:spcPct val="100000"/>
+              </a:lnSpc>
+              <a:spcBef>
+                <a:spcPts val="0"/>
+              </a:spcBef>
+              <a:buSzPts val="1800"/>
+              <a:buChar char="●"/>
+            </a:pPr>
+            <a:endParaRPr lang="en" sz="1400" dirty="0" smtClean="0"/>
           </a:p>
           <a:p>
             <a:pPr lvl="2" indent="-342900">
@@ -6914,7 +6823,7 @@
 </p:sld>
 </file>
 
-<file path=ppt/slides/slide7.xml><?xml version="1.0" encoding="utf-8"?>
+<file path=ppt/slides/slide6.xml><?xml version="1.0" encoding="utf-8"?>
 <p:sld xmlns:a="http://schemas.openxmlformats.org/drawingml/2006/main" xmlns:r="http://schemas.openxmlformats.org/officeDocument/2006/relationships" xmlns:p="http://schemas.openxmlformats.org/presentationml/2006/main">
   <p:cSld>
     <p:spTree>
@@ -7051,7 +6960,7 @@
 </p:sld>
 </file>
 
-<file path=ppt/slides/slide8.xml><?xml version="1.0" encoding="utf-8"?>
+<file path=ppt/slides/slide7.xml><?xml version="1.0" encoding="utf-8"?>
 <p:sld xmlns:a="http://schemas.openxmlformats.org/drawingml/2006/main" xmlns:r="http://schemas.openxmlformats.org/officeDocument/2006/relationships" xmlns:p="http://schemas.openxmlformats.org/presentationml/2006/main">
   <p:cSld>
     <p:spTree>

</xml_diff>

<commit_message>
work on other computer
</commit_message>
<xml_diff>
--- a/Cataract.pptx
+++ b/Cataract.pptx
@@ -1557,7 +1557,7 @@
           <a:p>
             <a:fld id="{4BDF68E2-58F2-4D09-BE8B-E3BD06533059}" type="datetimeFigureOut">
               <a:rPr lang="en-US" dirty="0"/>
-              <a:t>7/18/2019</a:t>
+              <a:t>7/22/2019</a:t>
             </a:fld>
             <a:endParaRPr lang="en-US" dirty="0"/>
           </a:p>
@@ -1775,7 +1775,7 @@
           <a:p>
             <a:fld id="{2E2D6473-DF6D-4702-B328-E0DD40540A4E}" type="datetimeFigureOut">
               <a:rPr lang="en-US" dirty="0"/>
-              <a:t>7/18/2019</a:t>
+              <a:t>7/22/2019</a:t>
             </a:fld>
             <a:endParaRPr lang="en-US" dirty="0"/>
           </a:p>
@@ -2041,7 +2041,7 @@
           <a:p>
             <a:fld id="{E26F7E3A-B166-407D-9866-32884E7D5B37}" type="datetimeFigureOut">
               <a:rPr lang="en-US" dirty="0"/>
-              <a:t>7/18/2019</a:t>
+              <a:t>7/22/2019</a:t>
             </a:fld>
             <a:endParaRPr lang="en-US" dirty="0"/>
           </a:p>
@@ -2592,7 +2592,7 @@
           <a:p>
             <a:fld id="{528FC5F6-F338-4AE4-BB23-26385BCFC423}" type="datetimeFigureOut">
               <a:rPr lang="en-US" dirty="0"/>
-              <a:t>7/18/2019</a:t>
+              <a:t>7/22/2019</a:t>
             </a:fld>
             <a:endParaRPr lang="en-US" dirty="0"/>
           </a:p>
@@ -2945,7 +2945,7 @@
           <a:p>
             <a:fld id="{20EBB0C4-6273-4C6E-B9BD-2EDC30F1CD52}" type="datetimeFigureOut">
               <a:rPr lang="en-US" dirty="0"/>
-              <a:t>7/18/2019</a:t>
+              <a:t>7/22/2019</a:t>
             </a:fld>
             <a:endParaRPr lang="en-US" dirty="0"/>
           </a:p>
@@ -3230,7 +3230,7 @@
           <a:p>
             <a:fld id="{19AB4D41-86C1-4908-B66A-0B50CEB3BF29}" type="datetimeFigureOut">
               <a:rPr lang="en-US" dirty="0"/>
-              <a:t>7/18/2019</a:t>
+              <a:t>7/22/2019</a:t>
             </a:fld>
             <a:endParaRPr lang="en-US" dirty="0"/>
           </a:p>
@@ -3619,7 +3619,7 @@
           <a:p>
             <a:fld id="{E6426E2C-56C1-4E0D-A793-0088A7FDD37E}" type="datetimeFigureOut">
               <a:rPr lang="en-US" dirty="0"/>
-              <a:t>7/18/2019</a:t>
+              <a:t>7/22/2019</a:t>
             </a:fld>
             <a:endParaRPr lang="en-US" dirty="0"/>
           </a:p>
@@ -3747,7 +3747,7 @@
           <a:p>
             <a:fld id="{C8C39B41-D8B5-4052-B551-9B5525EAA8B6}" type="datetimeFigureOut">
               <a:rPr lang="en-US" dirty="0"/>
-              <a:t>7/18/2019</a:t>
+              <a:t>7/22/2019</a:t>
             </a:fld>
             <a:endParaRPr lang="en-US" dirty="0"/>
           </a:p>
@@ -3928,7 +3928,7 @@
           <a:p>
             <a:fld id="{4D94136C-8742-45B2-AF27-D93DF72833A9}" type="datetimeFigureOut">
               <a:rPr lang="en-US" dirty="0"/>
-              <a:t>7/18/2019</a:t>
+              <a:t>7/22/2019</a:t>
             </a:fld>
             <a:endParaRPr lang="en-US" dirty="0"/>
           </a:p>
@@ -4291,7 +4291,7 @@
           <a:p>
             <a:fld id="{32ABBEA6-7C60-4B02-AE87-00D78D8422AF}" type="datetimeFigureOut">
               <a:rPr lang="en-US" dirty="0"/>
-              <a:t>7/18/2019</a:t>
+              <a:t>7/22/2019</a:t>
             </a:fld>
             <a:endParaRPr lang="en-US" dirty="0"/>
           </a:p>
@@ -4683,7 +4683,7 @@
           <a:p>
             <a:fld id="{C9CAD897-D46E-4AD2-BD9B-49DD3E640873}" type="datetimeFigureOut">
               <a:rPr lang="en-US" dirty="0"/>
-              <a:t>7/18/2019</a:t>
+              <a:t>7/22/2019</a:t>
             </a:fld>
             <a:endParaRPr lang="en-US" dirty="0"/>
           </a:p>
@@ -4980,7 +4980,7 @@
           <a:p>
             <a:fld id="{98624D31-43A5-475A-80CF-332C9F6DCF35}" type="datetimeFigureOut">
               <a:rPr lang="en-US" dirty="0"/>
-              <a:t>7/18/2019</a:t>
+              <a:t>7/22/2019</a:t>
             </a:fld>
             <a:endParaRPr lang="en-US" dirty="0"/>
           </a:p>
@@ -5620,8 +5620,8 @@
         </p:nvSpPr>
         <p:spPr>
           <a:xfrm>
-            <a:off x="7393097" y="1284226"/>
-            <a:ext cx="1181059" cy="1226292"/>
+            <a:off x="7349577" y="1304624"/>
+            <a:ext cx="1238330" cy="1177319"/>
           </a:xfrm>
           <a:prstGeom prst="ellipse">
             <a:avLst/>
@@ -5815,6 +5815,34 @@
           </a:p>
         </p:txBody>
       </p:sp>
+      <p:pic>
+        <p:nvPicPr>
+          <p:cNvPr id="65" name="Google Shape;65;p14"/>
+          <p:cNvPicPr preferRelativeResize="0"/>
+          <p:nvPr/>
+        </p:nvPicPr>
+        <p:blipFill>
+          <a:blip r:embed="rId3">
+            <a:alphaModFix/>
+          </a:blip>
+          <a:stretch>
+            <a:fillRect/>
+          </a:stretch>
+        </p:blipFill>
+        <p:spPr>
+          <a:xfrm>
+            <a:off x="6411300" y="2743842"/>
+            <a:ext cx="2646549" cy="1984950"/>
+          </a:xfrm>
+          <a:prstGeom prst="rect">
+            <a:avLst/>
+          </a:prstGeom>
+          <a:noFill/>
+          <a:ln>
+            <a:noFill/>
+          </a:ln>
+        </p:spPr>
+      </p:pic>
       <p:grpSp>
         <p:nvGrpSpPr>
           <p:cNvPr id="62" name="Google Shape;62;p14"/>
@@ -5836,7 +5864,7 @@
             <p:nvPr/>
           </p:nvPicPr>
           <p:blipFill rotWithShape="1">
-            <a:blip r:embed="rId3">
+            <a:blip r:embed="rId4">
               <a:alphaModFix/>
             </a:blip>
             <a:srcRect l="17300" r="18645"/>
@@ -5899,34 +5927,6 @@
           </p:txBody>
         </p:sp>
       </p:grpSp>
-      <p:pic>
-        <p:nvPicPr>
-          <p:cNvPr id="65" name="Google Shape;65;p14"/>
-          <p:cNvPicPr preferRelativeResize="0"/>
-          <p:nvPr/>
-        </p:nvPicPr>
-        <p:blipFill>
-          <a:blip r:embed="rId4">
-            <a:alphaModFix/>
-          </a:blip>
-          <a:stretch>
-            <a:fillRect/>
-          </a:stretch>
-        </p:blipFill>
-        <p:spPr>
-          <a:xfrm>
-            <a:off x="6411300" y="2743842"/>
-            <a:ext cx="2646549" cy="1984950"/>
-          </a:xfrm>
-          <a:prstGeom prst="rect">
-            <a:avLst/>
-          </a:prstGeom>
-          <a:noFill/>
-          <a:ln>
-            <a:noFill/>
-          </a:ln>
-        </p:spPr>
-      </p:pic>
     </p:spTree>
   </p:cSld>
   <p:clrMapOvr>
@@ -6002,8 +6002,8 @@
         </p:nvSpPr>
         <p:spPr>
           <a:xfrm>
-            <a:off x="311700" y="1311501"/>
-            <a:ext cx="5656500" cy="3416400"/>
+            <a:off x="311699" y="1311501"/>
+            <a:ext cx="5751325" cy="3416400"/>
           </a:xfrm>
           <a:prstGeom prst="rect">
             <a:avLst/>
@@ -6145,9 +6145,36 @@
             </a:r>
             <a:r>
               <a:rPr lang="en" sz="1800" dirty="0"/>
-              <a:t>(GSH): Anti-oxidant, prevents oxidation of the crystallins.</a:t>
-            </a:r>
-            <a:endParaRPr sz="1800" dirty="0"/>
+              <a:t>(GSH): Anti-oxidant, prevents oxidation of the crystallins</a:t>
+            </a:r>
+            <a:r>
+              <a:rPr lang="en" sz="1800" dirty="0" smtClean="0"/>
+              <a:t>.</a:t>
+            </a:r>
+          </a:p>
+          <a:p>
+            <a:pPr lvl="1" indent="-342900">
+              <a:spcBef>
+                <a:spcPts val="0"/>
+              </a:spcBef>
+              <a:buSzPts val="1800"/>
+              <a:buChar char="●"/>
+            </a:pPr>
+            <a:r>
+              <a:rPr lang="en" dirty="0" smtClean="0"/>
+              <a:t>Encoded by GSTM1, GSTT1 genes</a:t>
+            </a:r>
+            <a:endParaRPr lang="en" dirty="0" smtClean="0"/>
+          </a:p>
+          <a:p>
+            <a:pPr lvl="1" indent="-342900">
+              <a:spcBef>
+                <a:spcPts val="0"/>
+              </a:spcBef>
+              <a:buSzPts val="1800"/>
+              <a:buChar char="●"/>
+            </a:pPr>
+            <a:endParaRPr sz="1650" dirty="0"/>
           </a:p>
         </p:txBody>
       </p:sp>
@@ -6684,8 +6711,25 @@
             </a:r>
             <a:r>
               <a:rPr lang="en-US" sz="1650" dirty="0" smtClean="0"/>
-              <a:t> proteins</a:t>
-            </a:r>
+              <a:t> </a:t>
+            </a:r>
+            <a:r>
+              <a:rPr lang="en-US" sz="1650" dirty="0" smtClean="0"/>
+              <a:t>proteins</a:t>
+            </a:r>
+          </a:p>
+          <a:p>
+            <a:pPr marL="571500" lvl="1" indent="0">
+              <a:lnSpc>
+                <a:spcPct val="100000"/>
+              </a:lnSpc>
+              <a:spcBef>
+                <a:spcPts val="0"/>
+              </a:spcBef>
+              <a:buSzPts val="1800"/>
+              <a:buNone/>
+            </a:pPr>
+            <a:endParaRPr lang="en-US" sz="1650" dirty="0" smtClean="0"/>
           </a:p>
           <a:p>
             <a:pPr lvl="2" indent="-342900">

</xml_diff>

<commit_message>
work on presentation and DAVID analysis
</commit_message>
<xml_diff>
--- a/Cataract.pptx
+++ b/Cataract.pptx
@@ -5,7 +5,7 @@
     <p:sldMasterId id="2147483660" r:id="rId1"/>
   </p:sldMasterIdLst>
   <p:notesMasterIdLst>
-    <p:notesMasterId r:id="rId9"/>
+    <p:notesMasterId r:id="rId12"/>
   </p:notesMasterIdLst>
   <p:sldIdLst>
     <p:sldId id="257" r:id="rId2"/>
@@ -14,7 +14,10 @@
     <p:sldId id="259" r:id="rId5"/>
     <p:sldId id="263" r:id="rId6"/>
     <p:sldId id="261" r:id="rId7"/>
-    <p:sldId id="262" r:id="rId8"/>
+    <p:sldId id="266" r:id="rId8"/>
+    <p:sldId id="267" r:id="rId9"/>
+    <p:sldId id="262" r:id="rId10"/>
+    <p:sldId id="268" r:id="rId11"/>
   </p:sldIdLst>
   <p:sldSz cx="12192000" cy="6858000"/>
   <p:notesSz cx="6858000" cy="9144000"/>
@@ -132,11 +135,14 @@
         <p14:section name="Methods" id="{2B02DADB-1D05-47E6-8432-8628A2D759C9}">
           <p14:sldIdLst>
             <p14:sldId id="261"/>
+            <p14:sldId id="266"/>
+            <p14:sldId id="267"/>
           </p14:sldIdLst>
         </p14:section>
         <p14:section name="Results" id="{6F96C0F7-2CBF-41E1-A440-B68F9DBAA433}">
           <p14:sldIdLst>
             <p14:sldId id="262"/>
+            <p14:sldId id="268"/>
           </p14:sldIdLst>
         </p14:section>
       </p14:sectionLst>
@@ -230,7 +236,7 @@
           <a:p>
             <a:fld id="{5AB92EA7-858F-4B44-B015-877BFE5925AB}" type="datetimeFigureOut">
               <a:rPr lang="en-US" smtClean="0"/>
-              <a:t>7/25/2019</a:t>
+              <a:t>7/26/2019</a:t>
             </a:fld>
             <a:endParaRPr lang="en-US"/>
           </a:p>
@@ -1180,7 +1186,7 @@
           <a:p>
             <a:fld id="{809CEF2D-C839-41A0-817E-03595D1CB546}" type="datetimeFigureOut">
               <a:rPr lang="en-US" smtClean="0"/>
-              <a:t>7/25/2019</a:t>
+              <a:t>7/26/2019</a:t>
             </a:fld>
             <a:endParaRPr lang="en-US"/>
           </a:p>
@@ -1388,7 +1394,7 @@
           <a:p>
             <a:fld id="{809CEF2D-C839-41A0-817E-03595D1CB546}" type="datetimeFigureOut">
               <a:rPr lang="en-US" smtClean="0"/>
-              <a:t>7/25/2019</a:t>
+              <a:t>7/26/2019</a:t>
             </a:fld>
             <a:endParaRPr lang="en-US"/>
           </a:p>
@@ -1644,7 +1650,7 @@
           <a:p>
             <a:fld id="{809CEF2D-C839-41A0-817E-03595D1CB546}" type="datetimeFigureOut">
               <a:rPr lang="en-US" smtClean="0"/>
-              <a:t>7/25/2019</a:t>
+              <a:t>7/26/2019</a:t>
             </a:fld>
             <a:endParaRPr lang="en-US"/>
           </a:p>
@@ -2064,6 +2070,187 @@
 </p:sldLayout>
 </file>
 
+<file path=ppt/slideLayouts/slideLayout13.xml><?xml version="1.0" encoding="utf-8"?>
+<p:sldLayout xmlns:a="http://schemas.openxmlformats.org/drawingml/2006/main" xmlns:r="http://schemas.openxmlformats.org/officeDocument/2006/relationships" xmlns:p="http://schemas.openxmlformats.org/presentationml/2006/main" preserve="1" userDrawn="1">
+  <p:cSld name="Custom Layout">
+    <p:spTree>
+      <p:nvGrpSpPr>
+        <p:cNvPr id="1" name=""/>
+        <p:cNvGrpSpPr/>
+        <p:nvPr/>
+      </p:nvGrpSpPr>
+      <p:grpSpPr>
+        <a:xfrm>
+          <a:off x="0" y="0"/>
+          <a:ext cx="0" cy="0"/>
+          <a:chOff x="0" y="0"/>
+          <a:chExt cx="0" cy="0"/>
+        </a:xfrm>
+      </p:grpSpPr>
+      <p:sp>
+        <p:nvSpPr>
+          <p:cNvPr id="3" name="Date Placeholder 2"/>
+          <p:cNvSpPr>
+            <a:spLocks noGrp="1"/>
+          </p:cNvSpPr>
+          <p:nvPr>
+            <p:ph type="dt" sz="half" idx="10"/>
+          </p:nvPr>
+        </p:nvSpPr>
+        <p:spPr/>
+        <p:txBody>
+          <a:bodyPr/>
+          <a:lstStyle/>
+          <a:p>
+            <a:fld id="{809CEF2D-C839-41A0-817E-03595D1CB546}" type="datetimeFigureOut">
+              <a:rPr lang="en-US" smtClean="0"/>
+              <a:t>7/26/2019</a:t>
+            </a:fld>
+            <a:endParaRPr lang="en-US"/>
+          </a:p>
+        </p:txBody>
+      </p:sp>
+      <p:sp>
+        <p:nvSpPr>
+          <p:cNvPr id="4" name="Footer Placeholder 3"/>
+          <p:cNvSpPr>
+            <a:spLocks noGrp="1"/>
+          </p:cNvSpPr>
+          <p:nvPr>
+            <p:ph type="ftr" sz="quarter" idx="11"/>
+          </p:nvPr>
+        </p:nvSpPr>
+        <p:spPr/>
+        <p:txBody>
+          <a:bodyPr/>
+          <a:lstStyle/>
+          <a:p>
+            <a:endParaRPr lang="en-US"/>
+          </a:p>
+        </p:txBody>
+      </p:sp>
+      <p:sp>
+        <p:nvSpPr>
+          <p:cNvPr id="5" name="Slide Number Placeholder 4"/>
+          <p:cNvSpPr>
+            <a:spLocks noGrp="1"/>
+          </p:cNvSpPr>
+          <p:nvPr>
+            <p:ph type="sldNum" sz="quarter" idx="12"/>
+          </p:nvPr>
+        </p:nvSpPr>
+        <p:spPr/>
+        <p:txBody>
+          <a:bodyPr/>
+          <a:lstStyle/>
+          <a:p>
+            <a:fld id="{8F1AC9B5-9543-4447-B896-CFFB2C6D7835}" type="slidenum">
+              <a:rPr lang="en-US" smtClean="0"/>
+              <a:t>‹#›</a:t>
+            </a:fld>
+            <a:endParaRPr lang="en-US"/>
+          </a:p>
+        </p:txBody>
+      </p:sp>
+      <p:sp>
+        <p:nvSpPr>
+          <p:cNvPr id="6" name="Google Shape;71;p15"/>
+          <p:cNvSpPr txBox="1">
+            <a:spLocks noGrp="1"/>
+          </p:cNvSpPr>
+          <p:nvPr>
+            <p:ph type="title"/>
+          </p:nvPr>
+        </p:nvSpPr>
+        <p:spPr>
+          <a:xfrm>
+            <a:off x="1097280" y="593367"/>
+            <a:ext cx="10058400" cy="763600"/>
+          </a:xfrm>
+          <a:prstGeom prst="rect">
+            <a:avLst/>
+          </a:prstGeom>
+        </p:spPr>
+        <p:txBody>
+          <a:bodyPr spcFirstLastPara="1" vert="horz" wrap="square" lIns="121900" tIns="121900" rIns="121900" bIns="121900" rtlCol="0" anchor="t" anchorCtr="0">
+            <a:noAutofit/>
+          </a:bodyPr>
+          <a:lstStyle/>
+          <a:p>
+            <a:endParaRPr dirty="0"/>
+          </a:p>
+        </p:txBody>
+      </p:sp>
+      <p:sp>
+        <p:nvSpPr>
+          <p:cNvPr id="8" name="Content Placeholder 2"/>
+          <p:cNvSpPr>
+            <a:spLocks noGrp="1"/>
+          </p:cNvSpPr>
+          <p:nvPr>
+            <p:ph idx="13"/>
+          </p:nvPr>
+        </p:nvSpPr>
+        <p:spPr>
+          <a:xfrm>
+            <a:off x="1097280" y="1845734"/>
+            <a:ext cx="10058400" cy="4023360"/>
+          </a:xfrm>
+        </p:spPr>
+        <p:txBody>
+          <a:bodyPr/>
+          <a:lstStyle/>
+          <a:p>
+            <a:pPr lvl="0"/>
+            <a:r>
+              <a:rPr lang="en-US" dirty="0" smtClean="0"/>
+              <a:t>Edit Master text styles</a:t>
+            </a:r>
+          </a:p>
+          <a:p>
+            <a:pPr lvl="1"/>
+            <a:r>
+              <a:rPr lang="en-US" dirty="0" smtClean="0"/>
+              <a:t>Second level</a:t>
+            </a:r>
+          </a:p>
+          <a:p>
+            <a:pPr lvl="2"/>
+            <a:r>
+              <a:rPr lang="en-US" dirty="0" smtClean="0"/>
+              <a:t>Third level</a:t>
+            </a:r>
+          </a:p>
+          <a:p>
+            <a:pPr lvl="3"/>
+            <a:r>
+              <a:rPr lang="en-US" dirty="0" smtClean="0"/>
+              <a:t>Fourth level</a:t>
+            </a:r>
+          </a:p>
+          <a:p>
+            <a:pPr lvl="4"/>
+            <a:r>
+              <a:rPr lang="en-US" dirty="0" smtClean="0"/>
+              <a:t>Fifth level</a:t>
+            </a:r>
+            <a:endParaRPr lang="en-US" dirty="0"/>
+          </a:p>
+        </p:txBody>
+      </p:sp>
+    </p:spTree>
+    <p:extLst>
+      <p:ext uri="{BB962C8B-B14F-4D97-AF65-F5344CB8AC3E}">
+        <p14:creationId xmlns:p14="http://schemas.microsoft.com/office/powerpoint/2010/main" val="2003063239"/>
+      </p:ext>
+    </p:extLst>
+  </p:cSld>
+  <p:clrMapOvr>
+    <a:masterClrMapping/>
+  </p:clrMapOvr>
+</p:sldLayout>
+</file>
+
 <file path=ppt/slideLayouts/slideLayout2.xml><?xml version="1.0" encoding="utf-8"?>
 <p:sldLayout xmlns:a="http://schemas.openxmlformats.org/drawingml/2006/main" xmlns:r="http://schemas.openxmlformats.org/officeDocument/2006/relationships" xmlns:p="http://schemas.openxmlformats.org/presentationml/2006/main" type="obj" preserve="1">
   <p:cSld name="Title and Content">
@@ -2125,35 +2312,35 @@
           <a:p>
             <a:pPr lvl="0"/>
             <a:r>
-              <a:rPr lang="en-US" smtClean="0"/>
+              <a:rPr lang="en-US" dirty="0" smtClean="0"/>
               <a:t>Edit Master text styles</a:t>
             </a:r>
           </a:p>
           <a:p>
             <a:pPr lvl="1"/>
             <a:r>
-              <a:rPr lang="en-US" smtClean="0"/>
+              <a:rPr lang="en-US" dirty="0" smtClean="0"/>
               <a:t>Second level</a:t>
             </a:r>
           </a:p>
           <a:p>
             <a:pPr lvl="2"/>
             <a:r>
-              <a:rPr lang="en-US" smtClean="0"/>
+              <a:rPr lang="en-US" dirty="0" smtClean="0"/>
               <a:t>Third level</a:t>
             </a:r>
           </a:p>
           <a:p>
             <a:pPr lvl="3"/>
             <a:r>
-              <a:rPr lang="en-US" smtClean="0"/>
+              <a:rPr lang="en-US" dirty="0" smtClean="0"/>
               <a:t>Fourth level</a:t>
             </a:r>
           </a:p>
           <a:p>
             <a:pPr lvl="4"/>
             <a:r>
-              <a:rPr lang="en-US" smtClean="0"/>
+              <a:rPr lang="en-US" dirty="0" smtClean="0"/>
               <a:t>Fifth level</a:t>
             </a:r>
             <a:endParaRPr lang="en-US" dirty="0"/>
@@ -2177,7 +2364,7 @@
           <a:p>
             <a:fld id="{809CEF2D-C839-41A0-817E-03595D1CB546}" type="datetimeFigureOut">
               <a:rPr lang="en-US" smtClean="0"/>
-              <a:t>7/25/2019</a:t>
+              <a:t>7/26/2019</a:t>
             </a:fld>
             <a:endParaRPr lang="en-US"/>
           </a:p>
@@ -2520,7 +2707,7 @@
           <a:p>
             <a:fld id="{809CEF2D-C839-41A0-817E-03595D1CB546}" type="datetimeFigureOut">
               <a:rPr lang="en-US" smtClean="0"/>
-              <a:t>7/25/2019</a:t>
+              <a:t>7/26/2019</a:t>
             </a:fld>
             <a:endParaRPr lang="en-US"/>
           </a:p>
@@ -2795,7 +2982,7 @@
           <a:p>
             <a:fld id="{809CEF2D-C839-41A0-817E-03595D1CB546}" type="datetimeFigureOut">
               <a:rPr lang="en-US" smtClean="0"/>
-              <a:t>7/25/2019</a:t>
+              <a:t>7/26/2019</a:t>
             </a:fld>
             <a:endParaRPr lang="en-US"/>
           </a:p>
@@ -3174,7 +3361,7 @@
           <a:p>
             <a:fld id="{809CEF2D-C839-41A0-817E-03595D1CB546}" type="datetimeFigureOut">
               <a:rPr lang="en-US" smtClean="0"/>
-              <a:t>7/25/2019</a:t>
+              <a:t>7/26/2019</a:t>
             </a:fld>
             <a:endParaRPr lang="en-US"/>
           </a:p>
@@ -3292,7 +3479,7 @@
           <a:p>
             <a:fld id="{809CEF2D-C839-41A0-817E-03595D1CB546}" type="datetimeFigureOut">
               <a:rPr lang="en-US" smtClean="0"/>
-              <a:t>7/25/2019</a:t>
+              <a:t>7/26/2019</a:t>
             </a:fld>
             <a:endParaRPr lang="en-US"/>
           </a:p>
@@ -3463,7 +3650,7 @@
           <a:p>
             <a:fld id="{809CEF2D-C839-41A0-817E-03595D1CB546}" type="datetimeFigureOut">
               <a:rPr lang="en-US" smtClean="0"/>
-              <a:t>7/25/2019</a:t>
+              <a:t>7/26/2019</a:t>
             </a:fld>
             <a:endParaRPr lang="en-US"/>
           </a:p>
@@ -3685,35 +3872,35 @@
           <a:p>
             <a:pPr lvl="0"/>
             <a:r>
-              <a:rPr lang="en-US" smtClean="0"/>
+              <a:rPr lang="en-US" dirty="0" smtClean="0"/>
               <a:t>Edit Master text styles</a:t>
             </a:r>
           </a:p>
           <a:p>
             <a:pPr lvl="1"/>
             <a:r>
-              <a:rPr lang="en-US" smtClean="0"/>
+              <a:rPr lang="en-US" dirty="0" smtClean="0"/>
               <a:t>Second level</a:t>
             </a:r>
           </a:p>
           <a:p>
             <a:pPr lvl="2"/>
             <a:r>
-              <a:rPr lang="en-US" smtClean="0"/>
+              <a:rPr lang="en-US" dirty="0" smtClean="0"/>
               <a:t>Third level</a:t>
             </a:r>
           </a:p>
           <a:p>
             <a:pPr lvl="3"/>
             <a:r>
-              <a:rPr lang="en-US" smtClean="0"/>
+              <a:rPr lang="en-US" dirty="0" smtClean="0"/>
               <a:t>Fourth level</a:t>
             </a:r>
           </a:p>
           <a:p>
             <a:pPr lvl="4"/>
             <a:r>
-              <a:rPr lang="en-US" smtClean="0"/>
+              <a:rPr lang="en-US" dirty="0" smtClean="0"/>
               <a:t>Fifth level</a:t>
             </a:r>
             <a:endParaRPr lang="en-US" dirty="0"/>
@@ -3817,7 +4004,7 @@
           <a:p>
             <a:fld id="{809CEF2D-C839-41A0-817E-03595D1CB546}" type="datetimeFigureOut">
               <a:rPr lang="en-US" smtClean="0"/>
-              <a:t>7/25/2019</a:t>
+              <a:t>7/26/2019</a:t>
             </a:fld>
             <a:endParaRPr lang="en-US"/>
           </a:p>
@@ -4199,7 +4386,7 @@
           <a:p>
             <a:fld id="{809CEF2D-C839-41A0-817E-03595D1CB546}" type="datetimeFigureOut">
               <a:rPr lang="en-US" smtClean="0"/>
-              <a:t>7/25/2019</a:t>
+              <a:t>7/26/2019</a:t>
             </a:fld>
             <a:endParaRPr lang="en-US"/>
           </a:p>
@@ -4486,7 +4673,7 @@
           <a:p>
             <a:fld id="{809CEF2D-C839-41A0-817E-03595D1CB546}" type="datetimeFigureOut">
               <a:rPr lang="en-US" smtClean="0"/>
-              <a:t>7/25/2019</a:t>
+              <a:t>7/26/2019</a:t>
             </a:fld>
             <a:endParaRPr lang="en-US"/>
           </a:p>
@@ -4625,6 +4812,7 @@
     <p:sldLayoutId id="2147483670" r:id="rId10"/>
     <p:sldLayoutId id="2147483671" r:id="rId11"/>
     <p:sldLayoutId id="2147483672" r:id="rId12"/>
+    <p:sldLayoutId id="2147483673" r:id="rId13"/>
   </p:sldLayoutIdLst>
   <p:txStyles>
     <p:titleStyle>
@@ -5088,6 +5276,117 @@
   <p:clrMapOvr>
     <a:masterClrMapping/>
   </p:clrMapOvr>
+  <p:timing>
+    <p:tnLst>
+      <p:par>
+        <p:cTn id="1" dur="indefinite" restart="never" nodeType="tmRoot"/>
+      </p:par>
+    </p:tnLst>
+  </p:timing>
+</p:sld>
+</file>
+
+<file path=ppt/slides/slide10.xml><?xml version="1.0" encoding="utf-8"?>
+<p:sld xmlns:a="http://schemas.openxmlformats.org/drawingml/2006/main" xmlns:r="http://schemas.openxmlformats.org/officeDocument/2006/relationships" xmlns:p="http://schemas.openxmlformats.org/presentationml/2006/main">
+  <p:cSld>
+    <p:spTree>
+      <p:nvGrpSpPr>
+        <p:cNvPr id="1" name=""/>
+        <p:cNvGrpSpPr/>
+        <p:nvPr/>
+      </p:nvGrpSpPr>
+      <p:grpSpPr>
+        <a:xfrm>
+          <a:off x="0" y="0"/>
+          <a:ext cx="0" cy="0"/>
+          <a:chOff x="0" y="0"/>
+          <a:chExt cx="0" cy="0"/>
+        </a:xfrm>
+      </p:grpSpPr>
+      <p:sp>
+        <p:nvSpPr>
+          <p:cNvPr id="2" name="Title 1"/>
+          <p:cNvSpPr>
+            <a:spLocks noGrp="1"/>
+          </p:cNvSpPr>
+          <p:nvPr>
+            <p:ph type="title"/>
+          </p:nvPr>
+        </p:nvSpPr>
+        <p:spPr/>
+        <p:txBody>
+          <a:bodyPr/>
+          <a:lstStyle/>
+          <a:p>
+            <a:r>
+              <a:rPr lang="en-US" dirty="0" smtClean="0"/>
+              <a:t>Results</a:t>
+            </a:r>
+            <a:endParaRPr lang="en-US" dirty="0"/>
+          </a:p>
+        </p:txBody>
+      </p:sp>
+      <p:sp>
+        <p:nvSpPr>
+          <p:cNvPr id="3" name="Content Placeholder 2"/>
+          <p:cNvSpPr>
+            <a:spLocks noGrp="1"/>
+          </p:cNvSpPr>
+          <p:nvPr>
+            <p:ph idx="1"/>
+          </p:nvPr>
+        </p:nvSpPr>
+        <p:spPr/>
+        <p:txBody>
+          <a:bodyPr/>
+          <a:lstStyle/>
+          <a:p>
+            <a:r>
+              <a:rPr lang="en-US" dirty="0" smtClean="0"/>
+              <a:t>219+162 genes</a:t>
+            </a:r>
+          </a:p>
+          <a:p>
+            <a:r>
+              <a:rPr lang="en-US" dirty="0" smtClean="0"/>
+              <a:t>6995+5712 </a:t>
+            </a:r>
+            <a:r>
+              <a:rPr lang="en-US" dirty="0" err="1" smtClean="0"/>
+              <a:t>coexpression</a:t>
+            </a:r>
+            <a:r>
+              <a:rPr lang="en-US" dirty="0" smtClean="0"/>
+              <a:t> results</a:t>
+            </a:r>
+          </a:p>
+          <a:p>
+            <a:r>
+              <a:rPr lang="en-US" dirty="0" smtClean="0"/>
+              <a:t>4 significant clusters</a:t>
+            </a:r>
+          </a:p>
+          <a:p>
+            <a:r>
+              <a:rPr lang="en-US" dirty="0" smtClean="0"/>
+              <a:t>1 significant pathway</a:t>
+            </a:r>
+          </a:p>
+          <a:p>
+            <a:endParaRPr lang="en-US" dirty="0"/>
+          </a:p>
+        </p:txBody>
+      </p:sp>
+    </p:spTree>
+    <p:extLst>
+      <p:ext uri="{BB962C8B-B14F-4D97-AF65-F5344CB8AC3E}">
+        <p14:creationId xmlns:p14="http://schemas.microsoft.com/office/powerpoint/2010/main" val="3603035915"/>
+      </p:ext>
+    </p:extLst>
+  </p:cSld>
+  <p:clrMapOvr>
+    <a:masterClrMapping/>
+  </p:clrMapOvr>
 </p:sld>
 </file>
 
@@ -5141,6 +5440,13 @@
   <p:clrMapOvr>
     <a:masterClrMapping/>
   </p:clrMapOvr>
+  <p:timing>
+    <p:tnLst>
+      <p:par>
+        <p:cTn id="1" dur="indefinite" restart="never" nodeType="tmRoot"/>
+      </p:par>
+    </p:tnLst>
+  </p:timing>
 </p:sld>
 </file>
 
@@ -5224,35 +5530,6 @@
           <a:lstStyle/>
           <a:p>
             <a:endParaRPr sz="2400"/>
-          </a:p>
-        </p:txBody>
-      </p:sp>
-      <p:sp>
-        <p:nvSpPr>
-          <p:cNvPr id="60" name="Google Shape;60;p14"/>
-          <p:cNvSpPr txBox="1">
-            <a:spLocks noGrp="1"/>
-          </p:cNvSpPr>
-          <p:nvPr>
-            <p:ph type="title"/>
-          </p:nvPr>
-        </p:nvSpPr>
-        <p:spPr>
-          <a:prstGeom prst="rect">
-            <a:avLst/>
-          </a:prstGeom>
-        </p:spPr>
-        <p:txBody>
-          <a:bodyPr spcFirstLastPara="1" vert="horz" wrap="square" lIns="121900" tIns="121900" rIns="121900" bIns="121900" rtlCol="0" anchor="t" anchorCtr="0">
-            <a:noAutofit/>
-          </a:bodyPr>
-          <a:lstStyle/>
-          <a:p>
-            <a:r>
-              <a:rPr lang="en"/>
-              <a:t>Eye and Lens</a:t>
-            </a:r>
-            <a:endParaRPr/>
           </a:p>
         </p:txBody>
       </p:sp>
@@ -5406,6 +5683,150 @@
           </p:txBody>
         </p:sp>
       </p:grpSp>
+      <p:sp>
+        <p:nvSpPr>
+          <p:cNvPr id="11" name="Title 7"/>
+          <p:cNvSpPr txBox="1">
+            <a:spLocks/>
+          </p:cNvSpPr>
+          <p:nvPr/>
+        </p:nvSpPr>
+        <p:spPr>
+          <a:xfrm>
+            <a:off x="1097280" y="286603"/>
+            <a:ext cx="10058400" cy="1450757"/>
+          </a:xfrm>
+          <a:prstGeom prst="rect">
+            <a:avLst/>
+          </a:prstGeom>
+        </p:spPr>
+        <p:txBody>
+          <a:bodyPr spcFirstLastPara="1" vert="horz" wrap="square" lIns="91425" tIns="91425" rIns="91425" bIns="91425" rtlCol="0" anchor="b" anchorCtr="0">
+            <a:noAutofit/>
+          </a:bodyPr>
+          <a:lstStyle>
+            <a:lvl1pPr lvl="0" algn="l" defTabSz="914400" rtl="0" eaLnBrk="1" latinLnBrk="0" hangingPunct="1">
+              <a:lnSpc>
+                <a:spcPct val="85000"/>
+              </a:lnSpc>
+              <a:spcBef>
+                <a:spcPts val="0"/>
+              </a:spcBef>
+              <a:spcAft>
+                <a:spcPts val="0"/>
+              </a:spcAft>
+              <a:buSzPts val="2800"/>
+              <a:buNone/>
+              <a:defRPr sz="4800" kern="1200" spc="-50" baseline="0">
+                <a:solidFill>
+                  <a:schemeClr val="tx1">
+                    <a:lumMod val="75000"/>
+                    <a:lumOff val="25000"/>
+                  </a:schemeClr>
+                </a:solidFill>
+                <a:latin typeface="+mj-lt"/>
+                <a:ea typeface="+mj-ea"/>
+                <a:cs typeface="+mj-cs"/>
+              </a:defRPr>
+            </a:lvl1pPr>
+            <a:lvl2pPr lvl="1">
+              <a:spcBef>
+                <a:spcPts val="0"/>
+              </a:spcBef>
+              <a:spcAft>
+                <a:spcPts val="0"/>
+              </a:spcAft>
+              <a:buSzPts val="2800"/>
+              <a:buNone/>
+              <a:defRPr/>
+            </a:lvl2pPr>
+            <a:lvl3pPr lvl="2">
+              <a:spcBef>
+                <a:spcPts val="0"/>
+              </a:spcBef>
+              <a:spcAft>
+                <a:spcPts val="0"/>
+              </a:spcAft>
+              <a:buSzPts val="2800"/>
+              <a:buNone/>
+              <a:defRPr/>
+            </a:lvl3pPr>
+            <a:lvl4pPr lvl="3">
+              <a:spcBef>
+                <a:spcPts val="0"/>
+              </a:spcBef>
+              <a:spcAft>
+                <a:spcPts val="0"/>
+              </a:spcAft>
+              <a:buSzPts val="2800"/>
+              <a:buNone/>
+              <a:defRPr/>
+            </a:lvl4pPr>
+            <a:lvl5pPr lvl="4">
+              <a:spcBef>
+                <a:spcPts val="0"/>
+              </a:spcBef>
+              <a:spcAft>
+                <a:spcPts val="0"/>
+              </a:spcAft>
+              <a:buSzPts val="2800"/>
+              <a:buNone/>
+              <a:defRPr/>
+            </a:lvl5pPr>
+            <a:lvl6pPr lvl="5">
+              <a:spcBef>
+                <a:spcPts val="0"/>
+              </a:spcBef>
+              <a:spcAft>
+                <a:spcPts val="0"/>
+              </a:spcAft>
+              <a:buSzPts val="2800"/>
+              <a:buNone/>
+              <a:defRPr/>
+            </a:lvl6pPr>
+            <a:lvl7pPr lvl="6">
+              <a:spcBef>
+                <a:spcPts val="0"/>
+              </a:spcBef>
+              <a:spcAft>
+                <a:spcPts val="0"/>
+              </a:spcAft>
+              <a:buSzPts val="2800"/>
+              <a:buNone/>
+              <a:defRPr/>
+            </a:lvl7pPr>
+            <a:lvl8pPr lvl="7">
+              <a:spcBef>
+                <a:spcPts val="0"/>
+              </a:spcBef>
+              <a:spcAft>
+                <a:spcPts val="0"/>
+              </a:spcAft>
+              <a:buSzPts val="2800"/>
+              <a:buNone/>
+              <a:defRPr/>
+            </a:lvl8pPr>
+            <a:lvl9pPr lvl="8">
+              <a:spcBef>
+                <a:spcPts val="0"/>
+              </a:spcBef>
+              <a:spcAft>
+                <a:spcPts val="0"/>
+              </a:spcAft>
+              <a:buSzPts val="2800"/>
+              <a:buNone/>
+              <a:defRPr/>
+            </a:lvl9pPr>
+          </a:lstStyle>
+          <a:p>
+            <a:r>
+              <a:rPr lang="en-US" dirty="0" smtClean="0"/>
+              <a:t>Eye and Lens</a:t>
+            </a:r>
+            <a:endParaRPr lang="en-US" dirty="0"/>
+          </a:p>
+        </p:txBody>
+      </p:sp>
     </p:spTree>
     <p:extLst>
       <p:ext uri="{BB962C8B-B14F-4D97-AF65-F5344CB8AC3E}">
@@ -5416,6 +5837,13 @@
   <p:clrMapOvr>
     <a:masterClrMapping/>
   </p:clrMapOvr>
+  <p:timing>
+    <p:tnLst>
+      <p:par>
+        <p:cTn id="1" dur="indefinite" restart="never" nodeType="tmRoot"/>
+      </p:par>
+    </p:tnLst>
+  </p:timing>
 </p:sld>
 </file>
 
@@ -5436,35 +5864,6 @@
           <a:chExt cx="0" cy="0"/>
         </a:xfrm>
       </p:grpSpPr>
-      <p:sp>
-        <p:nvSpPr>
-          <p:cNvPr id="71" name="Google Shape;71;p15"/>
-          <p:cNvSpPr txBox="1">
-            <a:spLocks noGrp="1"/>
-          </p:cNvSpPr>
-          <p:nvPr>
-            <p:ph type="title"/>
-          </p:nvPr>
-        </p:nvSpPr>
-        <p:spPr>
-          <a:prstGeom prst="rect">
-            <a:avLst/>
-          </a:prstGeom>
-        </p:spPr>
-        <p:txBody>
-          <a:bodyPr spcFirstLastPara="1" vert="horz" wrap="square" lIns="121900" tIns="121900" rIns="121900" bIns="121900" rtlCol="0" anchor="t" anchorCtr="0">
-            <a:noAutofit/>
-          </a:bodyPr>
-          <a:lstStyle/>
-          <a:p>
-            <a:r>
-              <a:rPr lang="en"/>
-              <a:t>Fiber Cells and Crystallin</a:t>
-            </a:r>
-            <a:endParaRPr/>
-          </a:p>
-        </p:txBody>
-      </p:sp>
       <p:sp>
         <p:nvSpPr>
           <p:cNvPr id="70" name="Google Shape;70;p15"/>
@@ -5669,6 +6068,154 @@
           </a:ln>
         </p:spPr>
       </p:pic>
+      <p:sp>
+        <p:nvSpPr>
+          <p:cNvPr id="8" name="Title 7"/>
+          <p:cNvSpPr txBox="1">
+            <a:spLocks/>
+          </p:cNvSpPr>
+          <p:nvPr/>
+        </p:nvSpPr>
+        <p:spPr>
+          <a:xfrm>
+            <a:off x="1097280" y="286603"/>
+            <a:ext cx="10058400" cy="1450757"/>
+          </a:xfrm>
+          <a:prstGeom prst="rect">
+            <a:avLst/>
+          </a:prstGeom>
+        </p:spPr>
+        <p:txBody>
+          <a:bodyPr spcFirstLastPara="1" vert="horz" wrap="square" lIns="91425" tIns="91425" rIns="91425" bIns="91425" rtlCol="0" anchor="b" anchorCtr="0">
+            <a:noAutofit/>
+          </a:bodyPr>
+          <a:lstStyle>
+            <a:lvl1pPr lvl="0" algn="l" defTabSz="914400" rtl="0" eaLnBrk="1" latinLnBrk="0" hangingPunct="1">
+              <a:lnSpc>
+                <a:spcPct val="85000"/>
+              </a:lnSpc>
+              <a:spcBef>
+                <a:spcPts val="0"/>
+              </a:spcBef>
+              <a:spcAft>
+                <a:spcPts val="0"/>
+              </a:spcAft>
+              <a:buSzPts val="2800"/>
+              <a:buNone/>
+              <a:defRPr sz="4800" kern="1200" spc="-50" baseline="0">
+                <a:solidFill>
+                  <a:schemeClr val="tx1">
+                    <a:lumMod val="75000"/>
+                    <a:lumOff val="25000"/>
+                  </a:schemeClr>
+                </a:solidFill>
+                <a:latin typeface="+mj-lt"/>
+                <a:ea typeface="+mj-ea"/>
+                <a:cs typeface="+mj-cs"/>
+              </a:defRPr>
+            </a:lvl1pPr>
+            <a:lvl2pPr lvl="1">
+              <a:spcBef>
+                <a:spcPts val="0"/>
+              </a:spcBef>
+              <a:spcAft>
+                <a:spcPts val="0"/>
+              </a:spcAft>
+              <a:buSzPts val="2800"/>
+              <a:buNone/>
+              <a:defRPr/>
+            </a:lvl2pPr>
+            <a:lvl3pPr lvl="2">
+              <a:spcBef>
+                <a:spcPts val="0"/>
+              </a:spcBef>
+              <a:spcAft>
+                <a:spcPts val="0"/>
+              </a:spcAft>
+              <a:buSzPts val="2800"/>
+              <a:buNone/>
+              <a:defRPr/>
+            </a:lvl3pPr>
+            <a:lvl4pPr lvl="3">
+              <a:spcBef>
+                <a:spcPts val="0"/>
+              </a:spcBef>
+              <a:spcAft>
+                <a:spcPts val="0"/>
+              </a:spcAft>
+              <a:buSzPts val="2800"/>
+              <a:buNone/>
+              <a:defRPr/>
+            </a:lvl4pPr>
+            <a:lvl5pPr lvl="4">
+              <a:spcBef>
+                <a:spcPts val="0"/>
+              </a:spcBef>
+              <a:spcAft>
+                <a:spcPts val="0"/>
+              </a:spcAft>
+              <a:buSzPts val="2800"/>
+              <a:buNone/>
+              <a:defRPr/>
+            </a:lvl5pPr>
+            <a:lvl6pPr lvl="5">
+              <a:spcBef>
+                <a:spcPts val="0"/>
+              </a:spcBef>
+              <a:spcAft>
+                <a:spcPts val="0"/>
+              </a:spcAft>
+              <a:buSzPts val="2800"/>
+              <a:buNone/>
+              <a:defRPr/>
+            </a:lvl6pPr>
+            <a:lvl7pPr lvl="6">
+              <a:spcBef>
+                <a:spcPts val="0"/>
+              </a:spcBef>
+              <a:spcAft>
+                <a:spcPts val="0"/>
+              </a:spcAft>
+              <a:buSzPts val="2800"/>
+              <a:buNone/>
+              <a:defRPr/>
+            </a:lvl7pPr>
+            <a:lvl8pPr lvl="7">
+              <a:spcBef>
+                <a:spcPts val="0"/>
+              </a:spcBef>
+              <a:spcAft>
+                <a:spcPts val="0"/>
+              </a:spcAft>
+              <a:buSzPts val="2800"/>
+              <a:buNone/>
+              <a:defRPr/>
+            </a:lvl8pPr>
+            <a:lvl9pPr lvl="8">
+              <a:spcBef>
+                <a:spcPts val="0"/>
+              </a:spcBef>
+              <a:spcAft>
+                <a:spcPts val="0"/>
+              </a:spcAft>
+              <a:buSzPts val="2800"/>
+              <a:buNone/>
+              <a:defRPr/>
+            </a:lvl9pPr>
+          </a:lstStyle>
+          <a:p>
+            <a:r>
+              <a:rPr lang="en-US" dirty="0" smtClean="0"/>
+              <a:t>Fiber Cells and </a:t>
+            </a:r>
+            <a:r>
+              <a:rPr lang="en-US" dirty="0" err="1" smtClean="0"/>
+              <a:t>Crystallin</a:t>
+            </a:r>
+            <a:endParaRPr lang="en-US" dirty="0"/>
+          </a:p>
+        </p:txBody>
+      </p:sp>
     </p:spTree>
     <p:extLst>
       <p:ext uri="{BB962C8B-B14F-4D97-AF65-F5344CB8AC3E}">
@@ -5679,6 +6226,13 @@
   <p:clrMapOvr>
     <a:masterClrMapping/>
   </p:clrMapOvr>
+  <p:timing>
+    <p:tnLst>
+      <p:par>
+        <p:cTn id="1" dur="indefinite" restart="never" nodeType="tmRoot"/>
+      </p:par>
+    </p:tnLst>
+  </p:timing>
 </p:sld>
 </file>
 
@@ -5701,35 +6255,6 @@
       </p:grpSpPr>
       <p:sp>
         <p:nvSpPr>
-          <p:cNvPr id="71" name="Google Shape;71;p15"/>
-          <p:cNvSpPr txBox="1">
-            <a:spLocks noGrp="1"/>
-          </p:cNvSpPr>
-          <p:nvPr>
-            <p:ph type="title"/>
-          </p:nvPr>
-        </p:nvSpPr>
-        <p:spPr>
-          <a:prstGeom prst="rect">
-            <a:avLst/>
-          </a:prstGeom>
-        </p:spPr>
-        <p:txBody>
-          <a:bodyPr spcFirstLastPara="1" vert="horz" wrap="square" lIns="121900" tIns="121900" rIns="121900" bIns="121900" rtlCol="0" anchor="t" anchorCtr="0">
-            <a:noAutofit/>
-          </a:bodyPr>
-          <a:lstStyle/>
-          <a:p>
-            <a:r>
-              <a:rPr lang="en-US" dirty="0" smtClean="0"/>
-              <a:t>Cataract</a:t>
-            </a:r>
-            <a:endParaRPr dirty="0"/>
-          </a:p>
-        </p:txBody>
-      </p:sp>
-      <p:sp>
-        <p:nvSpPr>
           <p:cNvPr id="70" name="Google Shape;70;p15"/>
           <p:cNvSpPr txBox="1">
             <a:spLocks noGrp="1"/>
@@ -5787,11 +6312,7 @@
             </a:r>
             <a:r>
               <a:rPr lang="en-US" sz="2400" dirty="0" smtClean="0"/>
-              <a:t> </a:t>
-            </a:r>
-            <a:r>
-              <a:rPr lang="en-US" sz="2400" dirty="0" smtClean="0"/>
-              <a:t>proteins</a:t>
+              <a:t> proteins</a:t>
             </a:r>
           </a:p>
           <a:p>
@@ -5930,6 +6451,34 @@
               </a:lnSpc>
             </a:pPr>
             <a:endParaRPr sz="2400" dirty="0"/>
+          </a:p>
+        </p:txBody>
+      </p:sp>
+      <p:sp>
+        <p:nvSpPr>
+          <p:cNvPr id="6" name="Title 7"/>
+          <p:cNvSpPr>
+            <a:spLocks noGrp="1"/>
+          </p:cNvSpPr>
+          <p:nvPr>
+            <p:ph type="title"/>
+          </p:nvPr>
+        </p:nvSpPr>
+        <p:spPr>
+          <a:xfrm>
+            <a:off x="1097280" y="286603"/>
+            <a:ext cx="10058400" cy="1450757"/>
+          </a:xfrm>
+        </p:spPr>
+        <p:txBody>
+          <a:bodyPr anchor="b"/>
+          <a:lstStyle/>
+          <a:p>
+            <a:r>
+              <a:rPr lang="en-US" dirty="0" smtClean="0"/>
+              <a:t>Cataract</a:t>
+            </a:r>
+            <a:endParaRPr lang="en-US" dirty="0"/>
           </a:p>
         </p:txBody>
       </p:sp>
@@ -5943,6 +6492,13 @@
   <p:clrMapOvr>
     <a:masterClrMapping/>
   </p:clrMapOvr>
+  <p:timing>
+    <p:tnLst>
+      <p:par>
+        <p:cTn id="1" dur="indefinite" restart="never" nodeType="tmRoot"/>
+      </p:par>
+    </p:tnLst>
+  </p:timing>
 </p:sld>
 </file>
 
@@ -5996,6 +6552,13 @@
   <p:clrMapOvr>
     <a:masterClrMapping/>
   </p:clrMapOvr>
+  <p:timing>
+    <p:tnLst>
+      <p:par>
+        <p:cTn id="1" dur="indefinite" restart="never" nodeType="tmRoot"/>
+      </p:par>
+    </p:tnLst>
+  </p:timing>
 </p:sld>
 </file>
 
@@ -6033,6 +6596,447 @@
           <a:p>
             <a:r>
               <a:rPr lang="en-US" dirty="0" smtClean="0"/>
+              <a:t>Gene Collection</a:t>
+            </a:r>
+            <a:endParaRPr lang="en-US" dirty="0"/>
+          </a:p>
+        </p:txBody>
+      </p:sp>
+      <p:sp>
+        <p:nvSpPr>
+          <p:cNvPr id="4" name="Content Placeholder 3"/>
+          <p:cNvSpPr>
+            <a:spLocks noGrp="1"/>
+          </p:cNvSpPr>
+          <p:nvPr>
+            <p:ph sz="half" idx="2"/>
+          </p:nvPr>
+        </p:nvSpPr>
+        <p:spPr/>
+        <p:txBody>
+          <a:bodyPr/>
+          <a:lstStyle/>
+          <a:p>
+            <a:r>
+              <a:rPr lang="en-US" dirty="0" smtClean="0"/>
+              <a:t>Cataract-related genes were collected from:</a:t>
+            </a:r>
+          </a:p>
+          <a:p>
+            <a:pPr lvl="1">
+              <a:buFont typeface="Arial" panose="020B0604020202020204" pitchFamily="34" charset="0"/>
+              <a:buChar char="•"/>
+            </a:pPr>
+            <a:r>
+              <a:rPr lang="en-US" dirty="0" smtClean="0"/>
+              <a:t>PubMed Gene</a:t>
+            </a:r>
+          </a:p>
+          <a:p>
+            <a:pPr lvl="2">
+              <a:buFont typeface="Arial" panose="020B0604020202020204" pitchFamily="34" charset="0"/>
+              <a:buChar char="•"/>
+            </a:pPr>
+            <a:r>
+              <a:rPr lang="en-US" dirty="0" smtClean="0"/>
+              <a:t>Using query “cataract &amp; “homo sapiens”[Organism]”</a:t>
+            </a:r>
+          </a:p>
+          <a:p>
+            <a:pPr lvl="1">
+              <a:buFont typeface="Arial" panose="020B0604020202020204" pitchFamily="34" charset="0"/>
+              <a:buChar char="•"/>
+            </a:pPr>
+            <a:r>
+              <a:rPr lang="en-US" dirty="0" err="1" smtClean="0"/>
+              <a:t>Phenopedia</a:t>
+            </a:r>
+            <a:endParaRPr lang="en-US" dirty="0" smtClean="0"/>
+          </a:p>
+          <a:p>
+            <a:pPr lvl="2">
+              <a:buFont typeface="Arial" panose="020B0604020202020204" pitchFamily="34" charset="0"/>
+              <a:buChar char="•"/>
+            </a:pPr>
+            <a:r>
+              <a:rPr lang="en-US" dirty="0" smtClean="0"/>
+              <a:t>Genes found in Cataract category</a:t>
+            </a:r>
+            <a:endParaRPr lang="en-US" dirty="0"/>
+          </a:p>
+          <a:p>
+            <a:pPr lvl="2">
+              <a:buFont typeface="Arial" panose="020B0604020202020204" pitchFamily="34" charset="0"/>
+              <a:buChar char="•"/>
+            </a:pPr>
+            <a:endParaRPr lang="en-US" dirty="0"/>
+          </a:p>
+        </p:txBody>
+      </p:sp>
+      <p:sp>
+        <p:nvSpPr>
+          <p:cNvPr id="5" name="Text Placeholder 4"/>
+          <p:cNvSpPr>
+            <a:spLocks noGrp="1"/>
+          </p:cNvSpPr>
+          <p:nvPr>
+            <p:ph type="body" sz="quarter" idx="3"/>
+          </p:nvPr>
+        </p:nvSpPr>
+        <p:spPr/>
+        <p:txBody>
+          <a:bodyPr/>
+          <a:lstStyle/>
+          <a:p>
+            <a:r>
+              <a:rPr lang="en-US" dirty="0" smtClean="0"/>
+              <a:t>Gene Clustering</a:t>
+            </a:r>
+            <a:endParaRPr lang="en-US" dirty="0"/>
+          </a:p>
+        </p:txBody>
+      </p:sp>
+      <p:sp>
+        <p:nvSpPr>
+          <p:cNvPr id="6" name="Content Placeholder 5"/>
+          <p:cNvSpPr>
+            <a:spLocks noGrp="1"/>
+          </p:cNvSpPr>
+          <p:nvPr>
+            <p:ph sz="quarter" idx="4"/>
+          </p:nvPr>
+        </p:nvSpPr>
+        <p:spPr/>
+        <p:txBody>
+          <a:bodyPr/>
+          <a:lstStyle/>
+          <a:p>
+            <a:r>
+              <a:rPr lang="en-US" dirty="0" smtClean="0"/>
+              <a:t>Gene collections were submitted separately to </a:t>
+            </a:r>
+            <a:r>
+              <a:rPr lang="en-US" dirty="0" err="1" smtClean="0"/>
+              <a:t>GeneFriends:RNASeq</a:t>
+            </a:r>
+            <a:endParaRPr lang="en-US" dirty="0" smtClean="0"/>
+          </a:p>
+          <a:p>
+            <a:r>
+              <a:rPr lang="en-US" dirty="0" err="1" smtClean="0"/>
+              <a:t>GeneFriends</a:t>
+            </a:r>
+            <a:r>
+              <a:rPr lang="en-US" dirty="0" smtClean="0"/>
+              <a:t>-generated networks were mapped in </a:t>
+            </a:r>
+            <a:r>
+              <a:rPr lang="en-US" dirty="0" err="1" smtClean="0"/>
+              <a:t>Cytoscape</a:t>
+            </a:r>
+            <a:endParaRPr lang="en-US" dirty="0" smtClean="0"/>
+          </a:p>
+          <a:p>
+            <a:r>
+              <a:rPr lang="en-US" dirty="0" smtClean="0"/>
+              <a:t>Clusters were identified via </a:t>
+            </a:r>
+            <a:r>
+              <a:rPr lang="en-US" dirty="0" err="1" smtClean="0"/>
+              <a:t>ClusterONE</a:t>
+            </a:r>
+            <a:r>
+              <a:rPr lang="en-US" dirty="0" smtClean="0"/>
+              <a:t> app with parameter “Haircut threshold” set to 0.05, all others left as default</a:t>
+            </a:r>
+            <a:endParaRPr lang="en-US" dirty="0"/>
+          </a:p>
+        </p:txBody>
+      </p:sp>
+      <p:sp>
+        <p:nvSpPr>
+          <p:cNvPr id="8" name="Title 7"/>
+          <p:cNvSpPr>
+            <a:spLocks noGrp="1"/>
+          </p:cNvSpPr>
+          <p:nvPr>
+            <p:ph type="title"/>
+          </p:nvPr>
+        </p:nvSpPr>
+        <p:spPr/>
+        <p:txBody>
+          <a:bodyPr/>
+          <a:lstStyle/>
+          <a:p>
+            <a:r>
+              <a:rPr lang="en-US" dirty="0" smtClean="0"/>
+              <a:t>Methods</a:t>
+            </a:r>
+            <a:endParaRPr lang="en-US" dirty="0"/>
+          </a:p>
+        </p:txBody>
+      </p:sp>
+    </p:spTree>
+    <p:extLst>
+      <p:ext uri="{BB962C8B-B14F-4D97-AF65-F5344CB8AC3E}">
+        <p14:creationId xmlns:p14="http://schemas.microsoft.com/office/powerpoint/2010/main" val="606958025"/>
+      </p:ext>
+    </p:extLst>
+  </p:cSld>
+  <p:clrMapOvr>
+    <a:masterClrMapping/>
+  </p:clrMapOvr>
+  <p:timing>
+    <p:tnLst>
+      <p:par>
+        <p:cTn id="1" dur="indefinite" restart="never" nodeType="tmRoot"/>
+      </p:par>
+    </p:tnLst>
+  </p:timing>
+</p:sld>
+</file>
+
+<file path=ppt/slides/slide8.xml><?xml version="1.0" encoding="utf-8"?>
+<p:sld xmlns:a="http://schemas.openxmlformats.org/drawingml/2006/main" xmlns:r="http://schemas.openxmlformats.org/officeDocument/2006/relationships" xmlns:p="http://schemas.openxmlformats.org/presentationml/2006/main">
+  <p:cSld>
+    <p:spTree>
+      <p:nvGrpSpPr>
+        <p:cNvPr id="1" name=""/>
+        <p:cNvGrpSpPr/>
+        <p:nvPr/>
+      </p:nvGrpSpPr>
+      <p:grpSpPr>
+        <a:xfrm>
+          <a:off x="0" y="0"/>
+          <a:ext cx="0" cy="0"/>
+          <a:chOff x="0" y="0"/>
+          <a:chExt cx="0" cy="0"/>
+        </a:xfrm>
+      </p:grpSpPr>
+      <p:sp>
+        <p:nvSpPr>
+          <p:cNvPr id="2" name="Title 1"/>
+          <p:cNvSpPr>
+            <a:spLocks noGrp="1"/>
+          </p:cNvSpPr>
+          <p:nvPr>
+            <p:ph type="title"/>
+          </p:nvPr>
+        </p:nvSpPr>
+        <p:spPr/>
+        <p:txBody>
+          <a:bodyPr/>
+          <a:lstStyle/>
+          <a:p>
+            <a:r>
+              <a:rPr lang="en-US" dirty="0" smtClean="0"/>
+              <a:t>Methods</a:t>
+            </a:r>
+            <a:endParaRPr lang="en-US" dirty="0"/>
+          </a:p>
+        </p:txBody>
+      </p:sp>
+      <p:sp>
+        <p:nvSpPr>
+          <p:cNvPr id="3" name="Text Placeholder 2"/>
+          <p:cNvSpPr>
+            <a:spLocks noGrp="1"/>
+          </p:cNvSpPr>
+          <p:nvPr>
+            <p:ph type="body" idx="1"/>
+          </p:nvPr>
+        </p:nvSpPr>
+        <p:spPr/>
+        <p:txBody>
+          <a:bodyPr/>
+          <a:lstStyle/>
+          <a:p>
+            <a:r>
+              <a:rPr lang="en-US" dirty="0" smtClean="0"/>
+              <a:t>Function Analysis</a:t>
+            </a:r>
+            <a:endParaRPr lang="en-US" dirty="0"/>
+          </a:p>
+        </p:txBody>
+      </p:sp>
+      <p:sp>
+        <p:nvSpPr>
+          <p:cNvPr id="4" name="Content Placeholder 3"/>
+          <p:cNvSpPr>
+            <a:spLocks noGrp="1"/>
+          </p:cNvSpPr>
+          <p:nvPr>
+            <p:ph sz="half" idx="2"/>
+          </p:nvPr>
+        </p:nvSpPr>
+        <p:spPr/>
+        <p:txBody>
+          <a:bodyPr/>
+          <a:lstStyle/>
+          <a:p>
+            <a:r>
+              <a:rPr lang="en-US" dirty="0" smtClean="0"/>
+              <a:t>Clusters were analyzed within </a:t>
+            </a:r>
+            <a:r>
+              <a:rPr lang="en-US" dirty="0" err="1" smtClean="0"/>
+              <a:t>Cytoscape</a:t>
+            </a:r>
+            <a:r>
+              <a:rPr lang="en-US" dirty="0" smtClean="0"/>
+              <a:t> using </a:t>
+            </a:r>
+            <a:r>
+              <a:rPr lang="en-US" dirty="0" err="1" smtClean="0"/>
+              <a:t>BinGO</a:t>
+            </a:r>
+            <a:r>
+              <a:rPr lang="en-US" dirty="0" smtClean="0"/>
+              <a:t> app</a:t>
+            </a:r>
+          </a:p>
+          <a:p>
+            <a:pPr lvl="1"/>
+            <a:r>
+              <a:rPr lang="en-US" dirty="0" smtClean="0"/>
+              <a:t>Yielded function results</a:t>
+            </a:r>
+            <a:endParaRPr lang="en-US" dirty="0"/>
+          </a:p>
+          <a:p>
+            <a:r>
+              <a:rPr lang="en-US" dirty="0" smtClean="0"/>
+              <a:t>Clusters were extracted from </a:t>
+            </a:r>
+            <a:r>
+              <a:rPr lang="en-US" dirty="0" err="1" smtClean="0"/>
+              <a:t>Cytoscape</a:t>
+            </a:r>
+            <a:r>
+              <a:rPr lang="en-US" dirty="0" smtClean="0"/>
+              <a:t> and processed in </a:t>
+            </a:r>
+            <a:r>
+              <a:rPr lang="en-US" dirty="0" err="1" smtClean="0"/>
+              <a:t>GeneOntology</a:t>
+            </a:r>
+            <a:r>
+              <a:rPr lang="en-US" dirty="0" smtClean="0"/>
+              <a:t> and Ingenuity</a:t>
+            </a:r>
+          </a:p>
+          <a:p>
+            <a:pPr lvl="1"/>
+            <a:r>
+              <a:rPr lang="en-US" dirty="0" smtClean="0"/>
+              <a:t>Yielded function and disease connections</a:t>
+            </a:r>
+          </a:p>
+          <a:p>
+            <a:endParaRPr lang="en-US" dirty="0" smtClean="0"/>
+          </a:p>
+        </p:txBody>
+      </p:sp>
+      <p:sp>
+        <p:nvSpPr>
+          <p:cNvPr id="5" name="Text Placeholder 4"/>
+          <p:cNvSpPr>
+            <a:spLocks noGrp="1"/>
+          </p:cNvSpPr>
+          <p:nvPr>
+            <p:ph type="body" sz="quarter" idx="3"/>
+          </p:nvPr>
+        </p:nvSpPr>
+        <p:spPr/>
+        <p:txBody>
+          <a:bodyPr/>
+          <a:lstStyle/>
+          <a:p>
+            <a:r>
+              <a:rPr lang="en-US" dirty="0" smtClean="0"/>
+              <a:t>Pathway Analysis</a:t>
+            </a:r>
+            <a:endParaRPr lang="en-US" dirty="0"/>
+          </a:p>
+        </p:txBody>
+      </p:sp>
+      <p:sp>
+        <p:nvSpPr>
+          <p:cNvPr id="6" name="Content Placeholder 5"/>
+          <p:cNvSpPr>
+            <a:spLocks noGrp="1"/>
+          </p:cNvSpPr>
+          <p:nvPr>
+            <p:ph sz="quarter" idx="4"/>
+          </p:nvPr>
+        </p:nvSpPr>
+        <p:spPr/>
+        <p:txBody>
+          <a:bodyPr/>
+          <a:lstStyle/>
+          <a:p>
+            <a:r>
+              <a:rPr lang="en-US" dirty="0" smtClean="0"/>
+              <a:t>Clusters were processed in DAVID to search for pathways</a:t>
+            </a:r>
+            <a:endParaRPr lang="en-US" dirty="0"/>
+          </a:p>
+        </p:txBody>
+      </p:sp>
+    </p:spTree>
+    <p:extLst>
+      <p:ext uri="{BB962C8B-B14F-4D97-AF65-F5344CB8AC3E}">
+        <p14:creationId xmlns:p14="http://schemas.microsoft.com/office/powerpoint/2010/main" val="2821775083"/>
+      </p:ext>
+    </p:extLst>
+  </p:cSld>
+  <p:clrMapOvr>
+    <a:masterClrMapping/>
+  </p:clrMapOvr>
+  <p:timing>
+    <p:tnLst>
+      <p:par>
+        <p:cTn id="1" dur="indefinite" restart="never" nodeType="tmRoot"/>
+      </p:par>
+    </p:tnLst>
+  </p:timing>
+</p:sld>
+</file>
+
+<file path=ppt/slides/slide9.xml><?xml version="1.0" encoding="utf-8"?>
+<p:sld xmlns:a="http://schemas.openxmlformats.org/drawingml/2006/main" xmlns:r="http://schemas.openxmlformats.org/officeDocument/2006/relationships" xmlns:p="http://schemas.openxmlformats.org/presentationml/2006/main">
+  <p:cSld>
+    <p:spTree>
+      <p:nvGrpSpPr>
+        <p:cNvPr id="1" name=""/>
+        <p:cNvGrpSpPr/>
+        <p:nvPr/>
+      </p:nvGrpSpPr>
+      <p:grpSpPr>
+        <a:xfrm>
+          <a:off x="0" y="0"/>
+          <a:ext cx="0" cy="0"/>
+          <a:chOff x="0" y="0"/>
+          <a:chExt cx="0" cy="0"/>
+        </a:xfrm>
+      </p:grpSpPr>
+      <p:sp>
+        <p:nvSpPr>
+          <p:cNvPr id="3" name="Text Placeholder 2"/>
+          <p:cNvSpPr>
+            <a:spLocks noGrp="1"/>
+          </p:cNvSpPr>
+          <p:nvPr>
+            <p:ph type="body" idx="1"/>
+          </p:nvPr>
+        </p:nvSpPr>
+        <p:spPr/>
+        <p:txBody>
+          <a:bodyPr/>
+          <a:lstStyle/>
+          <a:p>
+            <a:r>
+              <a:rPr lang="en-US" dirty="0" smtClean="0"/>
               <a:t>Results</a:t>
             </a:r>
             <a:endParaRPr lang="en-US" dirty="0"/>
@@ -6049,6 +7053,13 @@
   <p:clrMapOvr>
     <a:masterClrMapping/>
   </p:clrMapOvr>
+  <p:timing>
+    <p:tnLst>
+      <p:par>
+        <p:cTn id="1" dur="indefinite" restart="never" nodeType="tmRoot"/>
+      </p:par>
+    </p:tnLst>
+  </p:timing>
 </p:sld>
 </file>
 

</xml_diff>

<commit_message>
further work on presentation
</commit_message>
<xml_diff>
--- a/Cataract.pptx
+++ b/Cataract.pptx
@@ -5,7 +5,7 @@
     <p:sldMasterId id="2147483660" r:id="rId1"/>
   </p:sldMasterIdLst>
   <p:notesMasterIdLst>
-    <p:notesMasterId r:id="rId21"/>
+    <p:notesMasterId r:id="rId22"/>
   </p:notesMasterIdLst>
   <p:sldIdLst>
     <p:sldId id="257" r:id="rId2"/>
@@ -18,15 +18,16 @@
     <p:sldId id="266" r:id="rId9"/>
     <p:sldId id="267" r:id="rId10"/>
     <p:sldId id="262" r:id="rId11"/>
-    <p:sldId id="268" r:id="rId12"/>
-    <p:sldId id="271" r:id="rId13"/>
-    <p:sldId id="270" r:id="rId14"/>
-    <p:sldId id="272" r:id="rId15"/>
-    <p:sldId id="273" r:id="rId16"/>
-    <p:sldId id="274" r:id="rId17"/>
-    <p:sldId id="275" r:id="rId18"/>
-    <p:sldId id="276" r:id="rId19"/>
-    <p:sldId id="277" r:id="rId20"/>
+    <p:sldId id="271" r:id="rId12"/>
+    <p:sldId id="270" r:id="rId13"/>
+    <p:sldId id="272" r:id="rId14"/>
+    <p:sldId id="273" r:id="rId15"/>
+    <p:sldId id="274" r:id="rId16"/>
+    <p:sldId id="275" r:id="rId17"/>
+    <p:sldId id="276" r:id="rId18"/>
+    <p:sldId id="277" r:id="rId19"/>
+    <p:sldId id="279" r:id="rId20"/>
+    <p:sldId id="278" r:id="rId21"/>
   </p:sldIdLst>
   <p:sldSz cx="12192000" cy="6858000"/>
   <p:notesSz cx="6858000" cy="9144000"/>
@@ -152,7 +153,6 @@
         <p14:section name="Results" id="{6F96C0F7-2CBF-41E1-A440-B68F9DBAA433}">
           <p14:sldIdLst>
             <p14:sldId id="262"/>
-            <p14:sldId id="268"/>
             <p14:sldId id="271"/>
             <p14:sldId id="270"/>
             <p14:sldId id="272"/>
@@ -161,6 +161,12 @@
             <p14:sldId id="275"/>
             <p14:sldId id="276"/>
             <p14:sldId id="277"/>
+            <p14:sldId id="279"/>
+          </p14:sldIdLst>
+        </p14:section>
+        <p14:section name="Discussion" id="{E912D6C5-E59D-4C4B-AFC3-D4EB802A759C}">
+          <p14:sldIdLst>
+            <p14:sldId id="278"/>
           </p14:sldIdLst>
         </p14:section>
       </p14:sectionLst>
@@ -5602,6 +5608,54 @@
           <a:chExt cx="0" cy="0"/>
         </a:xfrm>
       </p:grpSpPr>
+      <p:pic>
+        <p:nvPicPr>
+          <p:cNvPr id="7" name="Picture 6"/>
+          <p:cNvPicPr>
+            <a:picLocks noChangeAspect="1"/>
+          </p:cNvPicPr>
+          <p:nvPr/>
+        </p:nvPicPr>
+        <p:blipFill>
+          <a:blip r:embed="rId2"/>
+          <a:stretch>
+            <a:fillRect/>
+          </a:stretch>
+        </p:blipFill>
+        <p:spPr>
+          <a:xfrm>
+            <a:off x="3626229" y="1941943"/>
+            <a:ext cx="3454478" cy="3299348"/>
+          </a:xfrm>
+          <a:prstGeom prst="rect">
+            <a:avLst/>
+          </a:prstGeom>
+        </p:spPr>
+      </p:pic>
+      <p:pic>
+        <p:nvPicPr>
+          <p:cNvPr id="6" name="Picture 5"/>
+          <p:cNvPicPr>
+            <a:picLocks noChangeAspect="1"/>
+          </p:cNvPicPr>
+          <p:nvPr/>
+        </p:nvPicPr>
+        <p:blipFill>
+          <a:blip r:embed="rId3"/>
+          <a:stretch>
+            <a:fillRect/>
+          </a:stretch>
+        </p:blipFill>
+        <p:spPr>
+          <a:xfrm>
+            <a:off x="414704" y="193431"/>
+            <a:ext cx="3723772" cy="2725615"/>
+          </a:xfrm>
+          <a:prstGeom prst="rect">
+            <a:avLst/>
+          </a:prstGeom>
+        </p:spPr>
+      </p:pic>
       <p:sp>
         <p:nvSpPr>
           <p:cNvPr id="2" name="Title 1"/>
@@ -5619,7 +5673,7 @@
           <a:p>
             <a:r>
               <a:rPr lang="en-US" dirty="0" smtClean="0"/>
-              <a:t>Results</a:t>
+              <a:t>Clusters</a:t>
             </a:r>
             <a:endParaRPr lang="en-US" dirty="0"/>
           </a:p>
@@ -5627,57 +5681,197 @@
       </p:sp>
       <p:sp>
         <p:nvSpPr>
-          <p:cNvPr id="3" name="Content Placeholder 2"/>
-          <p:cNvSpPr>
-            <a:spLocks noGrp="1"/>
-          </p:cNvSpPr>
-          <p:nvPr>
-            <p:ph idx="1"/>
-          </p:nvPr>
-        </p:nvSpPr>
-        <p:spPr/>
-        <p:txBody>
-          <a:bodyPr/>
+          <p:cNvPr id="5" name="TextBox 4"/>
+          <p:cNvSpPr txBox="1"/>
+          <p:nvPr/>
+        </p:nvSpPr>
+        <p:spPr>
+          <a:xfrm>
+            <a:off x="1012015" y="1172088"/>
+            <a:ext cx="2127738" cy="553998"/>
+          </a:xfrm>
+          <a:prstGeom prst="rect">
+            <a:avLst/>
+          </a:prstGeom>
+          <a:noFill/>
+        </p:spPr>
+        <p:txBody>
+          <a:bodyPr wrap="square" rtlCol="0">
+            <a:spAutoFit/>
+          </a:bodyPr>
           <a:lstStyle/>
           <a:p>
             <a:r>
               <a:rPr lang="en-US" dirty="0" smtClean="0"/>
-              <a:t>219+162 genes</a:t>
-            </a:r>
-          </a:p>
+              <a:t>Cluster 7</a:t>
+            </a:r>
+          </a:p>
+          <a:p>
+            <a:r>
+              <a:rPr lang="en-US" sz="1200" dirty="0" smtClean="0"/>
+              <a:t>p=2.896e-4</a:t>
+            </a:r>
+            <a:endParaRPr lang="en-US" sz="1200" dirty="0"/>
+          </a:p>
+        </p:txBody>
+      </p:sp>
+      <p:sp>
+        <p:nvSpPr>
+          <p:cNvPr id="8" name="TextBox 7"/>
+          <p:cNvSpPr txBox="1"/>
+          <p:nvPr/>
+        </p:nvSpPr>
+        <p:spPr>
+          <a:xfrm>
+            <a:off x="4094657" y="2541355"/>
+            <a:ext cx="1009956" cy="553998"/>
+          </a:xfrm>
+          <a:prstGeom prst="rect">
+            <a:avLst/>
+          </a:prstGeom>
+          <a:noFill/>
+        </p:spPr>
+        <p:txBody>
+          <a:bodyPr wrap="none" rtlCol="0">
+            <a:spAutoFit/>
+          </a:bodyPr>
+          <a:lstStyle/>
           <a:p>
             <a:r>
               <a:rPr lang="en-US" dirty="0" smtClean="0"/>
-              <a:t>6995+5712 </a:t>
-            </a:r>
-            <a:r>
-              <a:rPr lang="en-US" dirty="0" err="1" smtClean="0"/>
-              <a:t>coexpression</a:t>
-            </a:r>
+              <a:t>Cluster 8</a:t>
+            </a:r>
+          </a:p>
+          <a:p>
+            <a:r>
+              <a:rPr lang="en-US" sz="1200" dirty="0" smtClean="0"/>
+              <a:t>p=7.329e-7</a:t>
+            </a:r>
+          </a:p>
+        </p:txBody>
+      </p:sp>
+      <p:pic>
+        <p:nvPicPr>
+          <p:cNvPr id="9" name="Picture 8"/>
+          <p:cNvPicPr>
+            <a:picLocks noChangeAspect="1"/>
+          </p:cNvPicPr>
+          <p:nvPr/>
+        </p:nvPicPr>
+        <p:blipFill>
+          <a:blip r:embed="rId4"/>
+          <a:stretch>
+            <a:fillRect/>
+          </a:stretch>
+        </p:blipFill>
+        <p:spPr>
+          <a:xfrm>
+            <a:off x="6878453" y="618090"/>
+            <a:ext cx="1687790" cy="1691630"/>
+          </a:xfrm>
+          <a:prstGeom prst="rect">
+            <a:avLst/>
+          </a:prstGeom>
+        </p:spPr>
+      </p:pic>
+      <p:sp>
+        <p:nvSpPr>
+          <p:cNvPr id="10" name="TextBox 9"/>
+          <p:cNvSpPr txBox="1"/>
+          <p:nvPr/>
+        </p:nvSpPr>
+        <p:spPr>
+          <a:xfrm>
+            <a:off x="6427177" y="618090"/>
+            <a:ext cx="1126975" cy="553998"/>
+          </a:xfrm>
+          <a:prstGeom prst="rect">
+            <a:avLst/>
+          </a:prstGeom>
+          <a:noFill/>
+        </p:spPr>
+        <p:txBody>
+          <a:bodyPr wrap="none" rtlCol="0">
+            <a:spAutoFit/>
+          </a:bodyPr>
+          <a:lstStyle/>
+          <a:p>
             <a:r>
               <a:rPr lang="en-US" dirty="0" smtClean="0"/>
-              <a:t> results</a:t>
-            </a:r>
-          </a:p>
+              <a:t>Cluster 20</a:t>
+            </a:r>
+          </a:p>
+          <a:p>
+            <a:r>
+              <a:rPr lang="en-US" sz="1200" dirty="0" smtClean="0"/>
+              <a:t>p=0.010</a:t>
+            </a:r>
+          </a:p>
+        </p:txBody>
+      </p:sp>
+      <p:pic>
+        <p:nvPicPr>
+          <p:cNvPr id="11" name="Picture 10"/>
+          <p:cNvPicPr>
+            <a:picLocks noChangeAspect="1"/>
+          </p:cNvPicPr>
+          <p:nvPr/>
+        </p:nvPicPr>
+        <p:blipFill>
+          <a:blip r:embed="rId5"/>
+          <a:stretch>
+            <a:fillRect/>
+          </a:stretch>
+        </p:blipFill>
+        <p:spPr>
+          <a:xfrm>
+            <a:off x="9626420" y="3528403"/>
+            <a:ext cx="1584123" cy="1460363"/>
+          </a:xfrm>
+          <a:prstGeom prst="rect">
+            <a:avLst/>
+          </a:prstGeom>
+        </p:spPr>
+      </p:pic>
+      <p:sp>
+        <p:nvSpPr>
+          <p:cNvPr id="12" name="TextBox 11"/>
+          <p:cNvSpPr txBox="1"/>
+          <p:nvPr/>
+        </p:nvSpPr>
+        <p:spPr>
+          <a:xfrm>
+            <a:off x="9177229" y="3208737"/>
+            <a:ext cx="1126975" cy="553998"/>
+          </a:xfrm>
+          <a:prstGeom prst="rect">
+            <a:avLst/>
+          </a:prstGeom>
+          <a:noFill/>
+        </p:spPr>
+        <p:txBody>
+          <a:bodyPr wrap="none" rtlCol="0">
+            <a:spAutoFit/>
+          </a:bodyPr>
+          <a:lstStyle/>
           <a:p>
             <a:r>
               <a:rPr lang="en-US" dirty="0" smtClean="0"/>
-              <a:t>4 significant clusters</a:t>
-            </a:r>
-          </a:p>
-          <a:p>
-            <a:r>
-              <a:rPr lang="en-US" dirty="0" smtClean="0"/>
-              <a:t>6 significant networks</a:t>
-            </a:r>
-            <a:endParaRPr lang="en-US" dirty="0"/>
+              <a:t>Cluster 21</a:t>
+            </a:r>
+          </a:p>
+          <a:p>
+            <a:r>
+              <a:rPr lang="en-US" sz="1200" dirty="0" smtClean="0"/>
+              <a:t>p=0.021</a:t>
+            </a:r>
           </a:p>
         </p:txBody>
       </p:sp>
     </p:spTree>
     <p:extLst>
       <p:ext uri="{BB962C8B-B14F-4D97-AF65-F5344CB8AC3E}">
-        <p14:creationId xmlns:p14="http://schemas.microsoft.com/office/powerpoint/2010/main" val="3603035915"/>
+        <p14:creationId xmlns:p14="http://schemas.microsoft.com/office/powerpoint/2010/main" val="3722865200"/>
       </p:ext>
     </p:extLst>
   </p:cSld>
@@ -5704,33 +5898,84 @@
           <a:chExt cx="0" cy="0"/>
         </a:xfrm>
       </p:grpSpPr>
+      <p:sp>
+        <p:nvSpPr>
+          <p:cNvPr id="2" name="Title 1"/>
+          <p:cNvSpPr>
+            <a:spLocks noGrp="1"/>
+          </p:cNvSpPr>
+          <p:nvPr>
+            <p:ph type="title"/>
+          </p:nvPr>
+        </p:nvSpPr>
+        <p:spPr/>
+        <p:txBody>
+          <a:bodyPr/>
+          <a:lstStyle/>
+          <a:p>
+            <a:r>
+              <a:rPr lang="en-US" dirty="0" smtClean="0"/>
+              <a:t>Network 7-1</a:t>
+            </a:r>
+            <a:endParaRPr lang="en-US" dirty="0"/>
+          </a:p>
+        </p:txBody>
+      </p:sp>
+      <p:sp>
+        <p:nvSpPr>
+          <p:cNvPr id="4" name="Text Placeholder 3"/>
+          <p:cNvSpPr>
+            <a:spLocks noGrp="1"/>
+          </p:cNvSpPr>
+          <p:nvPr>
+            <p:ph type="body" sz="half" idx="2"/>
+          </p:nvPr>
+        </p:nvSpPr>
+        <p:spPr/>
+        <p:txBody>
+          <a:bodyPr/>
+          <a:lstStyle/>
+          <a:p>
+            <a:r>
+              <a:rPr lang="en-US" dirty="0" smtClean="0"/>
+              <a:t>A standard cataract-related network</a:t>
+            </a:r>
+            <a:endParaRPr lang="en-US" dirty="0"/>
+          </a:p>
+        </p:txBody>
+      </p:sp>
       <p:pic>
         <p:nvPicPr>
-          <p:cNvPr id="7" name="Picture 6"/>
+          <p:cNvPr id="8" name="Content Placeholder 7"/>
           <p:cNvPicPr>
-            <a:picLocks noChangeAspect="1"/>
+            <a:picLocks noGrp="1" noChangeAspect="1"/>
           </p:cNvPicPr>
-          <p:nvPr/>
+          <p:nvPr>
+            <p:ph idx="1"/>
+          </p:nvPr>
         </p:nvPicPr>
         <p:blipFill>
-          <a:blip r:embed="rId2"/>
+          <a:blip r:embed="rId2" cstate="print">
+            <a:extLst>
+              <a:ext uri="{28A0092B-C50C-407E-A947-70E740481C1C}">
+                <a14:useLocalDpi xmlns:a14="http://schemas.microsoft.com/office/drawing/2010/main" val="0"/>
+              </a:ext>
+            </a:extLst>
+          </a:blip>
           <a:stretch>
             <a:fillRect/>
           </a:stretch>
         </p:blipFill>
         <p:spPr>
           <a:xfrm>
-            <a:off x="3626229" y="1941943"/>
-            <a:ext cx="3454478" cy="3299348"/>
-          </a:xfrm>
-          <a:prstGeom prst="rect">
-            <a:avLst/>
-          </a:prstGeom>
+            <a:off x="5058224" y="731838"/>
+            <a:ext cx="5977627" cy="5257800"/>
+          </a:xfrm>
         </p:spPr>
       </p:pic>
       <p:pic>
         <p:nvPicPr>
-          <p:cNvPr id="6" name="Picture 5"/>
+          <p:cNvPr id="9" name="Picture 8"/>
           <p:cNvPicPr>
             <a:picLocks noChangeAspect="1"/>
           </p:cNvPicPr>
@@ -5744,230 +5989,18 @@
         </p:blipFill>
         <p:spPr>
           <a:xfrm>
-            <a:off x="414704" y="193431"/>
-            <a:ext cx="3723772" cy="2725615"/>
+            <a:off x="321307" y="2039726"/>
+            <a:ext cx="3472185" cy="2642023"/>
           </a:xfrm>
           <a:prstGeom prst="rect">
             <a:avLst/>
           </a:prstGeom>
         </p:spPr>
       </p:pic>
-      <p:sp>
-        <p:nvSpPr>
-          <p:cNvPr id="2" name="Title 1"/>
-          <p:cNvSpPr>
-            <a:spLocks noGrp="1"/>
-          </p:cNvSpPr>
-          <p:nvPr>
-            <p:ph type="title"/>
-          </p:nvPr>
-        </p:nvSpPr>
-        <p:spPr/>
-        <p:txBody>
-          <a:bodyPr/>
-          <a:lstStyle/>
-          <a:p>
-            <a:r>
-              <a:rPr lang="en-US" dirty="0" smtClean="0"/>
-              <a:t>Clusters</a:t>
-            </a:r>
-            <a:endParaRPr lang="en-US" dirty="0"/>
-          </a:p>
-        </p:txBody>
-      </p:sp>
-      <p:sp>
-        <p:nvSpPr>
-          <p:cNvPr id="5" name="TextBox 4"/>
-          <p:cNvSpPr txBox="1"/>
-          <p:nvPr/>
-        </p:nvSpPr>
-        <p:spPr>
-          <a:xfrm>
-            <a:off x="1012015" y="1172088"/>
-            <a:ext cx="2127738" cy="553998"/>
-          </a:xfrm>
-          <a:prstGeom prst="rect">
-            <a:avLst/>
-          </a:prstGeom>
-          <a:noFill/>
-        </p:spPr>
-        <p:txBody>
-          <a:bodyPr wrap="square" rtlCol="0">
-            <a:spAutoFit/>
-          </a:bodyPr>
-          <a:lstStyle/>
-          <a:p>
-            <a:r>
-              <a:rPr lang="en-US" dirty="0" smtClean="0"/>
-              <a:t>Cluster 7</a:t>
-            </a:r>
-          </a:p>
-          <a:p>
-            <a:r>
-              <a:rPr lang="en-US" sz="1200" dirty="0" smtClean="0"/>
-              <a:t>p=2.896e-4</a:t>
-            </a:r>
-            <a:endParaRPr lang="en-US" sz="1200" dirty="0"/>
-          </a:p>
-        </p:txBody>
-      </p:sp>
-      <p:sp>
-        <p:nvSpPr>
-          <p:cNvPr id="8" name="TextBox 7"/>
-          <p:cNvSpPr txBox="1"/>
-          <p:nvPr/>
-        </p:nvSpPr>
-        <p:spPr>
-          <a:xfrm>
-            <a:off x="4094657" y="2541355"/>
-            <a:ext cx="1009956" cy="553998"/>
-          </a:xfrm>
-          <a:prstGeom prst="rect">
-            <a:avLst/>
-          </a:prstGeom>
-          <a:noFill/>
-        </p:spPr>
-        <p:txBody>
-          <a:bodyPr wrap="none" rtlCol="0">
-            <a:spAutoFit/>
-          </a:bodyPr>
-          <a:lstStyle/>
-          <a:p>
-            <a:r>
-              <a:rPr lang="en-US" dirty="0" smtClean="0"/>
-              <a:t>Cluster 8</a:t>
-            </a:r>
-          </a:p>
-          <a:p>
-            <a:r>
-              <a:rPr lang="en-US" sz="1200" dirty="0" smtClean="0"/>
-              <a:t>p=7.329e-7</a:t>
-            </a:r>
-          </a:p>
-        </p:txBody>
-      </p:sp>
-      <p:pic>
-        <p:nvPicPr>
-          <p:cNvPr id="9" name="Picture 8"/>
-          <p:cNvPicPr>
-            <a:picLocks noChangeAspect="1"/>
-          </p:cNvPicPr>
-          <p:nvPr/>
-        </p:nvPicPr>
-        <p:blipFill>
-          <a:blip r:embed="rId4"/>
-          <a:stretch>
-            <a:fillRect/>
-          </a:stretch>
-        </p:blipFill>
-        <p:spPr>
-          <a:xfrm>
-            <a:off x="6878453" y="618090"/>
-            <a:ext cx="1687790" cy="1691630"/>
-          </a:xfrm>
-          <a:prstGeom prst="rect">
-            <a:avLst/>
-          </a:prstGeom>
-        </p:spPr>
-      </p:pic>
-      <p:sp>
-        <p:nvSpPr>
-          <p:cNvPr id="10" name="TextBox 9"/>
-          <p:cNvSpPr txBox="1"/>
-          <p:nvPr/>
-        </p:nvSpPr>
-        <p:spPr>
-          <a:xfrm>
-            <a:off x="6427177" y="618090"/>
-            <a:ext cx="1126975" cy="553998"/>
-          </a:xfrm>
-          <a:prstGeom prst="rect">
-            <a:avLst/>
-          </a:prstGeom>
-          <a:noFill/>
-        </p:spPr>
-        <p:txBody>
-          <a:bodyPr wrap="none" rtlCol="0">
-            <a:spAutoFit/>
-          </a:bodyPr>
-          <a:lstStyle/>
-          <a:p>
-            <a:r>
-              <a:rPr lang="en-US" dirty="0" smtClean="0"/>
-              <a:t>Cluster 20</a:t>
-            </a:r>
-          </a:p>
-          <a:p>
-            <a:r>
-              <a:rPr lang="en-US" sz="1200" dirty="0" smtClean="0"/>
-              <a:t>p=0.010</a:t>
-            </a:r>
-          </a:p>
-        </p:txBody>
-      </p:sp>
-      <p:pic>
-        <p:nvPicPr>
-          <p:cNvPr id="11" name="Picture 10"/>
-          <p:cNvPicPr>
-            <a:picLocks noChangeAspect="1"/>
-          </p:cNvPicPr>
-          <p:nvPr/>
-        </p:nvPicPr>
-        <p:blipFill>
-          <a:blip r:embed="rId5"/>
-          <a:stretch>
-            <a:fillRect/>
-          </a:stretch>
-        </p:blipFill>
-        <p:spPr>
-          <a:xfrm>
-            <a:off x="9626420" y="3528403"/>
-            <a:ext cx="1584123" cy="1460363"/>
-          </a:xfrm>
-          <a:prstGeom prst="rect">
-            <a:avLst/>
-          </a:prstGeom>
-        </p:spPr>
-      </p:pic>
-      <p:sp>
-        <p:nvSpPr>
-          <p:cNvPr id="12" name="TextBox 11"/>
-          <p:cNvSpPr txBox="1"/>
-          <p:nvPr/>
-        </p:nvSpPr>
-        <p:spPr>
-          <a:xfrm>
-            <a:off x="9177229" y="3208737"/>
-            <a:ext cx="1126975" cy="553998"/>
-          </a:xfrm>
-          <a:prstGeom prst="rect">
-            <a:avLst/>
-          </a:prstGeom>
-          <a:noFill/>
-        </p:spPr>
-        <p:txBody>
-          <a:bodyPr wrap="none" rtlCol="0">
-            <a:spAutoFit/>
-          </a:bodyPr>
-          <a:lstStyle/>
-          <a:p>
-            <a:r>
-              <a:rPr lang="en-US" dirty="0" smtClean="0"/>
-              <a:t>Cluster 21</a:t>
-            </a:r>
-          </a:p>
-          <a:p>
-            <a:r>
-              <a:rPr lang="en-US" sz="1200" dirty="0" smtClean="0"/>
-              <a:t>p=0.021</a:t>
-            </a:r>
-          </a:p>
-        </p:txBody>
-      </p:sp>
     </p:spTree>
     <p:extLst>
       <p:ext uri="{BB962C8B-B14F-4D97-AF65-F5344CB8AC3E}">
-        <p14:creationId xmlns:p14="http://schemas.microsoft.com/office/powerpoint/2010/main" val="3722865200"/>
+        <p14:creationId xmlns:p14="http://schemas.microsoft.com/office/powerpoint/2010/main" val="4180889026"/>
       </p:ext>
     </p:extLst>
   </p:cSld>
@@ -6011,7 +6044,7 @@
           <a:p>
             <a:r>
               <a:rPr lang="en-US" dirty="0" smtClean="0"/>
-              <a:t>Network 7-1</a:t>
+              <a:t>Network 7-2</a:t>
             </a:r>
             <a:endParaRPr lang="en-US" dirty="0"/>
           </a:p>
@@ -6032,13 +6065,38 @@
           <a:bodyPr/>
           <a:lstStyle/>
           <a:p>
+            <a:endParaRPr lang="en-US" dirty="0" smtClean="0"/>
+          </a:p>
+          <a:p>
+            <a:endParaRPr lang="en-US" dirty="0"/>
+          </a:p>
+          <a:p>
+            <a:endParaRPr lang="en-US" dirty="0" smtClean="0"/>
+          </a:p>
+          <a:p>
+            <a:endParaRPr lang="en-US" dirty="0"/>
+          </a:p>
+          <a:p>
+            <a:endParaRPr lang="en-US" dirty="0" smtClean="0"/>
+          </a:p>
+          <a:p>
+            <a:endParaRPr lang="en-US" dirty="0"/>
+          </a:p>
+          <a:p>
+            <a:endParaRPr lang="en-US" dirty="0" smtClean="0"/>
+          </a:p>
+          <a:p>
+            <a:r>
+              <a:rPr lang="en-US" dirty="0" smtClean="0"/>
+              <a:t>This network shows many functions related to keratinization (insertion of keratin into skin/hair cells)</a:t>
+            </a:r>
             <a:endParaRPr lang="en-US" dirty="0"/>
           </a:p>
         </p:txBody>
       </p:sp>
       <p:pic>
         <p:nvPicPr>
-          <p:cNvPr id="8" name="Content Placeholder 7"/>
+          <p:cNvPr id="7" name="Content Placeholder 6"/>
           <p:cNvPicPr>
             <a:picLocks noGrp="1" noChangeAspect="1"/>
           </p:cNvPicPr>
@@ -6060,15 +6118,39 @@
         </p:blipFill>
         <p:spPr>
           <a:xfrm>
-            <a:off x="5058224" y="731838"/>
-            <a:ext cx="5977627" cy="5257800"/>
-          </a:xfrm>
+            <a:off x="1652468" y="731838"/>
+            <a:ext cx="4965938" cy="5257800"/>
+          </a:xfrm>
+        </p:spPr>
+      </p:pic>
+      <p:pic>
+        <p:nvPicPr>
+          <p:cNvPr id="3" name="Picture 2"/>
+          <p:cNvPicPr>
+            <a:picLocks noChangeAspect="1"/>
+          </p:cNvPicPr>
+          <p:nvPr/>
+        </p:nvPicPr>
+        <p:blipFill>
+          <a:blip r:embed="rId3"/>
+          <a:stretch>
+            <a:fillRect/>
+          </a:stretch>
+        </p:blipFill>
+        <p:spPr>
+          <a:xfrm>
+            <a:off x="8406127" y="1705232"/>
+            <a:ext cx="3472185" cy="2642023"/>
+          </a:xfrm>
+          <a:prstGeom prst="rect">
+            <a:avLst/>
+          </a:prstGeom>
         </p:spPr>
       </p:pic>
     </p:spTree>
     <p:extLst>
       <p:ext uri="{BB962C8B-B14F-4D97-AF65-F5344CB8AC3E}">
-        <p14:creationId xmlns:p14="http://schemas.microsoft.com/office/powerpoint/2010/main" val="4180889026"/>
+        <p14:creationId xmlns:p14="http://schemas.microsoft.com/office/powerpoint/2010/main" val="2213459273"/>
       </p:ext>
     </p:extLst>
   </p:cSld>
@@ -6112,7 +6194,7 @@
           <a:p>
             <a:r>
               <a:rPr lang="en-US" dirty="0" smtClean="0"/>
-              <a:t>Network 7-2</a:t>
+              <a:t>Network 8-1</a:t>
             </a:r>
             <a:endParaRPr lang="en-US" dirty="0"/>
           </a:p>
@@ -6135,7 +6217,7 @@
           <a:p>
             <a:r>
               <a:rPr lang="en-US" dirty="0" smtClean="0"/>
-              <a:t>This network is </a:t>
+              <a:t>Another cataract-focused network.</a:t>
             </a:r>
             <a:endParaRPr lang="en-US" dirty="0"/>
           </a:p>
@@ -6143,7 +6225,7 @@
       </p:sp>
       <p:pic>
         <p:nvPicPr>
-          <p:cNvPr id="7" name="Content Placeholder 6"/>
+          <p:cNvPr id="8" name="Content Placeholder 7"/>
           <p:cNvPicPr>
             <a:picLocks noGrp="1" noChangeAspect="1"/>
           </p:cNvPicPr>
@@ -6165,15 +6247,39 @@
         </p:blipFill>
         <p:spPr>
           <a:xfrm>
-            <a:off x="1652468" y="731838"/>
-            <a:ext cx="4965938" cy="5257800"/>
-          </a:xfrm>
+            <a:off x="4800600" y="797347"/>
+            <a:ext cx="6492875" cy="5126782"/>
+          </a:xfrm>
+        </p:spPr>
+      </p:pic>
+      <p:pic>
+        <p:nvPicPr>
+          <p:cNvPr id="7" name="Picture 6"/>
+          <p:cNvPicPr>
+            <a:picLocks noChangeAspect="1"/>
+          </p:cNvPicPr>
+          <p:nvPr/>
+        </p:nvPicPr>
+        <p:blipFill>
+          <a:blip r:embed="rId3"/>
+          <a:stretch>
+            <a:fillRect/>
+          </a:stretch>
+        </p:blipFill>
+        <p:spPr>
+          <a:xfrm>
+            <a:off x="321307" y="2039726"/>
+            <a:ext cx="3472185" cy="2642023"/>
+          </a:xfrm>
+          <a:prstGeom prst="rect">
+            <a:avLst/>
+          </a:prstGeom>
         </p:spPr>
       </p:pic>
     </p:spTree>
     <p:extLst>
       <p:ext uri="{BB962C8B-B14F-4D97-AF65-F5344CB8AC3E}">
-        <p14:creationId xmlns:p14="http://schemas.microsoft.com/office/powerpoint/2010/main" val="2213459273"/>
+        <p14:creationId xmlns:p14="http://schemas.microsoft.com/office/powerpoint/2010/main" val="2712752138"/>
       </p:ext>
     </p:extLst>
   </p:cSld>
@@ -6217,7 +6323,7 @@
           <a:p>
             <a:r>
               <a:rPr lang="en-US" dirty="0" smtClean="0"/>
-              <a:t>Network 8-1</a:t>
+              <a:t>Network 8-2</a:t>
             </a:r>
             <a:endParaRPr lang="en-US" dirty="0"/>
           </a:p>
@@ -6244,7 +6350,7 @@
       </p:sp>
       <p:pic>
         <p:nvPicPr>
-          <p:cNvPr id="8" name="Content Placeholder 7"/>
+          <p:cNvPr id="7" name="Content Placeholder 6"/>
           <p:cNvPicPr>
             <a:picLocks noGrp="1" noChangeAspect="1"/>
           </p:cNvPicPr>
@@ -6266,15 +6372,39 @@
         </p:blipFill>
         <p:spPr>
           <a:xfrm>
-            <a:off x="4800600" y="797347"/>
-            <a:ext cx="6492875" cy="5126782"/>
-          </a:xfrm>
+            <a:off x="889000" y="868184"/>
+            <a:ext cx="6492875" cy="4985108"/>
+          </a:xfrm>
+        </p:spPr>
+      </p:pic>
+      <p:pic>
+        <p:nvPicPr>
+          <p:cNvPr id="8" name="Picture 7"/>
+          <p:cNvPicPr>
+            <a:picLocks noChangeAspect="1"/>
+          </p:cNvPicPr>
+          <p:nvPr/>
+        </p:nvPicPr>
+        <p:blipFill>
+          <a:blip r:embed="rId3"/>
+          <a:stretch>
+            <a:fillRect/>
+          </a:stretch>
+        </p:blipFill>
+        <p:spPr>
+          <a:xfrm>
+            <a:off x="8406127" y="2039726"/>
+            <a:ext cx="3472185" cy="2642023"/>
+          </a:xfrm>
+          <a:prstGeom prst="rect">
+            <a:avLst/>
+          </a:prstGeom>
         </p:spPr>
       </p:pic>
     </p:spTree>
     <p:extLst>
       <p:ext uri="{BB962C8B-B14F-4D97-AF65-F5344CB8AC3E}">
-        <p14:creationId xmlns:p14="http://schemas.microsoft.com/office/powerpoint/2010/main" val="2712752138"/>
+        <p14:creationId xmlns:p14="http://schemas.microsoft.com/office/powerpoint/2010/main" val="1475227174"/>
       </p:ext>
     </p:extLst>
   </p:cSld>
@@ -6318,7 +6448,7 @@
           <a:p>
             <a:r>
               <a:rPr lang="en-US" dirty="0" smtClean="0"/>
-              <a:t>Network 8-2</a:t>
+              <a:t>Network 20-1</a:t>
             </a:r>
             <a:endParaRPr lang="en-US" dirty="0"/>
           </a:p>
@@ -6339,7 +6469,11 @@
           <a:bodyPr/>
           <a:lstStyle/>
           <a:p>
-            <a:endParaRPr lang="en-US"/>
+            <a:r>
+              <a:rPr lang="en-US" dirty="0" smtClean="0"/>
+              <a:t>A network related to metabolism, especially of sugars.</a:t>
+            </a:r>
+            <a:endParaRPr lang="en-US" dirty="0"/>
           </a:p>
         </p:txBody>
       </p:sp>
@@ -6354,7 +6488,7 @@
           </p:nvPr>
         </p:nvPicPr>
         <p:blipFill>
-          <a:blip r:embed="rId2" cstate="print">
+          <a:blip r:embed="rId2">
             <a:extLst>
               <a:ext uri="{28A0092B-C50C-407E-A947-70E740481C1C}">
                 <a14:useLocalDpi xmlns:a14="http://schemas.microsoft.com/office/drawing/2010/main" val="0"/>
@@ -6367,15 +6501,39 @@
         </p:blipFill>
         <p:spPr>
           <a:xfrm>
-            <a:off x="889000" y="868184"/>
-            <a:ext cx="6492875" cy="4985108"/>
-          </a:xfrm>
+            <a:off x="5704674" y="731838"/>
+            <a:ext cx="4684727" cy="5257800"/>
+          </a:xfrm>
+        </p:spPr>
+      </p:pic>
+      <p:pic>
+        <p:nvPicPr>
+          <p:cNvPr id="5" name="Picture 4"/>
+          <p:cNvPicPr>
+            <a:picLocks noChangeAspect="1"/>
+          </p:cNvPicPr>
+          <p:nvPr/>
+        </p:nvPicPr>
+        <p:blipFill>
+          <a:blip r:embed="rId3"/>
+          <a:stretch>
+            <a:fillRect/>
+          </a:stretch>
+        </p:blipFill>
+        <p:spPr>
+          <a:xfrm>
+            <a:off x="317392" y="2318101"/>
+            <a:ext cx="3480016" cy="2647982"/>
+          </a:xfrm>
+          <a:prstGeom prst="rect">
+            <a:avLst/>
+          </a:prstGeom>
         </p:spPr>
       </p:pic>
     </p:spTree>
     <p:extLst>
       <p:ext uri="{BB962C8B-B14F-4D97-AF65-F5344CB8AC3E}">
-        <p14:creationId xmlns:p14="http://schemas.microsoft.com/office/powerpoint/2010/main" val="1475227174"/>
+        <p14:creationId xmlns:p14="http://schemas.microsoft.com/office/powerpoint/2010/main" val="2012370489"/>
       </p:ext>
     </p:extLst>
   </p:cSld>
@@ -6419,7 +6577,7 @@
           <a:p>
             <a:r>
               <a:rPr lang="en-US" dirty="0" smtClean="0"/>
-              <a:t>Network 20-1</a:t>
+              <a:t>Network 21-1</a:t>
             </a:r>
             <a:endParaRPr lang="en-US" dirty="0"/>
           </a:p>
@@ -6455,7 +6613,7 @@
           </p:nvPr>
         </p:nvPicPr>
         <p:blipFill>
-          <a:blip r:embed="rId2">
+          <a:blip r:embed="rId2" cstate="print">
             <a:extLst>
               <a:ext uri="{28A0092B-C50C-407E-A947-70E740481C1C}">
                 <a14:useLocalDpi xmlns:a14="http://schemas.microsoft.com/office/drawing/2010/main" val="0"/>
@@ -6468,15 +6626,39 @@
         </p:blipFill>
         <p:spPr>
           <a:xfrm>
-            <a:off x="5704674" y="731838"/>
-            <a:ext cx="4684727" cy="5257800"/>
-          </a:xfrm>
+            <a:off x="1017483" y="731838"/>
+            <a:ext cx="6235908" cy="5257800"/>
+          </a:xfrm>
+        </p:spPr>
+      </p:pic>
+      <p:pic>
+        <p:nvPicPr>
+          <p:cNvPr id="6" name="Picture 5"/>
+          <p:cNvPicPr>
+            <a:picLocks noChangeAspect="1"/>
+          </p:cNvPicPr>
+          <p:nvPr/>
+        </p:nvPicPr>
+        <p:blipFill>
+          <a:blip r:embed="rId3"/>
+          <a:stretch>
+            <a:fillRect/>
+          </a:stretch>
+        </p:blipFill>
+        <p:spPr>
+          <a:xfrm>
+            <a:off x="8402212" y="2036747"/>
+            <a:ext cx="3480016" cy="2647982"/>
+          </a:xfrm>
+          <a:prstGeom prst="rect">
+            <a:avLst/>
+          </a:prstGeom>
         </p:spPr>
       </p:pic>
     </p:spTree>
     <p:extLst>
       <p:ext uri="{BB962C8B-B14F-4D97-AF65-F5344CB8AC3E}">
-        <p14:creationId xmlns:p14="http://schemas.microsoft.com/office/powerpoint/2010/main" val="2012370489"/>
+        <p14:creationId xmlns:p14="http://schemas.microsoft.com/office/powerpoint/2010/main" val="2042388585"/>
       </p:ext>
     </p:extLst>
   </p:cSld>
@@ -6515,39 +6697,22 @@
         </p:nvSpPr>
         <p:spPr/>
         <p:txBody>
-          <a:bodyPr/>
-          <a:lstStyle/>
-          <a:p>
-            <a:r>
-              <a:rPr lang="en-US" dirty="0" smtClean="0"/>
-              <a:t>Network 21-1</a:t>
-            </a:r>
-            <a:endParaRPr lang="en-US" dirty="0"/>
-          </a:p>
-        </p:txBody>
-      </p:sp>
-      <p:sp>
-        <p:nvSpPr>
-          <p:cNvPr id="4" name="Text Placeholder 3"/>
-          <p:cNvSpPr>
-            <a:spLocks noGrp="1"/>
-          </p:cNvSpPr>
-          <p:nvPr>
-            <p:ph type="body" sz="half" idx="2"/>
-          </p:nvPr>
-        </p:nvSpPr>
-        <p:spPr/>
-        <p:txBody>
-          <a:bodyPr/>
-          <a:lstStyle/>
-          <a:p>
-            <a:endParaRPr lang="en-US"/>
+          <a:bodyPr>
+            <a:normAutofit/>
+          </a:bodyPr>
+          <a:lstStyle/>
+          <a:p>
+            <a:r>
+              <a:rPr lang="en-US" sz="4000" dirty="0" smtClean="0"/>
+              <a:t>Cluster 20 – fructose metabolism pathway</a:t>
+            </a:r>
+            <a:endParaRPr lang="en-US" sz="4000" dirty="0"/>
           </a:p>
         </p:txBody>
       </p:sp>
       <p:pic>
         <p:nvPicPr>
-          <p:cNvPr id="7" name="Content Placeholder 6"/>
+          <p:cNvPr id="4" name="Content Placeholder 3"/>
           <p:cNvPicPr>
             <a:picLocks noGrp="1" noChangeAspect="1"/>
           </p:cNvPicPr>
@@ -6569,15 +6734,15 @@
         </p:blipFill>
         <p:spPr>
           <a:xfrm>
-            <a:off x="1017483" y="731838"/>
-            <a:ext cx="6235908" cy="5257800"/>
+            <a:off x="3941309" y="1846263"/>
+            <a:ext cx="4369708" cy="4022725"/>
           </a:xfrm>
         </p:spPr>
       </p:pic>
     </p:spTree>
     <p:extLst>
       <p:ext uri="{BB962C8B-B14F-4D97-AF65-F5344CB8AC3E}">
-        <p14:creationId xmlns:p14="http://schemas.microsoft.com/office/powerpoint/2010/main" val="2042388585"/>
+        <p14:creationId xmlns:p14="http://schemas.microsoft.com/office/powerpoint/2010/main" val="1318042560"/>
       </p:ext>
     </p:extLst>
   </p:cSld>
@@ -6604,37 +6769,16 @@
           <a:chExt cx="0" cy="0"/>
         </a:xfrm>
       </p:grpSpPr>
-      <p:sp>
-        <p:nvSpPr>
-          <p:cNvPr id="2" name="Title 1"/>
-          <p:cNvSpPr>
-            <a:spLocks noGrp="1"/>
-          </p:cNvSpPr>
-          <p:nvPr>
-            <p:ph type="title"/>
-          </p:nvPr>
-        </p:nvSpPr>
-        <p:spPr/>
-        <p:txBody>
-          <a:bodyPr/>
-          <a:lstStyle/>
-          <a:p>
-            <a:endParaRPr lang="en-US" dirty="0"/>
-          </a:p>
-        </p:txBody>
-      </p:sp>
       <p:pic>
         <p:nvPicPr>
-          <p:cNvPr id="4" name="Content Placeholder 3"/>
+          <p:cNvPr id="2" name="Picture 1"/>
           <p:cNvPicPr>
-            <a:picLocks noGrp="1" noChangeAspect="1"/>
+            <a:picLocks noChangeAspect="1"/>
           </p:cNvPicPr>
-          <p:nvPr>
-            <p:ph idx="1"/>
-          </p:nvPr>
+          <p:nvPr/>
         </p:nvPicPr>
         <p:blipFill>
-          <a:blip r:embed="rId2" cstate="print">
+          <a:blip r:embed="rId2">
             <a:extLst>
               <a:ext uri="{28A0092B-C50C-407E-A947-70E740481C1C}">
                 <a14:useLocalDpi xmlns:a14="http://schemas.microsoft.com/office/drawing/2010/main" val="0"/>
@@ -6647,15 +6791,348 @@
         </p:blipFill>
         <p:spPr>
           <a:xfrm>
-            <a:off x="3941309" y="1846263"/>
-            <a:ext cx="4369708" cy="4022725"/>
-          </a:xfrm>
+            <a:off x="101112" y="477715"/>
+            <a:ext cx="4634280" cy="2291862"/>
+          </a:xfrm>
+          <a:prstGeom prst="rect">
+            <a:avLst/>
+          </a:prstGeom>
+        </p:spPr>
+      </p:pic>
+      <p:pic>
+        <p:nvPicPr>
+          <p:cNvPr id="3" name="Picture 2"/>
+          <p:cNvPicPr>
+            <a:picLocks noChangeAspect="1"/>
+          </p:cNvPicPr>
+          <p:nvPr/>
+        </p:nvPicPr>
+        <p:blipFill>
+          <a:blip r:embed="rId3">
+            <a:extLst>
+              <a:ext uri="{28A0092B-C50C-407E-A947-70E740481C1C}">
+                <a14:useLocalDpi xmlns:a14="http://schemas.microsoft.com/office/drawing/2010/main" val="0"/>
+              </a:ext>
+            </a:extLst>
+          </a:blip>
+          <a:stretch>
+            <a:fillRect/>
+          </a:stretch>
+        </p:blipFill>
+        <p:spPr>
+          <a:xfrm>
+            <a:off x="6375685" y="482477"/>
+            <a:ext cx="4641592" cy="2287100"/>
+          </a:xfrm>
+          <a:prstGeom prst="rect">
+            <a:avLst/>
+          </a:prstGeom>
+        </p:spPr>
+      </p:pic>
+      <p:pic>
+        <p:nvPicPr>
+          <p:cNvPr id="4" name="Picture 3"/>
+          <p:cNvPicPr>
+            <a:picLocks noChangeAspect="1"/>
+          </p:cNvPicPr>
+          <p:nvPr/>
+        </p:nvPicPr>
+        <p:blipFill>
+          <a:blip r:embed="rId4">
+            <a:extLst>
+              <a:ext uri="{28A0092B-C50C-407E-A947-70E740481C1C}">
+                <a14:useLocalDpi xmlns:a14="http://schemas.microsoft.com/office/drawing/2010/main" val="0"/>
+              </a:ext>
+            </a:extLst>
+          </a:blip>
+          <a:stretch>
+            <a:fillRect/>
+          </a:stretch>
+        </p:blipFill>
+        <p:spPr>
+          <a:xfrm>
+            <a:off x="110834" y="3625362"/>
+            <a:ext cx="4624558" cy="2287100"/>
+          </a:xfrm>
+          <a:prstGeom prst="rect">
+            <a:avLst/>
+          </a:prstGeom>
+        </p:spPr>
+      </p:pic>
+      <p:pic>
+        <p:nvPicPr>
+          <p:cNvPr id="5" name="Picture 4"/>
+          <p:cNvPicPr>
+            <a:picLocks noChangeAspect="1"/>
+          </p:cNvPicPr>
+          <p:nvPr/>
+        </p:nvPicPr>
+        <p:blipFill>
+          <a:blip r:embed="rId5">
+            <a:extLst>
+              <a:ext uri="{28A0092B-C50C-407E-A947-70E740481C1C}">
+                <a14:useLocalDpi xmlns:a14="http://schemas.microsoft.com/office/drawing/2010/main" val="0"/>
+              </a:ext>
+            </a:extLst>
+          </a:blip>
+          <a:stretch>
+            <a:fillRect/>
+          </a:stretch>
+        </p:blipFill>
+        <p:spPr>
+          <a:xfrm>
+            <a:off x="6369294" y="3625362"/>
+            <a:ext cx="4654375" cy="2287100"/>
+          </a:xfrm>
+          <a:prstGeom prst="rect">
+            <a:avLst/>
+          </a:prstGeom>
+        </p:spPr>
+      </p:pic>
+      <p:pic>
+        <p:nvPicPr>
+          <p:cNvPr id="6" name="Picture 5"/>
+          <p:cNvPicPr>
+            <a:picLocks noChangeAspect="1"/>
+          </p:cNvPicPr>
+          <p:nvPr/>
+        </p:nvPicPr>
+        <p:blipFill>
+          <a:blip r:embed="rId6" cstate="print">
+            <a:extLst>
+              <a:ext uri="{28A0092B-C50C-407E-A947-70E740481C1C}">
+                <a14:useLocalDpi xmlns:a14="http://schemas.microsoft.com/office/drawing/2010/main" val="0"/>
+              </a:ext>
+            </a:extLst>
+          </a:blip>
+          <a:stretch>
+            <a:fillRect/>
+          </a:stretch>
+        </p:blipFill>
+        <p:spPr>
+          <a:xfrm>
+            <a:off x="4823315" y="477715"/>
+            <a:ext cx="1016376" cy="500796"/>
+          </a:xfrm>
+          <a:prstGeom prst="rect">
+            <a:avLst/>
+          </a:prstGeom>
+        </p:spPr>
+      </p:pic>
+      <p:pic>
+        <p:nvPicPr>
+          <p:cNvPr id="7" name="Picture 6"/>
+          <p:cNvPicPr>
+            <a:picLocks noChangeAspect="1"/>
+          </p:cNvPicPr>
+          <p:nvPr/>
+        </p:nvPicPr>
+        <p:blipFill>
+          <a:blip r:embed="rId7" cstate="print">
+            <a:extLst>
+              <a:ext uri="{28A0092B-C50C-407E-A947-70E740481C1C}">
+                <a14:useLocalDpi xmlns:a14="http://schemas.microsoft.com/office/drawing/2010/main" val="0"/>
+              </a:ext>
+            </a:extLst>
+          </a:blip>
+          <a:stretch>
+            <a:fillRect/>
+          </a:stretch>
+        </p:blipFill>
+        <p:spPr>
+          <a:xfrm>
+            <a:off x="4822420" y="1122850"/>
+            <a:ext cx="1017271" cy="500796"/>
+          </a:xfrm>
+          <a:prstGeom prst="rect">
+            <a:avLst/>
+          </a:prstGeom>
+        </p:spPr>
+      </p:pic>
+      <p:pic>
+        <p:nvPicPr>
+          <p:cNvPr id="8" name="Picture 7"/>
+          <p:cNvPicPr>
+            <a:picLocks noChangeAspect="1"/>
+          </p:cNvPicPr>
+          <p:nvPr/>
+        </p:nvPicPr>
+        <p:blipFill>
+          <a:blip r:embed="rId8" cstate="print">
+            <a:extLst>
+              <a:ext uri="{28A0092B-C50C-407E-A947-70E740481C1C}">
+                <a14:useLocalDpi xmlns:a14="http://schemas.microsoft.com/office/drawing/2010/main" val="0"/>
+              </a:ext>
+            </a:extLst>
+          </a:blip>
+          <a:stretch>
+            <a:fillRect/>
+          </a:stretch>
+        </p:blipFill>
+        <p:spPr>
+          <a:xfrm>
+            <a:off x="11144090" y="477715"/>
+            <a:ext cx="977228" cy="301504"/>
+          </a:xfrm>
+          <a:prstGeom prst="rect">
+            <a:avLst/>
+          </a:prstGeom>
+        </p:spPr>
+      </p:pic>
+      <p:pic>
+        <p:nvPicPr>
+          <p:cNvPr id="9" name="Picture 8"/>
+          <p:cNvPicPr>
+            <a:picLocks noChangeAspect="1"/>
+          </p:cNvPicPr>
+          <p:nvPr/>
+        </p:nvPicPr>
+        <p:blipFill>
+          <a:blip r:embed="rId9" cstate="print">
+            <a:extLst>
+              <a:ext uri="{28A0092B-C50C-407E-A947-70E740481C1C}">
+                <a14:useLocalDpi xmlns:a14="http://schemas.microsoft.com/office/drawing/2010/main" val="0"/>
+              </a:ext>
+            </a:extLst>
+          </a:blip>
+          <a:stretch>
+            <a:fillRect/>
+          </a:stretch>
+        </p:blipFill>
+        <p:spPr>
+          <a:xfrm>
+            <a:off x="11144090" y="978511"/>
+            <a:ext cx="1018193" cy="500796"/>
+          </a:xfrm>
+          <a:prstGeom prst="rect">
+            <a:avLst/>
+          </a:prstGeom>
+        </p:spPr>
+      </p:pic>
+      <p:pic>
+        <p:nvPicPr>
+          <p:cNvPr id="10" name="Picture 9"/>
+          <p:cNvPicPr>
+            <a:picLocks noChangeAspect="1"/>
+          </p:cNvPicPr>
+          <p:nvPr/>
+        </p:nvPicPr>
+        <p:blipFill>
+          <a:blip r:embed="rId10" cstate="print">
+            <a:extLst>
+              <a:ext uri="{28A0092B-C50C-407E-A947-70E740481C1C}">
+                <a14:useLocalDpi xmlns:a14="http://schemas.microsoft.com/office/drawing/2010/main" val="0"/>
+              </a:ext>
+            </a:extLst>
+          </a:blip>
+          <a:stretch>
+            <a:fillRect/>
+          </a:stretch>
+        </p:blipFill>
+        <p:spPr>
+          <a:xfrm>
+            <a:off x="4822420" y="3625362"/>
+            <a:ext cx="1017271" cy="501719"/>
+          </a:xfrm>
+          <a:prstGeom prst="rect">
+            <a:avLst/>
+          </a:prstGeom>
+        </p:spPr>
+      </p:pic>
+      <p:pic>
+        <p:nvPicPr>
+          <p:cNvPr id="11" name="Picture 10"/>
+          <p:cNvPicPr>
+            <a:picLocks noChangeAspect="1"/>
+          </p:cNvPicPr>
+          <p:nvPr/>
+        </p:nvPicPr>
+        <p:blipFill>
+          <a:blip r:embed="rId11" cstate="print">
+            <a:extLst>
+              <a:ext uri="{28A0092B-C50C-407E-A947-70E740481C1C}">
+                <a14:useLocalDpi xmlns:a14="http://schemas.microsoft.com/office/drawing/2010/main" val="0"/>
+              </a:ext>
+            </a:extLst>
+          </a:blip>
+          <a:stretch>
+            <a:fillRect/>
+          </a:stretch>
+        </p:blipFill>
+        <p:spPr>
+          <a:xfrm>
+            <a:off x="11104020" y="3625361"/>
+            <a:ext cx="1017298" cy="501719"/>
+          </a:xfrm>
+          <a:prstGeom prst="rect">
+            <a:avLst/>
+          </a:prstGeom>
+        </p:spPr>
+      </p:pic>
+      <p:pic>
+        <p:nvPicPr>
+          <p:cNvPr id="12" name="Picture 11"/>
+          <p:cNvPicPr>
+            <a:picLocks noChangeAspect="1"/>
+          </p:cNvPicPr>
+          <p:nvPr/>
+        </p:nvPicPr>
+        <p:blipFill>
+          <a:blip r:embed="rId12" cstate="print">
+            <a:extLst>
+              <a:ext uri="{28A0092B-C50C-407E-A947-70E740481C1C}">
+                <a14:useLocalDpi xmlns:a14="http://schemas.microsoft.com/office/drawing/2010/main" val="0"/>
+              </a:ext>
+            </a:extLst>
+          </a:blip>
+          <a:stretch>
+            <a:fillRect/>
+          </a:stretch>
+        </p:blipFill>
+        <p:spPr>
+          <a:xfrm>
+            <a:off x="11102171" y="4325449"/>
+            <a:ext cx="1019147" cy="500796"/>
+          </a:xfrm>
+          <a:prstGeom prst="rect">
+            <a:avLst/>
+          </a:prstGeom>
+        </p:spPr>
+      </p:pic>
+      <p:pic>
+        <p:nvPicPr>
+          <p:cNvPr id="13" name="Picture 12"/>
+          <p:cNvPicPr>
+            <a:picLocks noChangeAspect="1"/>
+          </p:cNvPicPr>
+          <p:nvPr/>
+        </p:nvPicPr>
+        <p:blipFill>
+          <a:blip r:embed="rId13" cstate="print">
+            <a:extLst>
+              <a:ext uri="{28A0092B-C50C-407E-A947-70E740481C1C}">
+                <a14:useLocalDpi xmlns:a14="http://schemas.microsoft.com/office/drawing/2010/main" val="0"/>
+              </a:ext>
+            </a:extLst>
+          </a:blip>
+          <a:stretch>
+            <a:fillRect/>
+          </a:stretch>
+        </p:blipFill>
+        <p:spPr>
+          <a:xfrm>
+            <a:off x="11102171" y="5024614"/>
+            <a:ext cx="1017271" cy="501706"/>
+          </a:xfrm>
+          <a:prstGeom prst="rect">
+            <a:avLst/>
+          </a:prstGeom>
         </p:spPr>
       </p:pic>
     </p:spTree>
     <p:extLst>
       <p:ext uri="{BB962C8B-B14F-4D97-AF65-F5344CB8AC3E}">
-        <p14:creationId xmlns:p14="http://schemas.microsoft.com/office/powerpoint/2010/main" val="1318042560"/>
+        <p14:creationId xmlns:p14="http://schemas.microsoft.com/office/powerpoint/2010/main" val="412148268"/>
       </p:ext>
     </p:extLst>
   </p:cSld>
@@ -6722,6 +7199,59 @@
       </p:par>
     </p:tnLst>
   </p:timing>
+</p:sld>
+</file>
+
+<file path=ppt/slides/slide20.xml><?xml version="1.0" encoding="utf-8"?>
+<p:sld xmlns:a="http://schemas.openxmlformats.org/drawingml/2006/main" xmlns:r="http://schemas.openxmlformats.org/officeDocument/2006/relationships" xmlns:p="http://schemas.openxmlformats.org/presentationml/2006/main">
+  <p:cSld>
+    <p:spTree>
+      <p:nvGrpSpPr>
+        <p:cNvPr id="1" name=""/>
+        <p:cNvGrpSpPr/>
+        <p:nvPr/>
+      </p:nvGrpSpPr>
+      <p:grpSpPr>
+        <a:xfrm>
+          <a:off x="0" y="0"/>
+          <a:ext cx="0" cy="0"/>
+          <a:chOff x="0" y="0"/>
+          <a:chExt cx="0" cy="0"/>
+        </a:xfrm>
+      </p:grpSpPr>
+      <p:sp>
+        <p:nvSpPr>
+          <p:cNvPr id="3" name="Text Placeholder 2"/>
+          <p:cNvSpPr>
+            <a:spLocks noGrp="1"/>
+          </p:cNvSpPr>
+          <p:nvPr>
+            <p:ph type="body" idx="1"/>
+          </p:nvPr>
+        </p:nvSpPr>
+        <p:spPr/>
+        <p:txBody>
+          <a:bodyPr/>
+          <a:lstStyle/>
+          <a:p>
+            <a:r>
+              <a:rPr lang="en-US" dirty="0" smtClean="0"/>
+              <a:t>Discussion</a:t>
+            </a:r>
+            <a:endParaRPr lang="en-US" dirty="0"/>
+          </a:p>
+        </p:txBody>
+      </p:sp>
+    </p:spTree>
+    <p:extLst>
+      <p:ext uri="{BB962C8B-B14F-4D97-AF65-F5344CB8AC3E}">
+        <p14:creationId xmlns:p14="http://schemas.microsoft.com/office/powerpoint/2010/main" val="2471942181"/>
+      </p:ext>
+    </p:extLst>
+  </p:cSld>
+  <p:clrMapOvr>
+    <a:masterClrMapping/>
+  </p:clrMapOvr>
 </p:sld>
 </file>
 
@@ -7587,11 +8117,7 @@
             </a:r>
             <a:r>
               <a:rPr lang="en-US" sz="2400" dirty="0" smtClean="0"/>
-              <a:t> </a:t>
-            </a:r>
-            <a:r>
-              <a:rPr lang="en-US" sz="2400" dirty="0" smtClean="0"/>
-              <a:t>proteins</a:t>
+              <a:t> proteins</a:t>
             </a:r>
           </a:p>
           <a:p>
@@ -7646,7 +8172,6 @@
               <a:rPr lang="en-US" sz="2200" dirty="0" smtClean="0"/>
               <a:t>Through genetic mutations</a:t>
             </a:r>
-            <a:endParaRPr lang="en-US" sz="2200" dirty="0" smtClean="0"/>
           </a:p>
           <a:p>
             <a:pPr algn="just">
@@ -7656,13 +8181,27 @@
             </a:pPr>
             <a:r>
               <a:rPr lang="en-US" sz="2400" dirty="0" smtClean="0"/>
-              <a:t>Currently</a:t>
+              <a:t>Currently, only approved treatment is surgical replacement of the </a:t>
             </a:r>
             <a:r>
               <a:rPr lang="en-US" sz="2400" dirty="0" smtClean="0"/>
-              <a:t>, only approved treatment is surgical replacement of the lens</a:t>
-            </a:r>
-            <a:endParaRPr lang="en-US" sz="2400" dirty="0"/>
+              <a:t>lens</a:t>
+            </a:r>
+          </a:p>
+          <a:p>
+            <a:pPr lvl="1" algn="just">
+              <a:lnSpc>
+                <a:spcPct val="120000"/>
+              </a:lnSpc>
+              <a:spcBef>
+                <a:spcPts val="0"/>
+              </a:spcBef>
+            </a:pPr>
+            <a:r>
+              <a:rPr lang="en-US" sz="2200" dirty="0" smtClean="0"/>
+              <a:t>Presents complications in areas with poor healthcare and/or low wealth</a:t>
+            </a:r>
+            <a:endParaRPr lang="en-US" sz="2200" dirty="0"/>
           </a:p>
           <a:p>
             <a:pPr algn="just">
@@ -7787,7 +8326,7 @@
           </a:bodyPr>
           <a:lstStyle/>
           <a:p>
-            <a:pPr algn="just">
+            <a:pPr lvl="1" algn="just">
               <a:lnSpc>
                 <a:spcPct val="120000"/>
               </a:lnSpc>
@@ -7795,20 +8334,6 @@
             <a:r>
               <a:rPr lang="en-US" sz="2400" dirty="0"/>
               <a:t>Cataract is an immediate result of two factors:</a:t>
-            </a:r>
-          </a:p>
-          <a:p>
-            <a:pPr lvl="1" algn="just">
-              <a:lnSpc>
-                <a:spcPct val="120000"/>
-              </a:lnSpc>
-              <a:spcBef>
-                <a:spcPts val="0"/>
-              </a:spcBef>
-            </a:pPr>
-            <a:r>
-              <a:rPr lang="en-US" sz="2200" dirty="0"/>
-              <a:t>Decrease of glutathione levels</a:t>
             </a:r>
           </a:p>
           <a:p>
@@ -7821,8 +8346,36 @@
               </a:spcBef>
             </a:pPr>
             <a:r>
+              <a:rPr lang="en-US" sz="2100" dirty="0"/>
+              <a:t>Decrease of glutathione levels</a:t>
+            </a:r>
+          </a:p>
+          <a:p>
+            <a:pPr lvl="3" algn="just">
+              <a:lnSpc>
+                <a:spcPct val="120000"/>
+              </a:lnSpc>
+              <a:spcBef>
+                <a:spcPts val="0"/>
+              </a:spcBef>
+            </a:pPr>
+            <a:r>
               <a:rPr lang="en-US" sz="1800" dirty="0"/>
               <a:t>Formation of lens barrier</a:t>
+            </a:r>
+          </a:p>
+          <a:p>
+            <a:pPr lvl="3" algn="just">
+              <a:lnSpc>
+                <a:spcPct val="120000"/>
+              </a:lnSpc>
+              <a:spcBef>
+                <a:spcPts val="0"/>
+              </a:spcBef>
+            </a:pPr>
+            <a:r>
+              <a:rPr lang="en-US" sz="1800" dirty="0"/>
+              <a:t>Decreased recycling efficiency</a:t>
             </a:r>
           </a:p>
           <a:p>
@@ -7835,12 +8388,21 @@
               </a:spcBef>
             </a:pPr>
             <a:r>
-              <a:rPr lang="en-US" sz="1800" dirty="0"/>
-              <a:t>Decreased recycling efficiency</a:t>
-            </a:r>
-          </a:p>
-          <a:p>
-            <a:pPr lvl="1" algn="just">
+              <a:rPr lang="en-US" sz="2100" dirty="0"/>
+              <a:t>Usage of </a:t>
+            </a:r>
+            <a:r>
+              <a:rPr lang="el-GR" sz="2100" dirty="0"/>
+              <a:t>α-</a:t>
+            </a:r>
+            <a:r>
+              <a:rPr lang="en-US" sz="2100" dirty="0" err="1"/>
+              <a:t>crystallin</a:t>
+            </a:r>
+            <a:endParaRPr lang="en-US" sz="2100" dirty="0"/>
+          </a:p>
+          <a:p>
+            <a:pPr lvl="3" algn="just">
               <a:lnSpc>
                 <a:spcPct val="120000"/>
               </a:lnSpc>
@@ -7849,21 +8411,16 @@
               </a:spcBef>
             </a:pPr>
             <a:r>
-              <a:rPr lang="en-US" sz="2200" dirty="0"/>
-              <a:t>Usage of </a:t>
-            </a:r>
-            <a:r>
-              <a:rPr lang="el-GR" sz="2200" dirty="0"/>
-              <a:t>α-</a:t>
-            </a:r>
-            <a:r>
-              <a:rPr lang="en-US" sz="2200" dirty="0" err="1"/>
-              <a:t>crystallin</a:t>
-            </a:r>
-            <a:endParaRPr lang="en-US" sz="2200" dirty="0"/>
-          </a:p>
-          <a:p>
-            <a:pPr lvl="2" algn="just">
+              <a:rPr lang="en-US" sz="1800" dirty="0"/>
+              <a:t>Limited supply; by age 40, no </a:t>
+            </a:r>
+            <a:r>
+              <a:rPr lang="en" sz="1800" dirty="0"/>
+              <a:t>α-crystallin remains</a:t>
+            </a:r>
+          </a:p>
+          <a:p>
+            <a:pPr lvl="3" algn="just">
               <a:lnSpc>
                 <a:spcPct val="120000"/>
               </a:lnSpc>
@@ -7872,24 +8429,6 @@
               </a:spcBef>
             </a:pPr>
             <a:r>
-              <a:rPr lang="en-US" sz="1800" dirty="0"/>
-              <a:t>Limited supply; by age 40, no </a:t>
-            </a:r>
-            <a:r>
-              <a:rPr lang="en" sz="1800" dirty="0"/>
-              <a:t>α-crystallin remains</a:t>
-            </a:r>
-          </a:p>
-          <a:p>
-            <a:pPr lvl="2" algn="just">
-              <a:lnSpc>
-                <a:spcPct val="120000"/>
-              </a:lnSpc>
-              <a:spcBef>
-                <a:spcPts val="0"/>
-              </a:spcBef>
-            </a:pPr>
-            <a:r>
               <a:rPr lang="en" sz="1800" dirty="0"/>
               <a:t>Mutations in crystallin genes can result in nonfunctional </a:t>
             </a:r>
@@ -7900,8 +8439,10 @@
             <a:endParaRPr lang="en-US" sz="2400" dirty="0" smtClean="0"/>
           </a:p>
           <a:p>
-            <a:pPr lvl="1"/>
-            <a:endParaRPr lang="en-US" sz="2400" dirty="0"/>
+            <a:pPr marL="201168" lvl="1" indent="0">
+              <a:buNone/>
+            </a:pPr>
+            <a:endParaRPr lang="en-US" sz="2400" dirty="0" smtClean="0"/>
           </a:p>
           <a:p>
             <a:pPr lvl="1"/>
@@ -7925,11 +8466,7 @@
             <a:pPr lvl="2"/>
             <a:r>
               <a:rPr lang="en-US" sz="2000" dirty="0" smtClean="0"/>
-              <a:t>Pathways can be targeted by drugs to prevent or treat cataract (non-surgically</a:t>
-            </a:r>
-            <a:r>
-              <a:rPr lang="en-US" sz="2000" dirty="0" smtClean="0"/>
-              <a:t>)</a:t>
+              <a:t>Pathways can be targeted by drugs to prevent or treat cataract (non-surgically)</a:t>
             </a:r>
             <a:endParaRPr lang="en-US" sz="2000" dirty="0"/>
           </a:p>
@@ -8106,11 +8643,7 @@
             </a:pPr>
             <a:r>
               <a:rPr lang="en-US" dirty="0" smtClean="0"/>
-              <a:t>Genes found </a:t>
-            </a:r>
-            <a:r>
-              <a:rPr lang="en-US" dirty="0" smtClean="0"/>
-              <a:t>under Cataract disease</a:t>
+              <a:t>Genes found under Cataract disease</a:t>
             </a:r>
             <a:endParaRPr lang="en-US" dirty="0"/>
           </a:p>

</xml_diff>

<commit_message>
notes and suggestions from meeting
</commit_message>
<xml_diff>
--- a/Cataract.pptx
+++ b/Cataract.pptx
@@ -5,32 +5,34 @@
     <p:sldMasterId id="2147483660" r:id="rId1"/>
   </p:sldMasterIdLst>
   <p:notesMasterIdLst>
-    <p:notesMasterId r:id="rId25"/>
+    <p:notesMasterId r:id="rId27"/>
   </p:notesMasterIdLst>
   <p:sldIdLst>
     <p:sldId id="257" r:id="rId2"/>
-    <p:sldId id="260" r:id="rId3"/>
-    <p:sldId id="258" r:id="rId4"/>
-    <p:sldId id="259" r:id="rId5"/>
-    <p:sldId id="263" r:id="rId6"/>
-    <p:sldId id="269" r:id="rId7"/>
-    <p:sldId id="261" r:id="rId8"/>
-    <p:sldId id="266" r:id="rId9"/>
-    <p:sldId id="267" r:id="rId10"/>
-    <p:sldId id="262" r:id="rId11"/>
-    <p:sldId id="271" r:id="rId12"/>
-    <p:sldId id="270" r:id="rId13"/>
-    <p:sldId id="272" r:id="rId14"/>
-    <p:sldId id="273" r:id="rId15"/>
-    <p:sldId id="274" r:id="rId16"/>
-    <p:sldId id="275" r:id="rId17"/>
-    <p:sldId id="276" r:id="rId18"/>
-    <p:sldId id="277" r:id="rId19"/>
-    <p:sldId id="279" r:id="rId20"/>
-    <p:sldId id="278" r:id="rId21"/>
-    <p:sldId id="281" r:id="rId22"/>
-    <p:sldId id="282" r:id="rId23"/>
-    <p:sldId id="280" r:id="rId24"/>
+    <p:sldId id="284" r:id="rId3"/>
+    <p:sldId id="260" r:id="rId4"/>
+    <p:sldId id="258" r:id="rId5"/>
+    <p:sldId id="259" r:id="rId6"/>
+    <p:sldId id="263" r:id="rId7"/>
+    <p:sldId id="269" r:id="rId8"/>
+    <p:sldId id="261" r:id="rId9"/>
+    <p:sldId id="266" r:id="rId10"/>
+    <p:sldId id="267" r:id="rId11"/>
+    <p:sldId id="262" r:id="rId12"/>
+    <p:sldId id="271" r:id="rId13"/>
+    <p:sldId id="270" r:id="rId14"/>
+    <p:sldId id="272" r:id="rId15"/>
+    <p:sldId id="273" r:id="rId16"/>
+    <p:sldId id="274" r:id="rId17"/>
+    <p:sldId id="275" r:id="rId18"/>
+    <p:sldId id="276" r:id="rId19"/>
+    <p:sldId id="277" r:id="rId20"/>
+    <p:sldId id="279" r:id="rId21"/>
+    <p:sldId id="278" r:id="rId22"/>
+    <p:sldId id="281" r:id="rId23"/>
+    <p:sldId id="282" r:id="rId24"/>
+    <p:sldId id="283" r:id="rId25"/>
+    <p:sldId id="280" r:id="rId26"/>
   </p:sldIdLst>
   <p:sldSz cx="12192000" cy="6858000"/>
   <p:notesSz cx="6858000" cy="9144000"/>
@@ -137,6 +139,11 @@
             <p14:sldId id="257"/>
           </p14:sldIdLst>
         </p14:section>
+        <p14:section name="Abstract" id="{2F293969-CF29-4C1F-A699-A6E2A36C3BA6}">
+          <p14:sldIdLst>
+            <p14:sldId id="284"/>
+          </p14:sldIdLst>
+        </p14:section>
         <p14:section name="Introduction" id="{90C9E4BA-0B35-4BF2-A78F-54C38B422968}">
           <p14:sldIdLst>
             <p14:sldId id="260"/>
@@ -172,6 +179,11 @@
             <p14:sldId id="278"/>
             <p14:sldId id="281"/>
             <p14:sldId id="282"/>
+          </p14:sldIdLst>
+        </p14:section>
+        <p14:section name="Conclusion" id="{1DB5F7E9-625E-4E03-9055-13C7EE2C33B7}">
+          <p14:sldIdLst>
+            <p14:sldId id="283"/>
           </p14:sldIdLst>
         </p14:section>
         <p14:section name="Citations" id="{48A66E72-CCBB-4540-B802-D3E3C20AD7D7}">
@@ -984,6 +996,452 @@
     <p:extLst>
       <p:ext uri="{BB962C8B-B14F-4D97-AF65-F5344CB8AC3E}">
         <p14:creationId xmlns:p14="http://schemas.microsoft.com/office/powerpoint/2010/main" val="4242698555"/>
+      </p:ext>
+    </p:extLst>
+  </p:cSld>
+  <p:clrMapOvr>
+    <a:masterClrMapping/>
+  </p:clrMapOvr>
+</p:notes>
+</file>
+
+<file path=ppt/notesSlides/notesSlide5.xml><?xml version="1.0" encoding="utf-8"?>
+<p:notes xmlns:a="http://schemas.openxmlformats.org/drawingml/2006/main" xmlns:r="http://schemas.openxmlformats.org/officeDocument/2006/relationships" xmlns:p="http://schemas.openxmlformats.org/presentationml/2006/main">
+  <p:cSld>
+    <p:spTree>
+      <p:nvGrpSpPr>
+        <p:cNvPr id="1" name=""/>
+        <p:cNvGrpSpPr/>
+        <p:nvPr/>
+      </p:nvGrpSpPr>
+      <p:grpSpPr>
+        <a:xfrm>
+          <a:off x="0" y="0"/>
+          <a:ext cx="0" cy="0"/>
+          <a:chOff x="0" y="0"/>
+          <a:chExt cx="0" cy="0"/>
+        </a:xfrm>
+      </p:grpSpPr>
+      <p:sp>
+        <p:nvSpPr>
+          <p:cNvPr id="2" name="Slide Image Placeholder 1"/>
+          <p:cNvSpPr>
+            <a:spLocks noGrp="1" noRot="1" noChangeAspect="1"/>
+          </p:cNvSpPr>
+          <p:nvPr>
+            <p:ph type="sldImg"/>
+          </p:nvPr>
+        </p:nvSpPr>
+        <p:spPr/>
+      </p:sp>
+      <p:sp>
+        <p:nvSpPr>
+          <p:cNvPr id="3" name="Notes Placeholder 2"/>
+          <p:cNvSpPr>
+            <a:spLocks noGrp="1"/>
+          </p:cNvSpPr>
+          <p:nvPr>
+            <p:ph type="body" idx="1"/>
+          </p:nvPr>
+        </p:nvSpPr>
+        <p:spPr/>
+        <p:txBody>
+          <a:bodyPr/>
+          <a:lstStyle/>
+          <a:p>
+            <a:r>
+              <a:rPr lang="en-US" dirty="0"/>
+              <a:t>Show the entire big fat </a:t>
+            </a:r>
+            <a:r>
+              <a:rPr lang="en-US" dirty="0" err="1"/>
+              <a:t>cytoscape</a:t>
+            </a:r>
+            <a:r>
+              <a:rPr lang="en-US" dirty="0"/>
+              <a:t> network</a:t>
+            </a:r>
+          </a:p>
+          <a:p>
+            <a:r>
+              <a:rPr lang="en-US" dirty="0"/>
+              <a:t>shock and awe tactics</a:t>
+            </a:r>
+          </a:p>
+        </p:txBody>
+      </p:sp>
+      <p:sp>
+        <p:nvSpPr>
+          <p:cNvPr id="4" name="Slide Number Placeholder 3"/>
+          <p:cNvSpPr>
+            <a:spLocks noGrp="1"/>
+          </p:cNvSpPr>
+          <p:nvPr>
+            <p:ph type="sldNum" sz="quarter" idx="5"/>
+          </p:nvPr>
+        </p:nvSpPr>
+        <p:spPr/>
+        <p:txBody>
+          <a:bodyPr/>
+          <a:lstStyle/>
+          <a:p>
+            <a:fld id="{DEA2FB39-1398-40D8-9A7E-B2F7B9CEAD5C}" type="slidenum">
+              <a:rPr lang="en-US" smtClean="0"/>
+              <a:t>12</a:t>
+            </a:fld>
+            <a:endParaRPr lang="en-US"/>
+          </a:p>
+        </p:txBody>
+      </p:sp>
+    </p:spTree>
+    <p:extLst>
+      <p:ext uri="{BB962C8B-B14F-4D97-AF65-F5344CB8AC3E}">
+        <p14:creationId xmlns:p14="http://schemas.microsoft.com/office/powerpoint/2010/main" val="3099366027"/>
+      </p:ext>
+    </p:extLst>
+  </p:cSld>
+  <p:clrMapOvr>
+    <a:masterClrMapping/>
+  </p:clrMapOvr>
+</p:notes>
+</file>
+
+<file path=ppt/notesSlides/notesSlide6.xml><?xml version="1.0" encoding="utf-8"?>
+<p:notes xmlns:a="http://schemas.openxmlformats.org/drawingml/2006/main" xmlns:r="http://schemas.openxmlformats.org/officeDocument/2006/relationships" xmlns:p="http://schemas.openxmlformats.org/presentationml/2006/main">
+  <p:cSld>
+    <p:spTree>
+      <p:nvGrpSpPr>
+        <p:cNvPr id="1" name=""/>
+        <p:cNvGrpSpPr/>
+        <p:nvPr/>
+      </p:nvGrpSpPr>
+      <p:grpSpPr>
+        <a:xfrm>
+          <a:off x="0" y="0"/>
+          <a:ext cx="0" cy="0"/>
+          <a:chOff x="0" y="0"/>
+          <a:chExt cx="0" cy="0"/>
+        </a:xfrm>
+      </p:grpSpPr>
+      <p:sp>
+        <p:nvSpPr>
+          <p:cNvPr id="2" name="Slide Image Placeholder 1"/>
+          <p:cNvSpPr>
+            <a:spLocks noGrp="1" noRot="1" noChangeAspect="1"/>
+          </p:cNvSpPr>
+          <p:nvPr>
+            <p:ph type="sldImg"/>
+          </p:nvPr>
+        </p:nvSpPr>
+        <p:spPr/>
+      </p:sp>
+      <p:sp>
+        <p:nvSpPr>
+          <p:cNvPr id="3" name="Notes Placeholder 2"/>
+          <p:cNvSpPr>
+            <a:spLocks noGrp="1"/>
+          </p:cNvSpPr>
+          <p:nvPr>
+            <p:ph type="body" idx="1"/>
+          </p:nvPr>
+        </p:nvSpPr>
+        <p:spPr/>
+        <p:txBody>
+          <a:bodyPr/>
+          <a:lstStyle/>
+          <a:p>
+            <a:r>
+              <a:rPr lang="en-US" dirty="0"/>
+              <a:t>Organ development; overall, developmental functions</a:t>
+            </a:r>
+          </a:p>
+        </p:txBody>
+      </p:sp>
+      <p:sp>
+        <p:nvSpPr>
+          <p:cNvPr id="4" name="Slide Number Placeholder 3"/>
+          <p:cNvSpPr>
+            <a:spLocks noGrp="1"/>
+          </p:cNvSpPr>
+          <p:nvPr>
+            <p:ph type="sldNum" sz="quarter" idx="5"/>
+          </p:nvPr>
+        </p:nvSpPr>
+        <p:spPr/>
+        <p:txBody>
+          <a:bodyPr/>
+          <a:lstStyle/>
+          <a:p>
+            <a:fld id="{DEA2FB39-1398-40D8-9A7E-B2F7B9CEAD5C}" type="slidenum">
+              <a:rPr lang="en-US" smtClean="0"/>
+              <a:t>16</a:t>
+            </a:fld>
+            <a:endParaRPr lang="en-US"/>
+          </a:p>
+        </p:txBody>
+      </p:sp>
+    </p:spTree>
+    <p:extLst>
+      <p:ext uri="{BB962C8B-B14F-4D97-AF65-F5344CB8AC3E}">
+        <p14:creationId xmlns:p14="http://schemas.microsoft.com/office/powerpoint/2010/main" val="108062794"/>
+      </p:ext>
+    </p:extLst>
+  </p:cSld>
+  <p:clrMapOvr>
+    <a:masterClrMapping/>
+  </p:clrMapOvr>
+</p:notes>
+</file>
+
+<file path=ppt/notesSlides/notesSlide7.xml><?xml version="1.0" encoding="utf-8"?>
+<p:notes xmlns:a="http://schemas.openxmlformats.org/drawingml/2006/main" xmlns:r="http://schemas.openxmlformats.org/officeDocument/2006/relationships" xmlns:p="http://schemas.openxmlformats.org/presentationml/2006/main">
+  <p:cSld>
+    <p:spTree>
+      <p:nvGrpSpPr>
+        <p:cNvPr id="1" name=""/>
+        <p:cNvGrpSpPr/>
+        <p:nvPr/>
+      </p:nvGrpSpPr>
+      <p:grpSpPr>
+        <a:xfrm>
+          <a:off x="0" y="0"/>
+          <a:ext cx="0" cy="0"/>
+          <a:chOff x="0" y="0"/>
+          <a:chExt cx="0" cy="0"/>
+        </a:xfrm>
+      </p:grpSpPr>
+      <p:sp>
+        <p:nvSpPr>
+          <p:cNvPr id="2" name="Slide Image Placeholder 1"/>
+          <p:cNvSpPr>
+            <a:spLocks noGrp="1" noRot="1" noChangeAspect="1"/>
+          </p:cNvSpPr>
+          <p:nvPr>
+            <p:ph type="sldImg"/>
+          </p:nvPr>
+        </p:nvSpPr>
+        <p:spPr/>
+      </p:sp>
+      <p:sp>
+        <p:nvSpPr>
+          <p:cNvPr id="3" name="Notes Placeholder 2"/>
+          <p:cNvSpPr>
+            <a:spLocks noGrp="1"/>
+          </p:cNvSpPr>
+          <p:nvPr>
+            <p:ph type="body" idx="1"/>
+          </p:nvPr>
+        </p:nvSpPr>
+        <p:spPr/>
+        <p:txBody>
+          <a:bodyPr/>
+          <a:lstStyle/>
+          <a:p>
+            <a:endParaRPr lang="en-US" dirty="0"/>
+          </a:p>
+        </p:txBody>
+      </p:sp>
+      <p:sp>
+        <p:nvSpPr>
+          <p:cNvPr id="4" name="Slide Number Placeholder 3"/>
+          <p:cNvSpPr>
+            <a:spLocks noGrp="1"/>
+          </p:cNvSpPr>
+          <p:nvPr>
+            <p:ph type="sldNum" sz="quarter" idx="5"/>
+          </p:nvPr>
+        </p:nvSpPr>
+        <p:spPr/>
+        <p:txBody>
+          <a:bodyPr/>
+          <a:lstStyle/>
+          <a:p>
+            <a:fld id="{DEA2FB39-1398-40D8-9A7E-B2F7B9CEAD5C}" type="slidenum">
+              <a:rPr lang="en-US" smtClean="0"/>
+              <a:t>17</a:t>
+            </a:fld>
+            <a:endParaRPr lang="en-US"/>
+          </a:p>
+        </p:txBody>
+      </p:sp>
+    </p:spTree>
+    <p:extLst>
+      <p:ext uri="{BB962C8B-B14F-4D97-AF65-F5344CB8AC3E}">
+        <p14:creationId xmlns:p14="http://schemas.microsoft.com/office/powerpoint/2010/main" val="2909068006"/>
+      </p:ext>
+    </p:extLst>
+  </p:cSld>
+  <p:clrMapOvr>
+    <a:masterClrMapping/>
+  </p:clrMapOvr>
+</p:notes>
+</file>
+
+<file path=ppt/notesSlides/notesSlide8.xml><?xml version="1.0" encoding="utf-8"?>
+<p:notes xmlns:a="http://schemas.openxmlformats.org/drawingml/2006/main" xmlns:r="http://schemas.openxmlformats.org/officeDocument/2006/relationships" xmlns:p="http://schemas.openxmlformats.org/presentationml/2006/main">
+  <p:cSld>
+    <p:spTree>
+      <p:nvGrpSpPr>
+        <p:cNvPr id="1" name=""/>
+        <p:cNvGrpSpPr/>
+        <p:nvPr/>
+      </p:nvGrpSpPr>
+      <p:grpSpPr>
+        <a:xfrm>
+          <a:off x="0" y="0"/>
+          <a:ext cx="0" cy="0"/>
+          <a:chOff x="0" y="0"/>
+          <a:chExt cx="0" cy="0"/>
+        </a:xfrm>
+      </p:grpSpPr>
+      <p:sp>
+        <p:nvSpPr>
+          <p:cNvPr id="2" name="Slide Image Placeholder 1"/>
+          <p:cNvSpPr>
+            <a:spLocks noGrp="1" noRot="1" noChangeAspect="1"/>
+          </p:cNvSpPr>
+          <p:nvPr>
+            <p:ph type="sldImg"/>
+          </p:nvPr>
+        </p:nvSpPr>
+        <p:spPr/>
+      </p:sp>
+      <p:sp>
+        <p:nvSpPr>
+          <p:cNvPr id="3" name="Notes Placeholder 2"/>
+          <p:cNvSpPr>
+            <a:spLocks noGrp="1"/>
+          </p:cNvSpPr>
+          <p:nvPr>
+            <p:ph type="body" idx="1"/>
+          </p:nvPr>
+        </p:nvSpPr>
+        <p:spPr/>
+        <p:txBody>
+          <a:bodyPr/>
+          <a:lstStyle/>
+          <a:p>
+            <a:r>
+              <a:rPr lang="en-US" dirty="0"/>
+              <a:t>Fructose = sugar = related; emphasize more and downplay the fact that there’s only three (two) genes</a:t>
+            </a:r>
+          </a:p>
+        </p:txBody>
+      </p:sp>
+      <p:sp>
+        <p:nvSpPr>
+          <p:cNvPr id="4" name="Slide Number Placeholder 3"/>
+          <p:cNvSpPr>
+            <a:spLocks noGrp="1"/>
+          </p:cNvSpPr>
+          <p:nvPr>
+            <p:ph type="sldNum" sz="quarter" idx="5"/>
+          </p:nvPr>
+        </p:nvSpPr>
+        <p:spPr/>
+        <p:txBody>
+          <a:bodyPr/>
+          <a:lstStyle/>
+          <a:p>
+            <a:fld id="{DEA2FB39-1398-40D8-9A7E-B2F7B9CEAD5C}" type="slidenum">
+              <a:rPr lang="en-US" smtClean="0"/>
+              <a:t>19</a:t>
+            </a:fld>
+            <a:endParaRPr lang="en-US"/>
+          </a:p>
+        </p:txBody>
+      </p:sp>
+    </p:spTree>
+    <p:extLst>
+      <p:ext uri="{BB962C8B-B14F-4D97-AF65-F5344CB8AC3E}">
+        <p14:creationId xmlns:p14="http://schemas.microsoft.com/office/powerpoint/2010/main" val="3818715673"/>
+      </p:ext>
+    </p:extLst>
+  </p:cSld>
+  <p:clrMapOvr>
+    <a:masterClrMapping/>
+  </p:clrMapOvr>
+</p:notes>
+</file>
+
+<file path=ppt/notesSlides/notesSlide9.xml><?xml version="1.0" encoding="utf-8"?>
+<p:notes xmlns:a="http://schemas.openxmlformats.org/drawingml/2006/main" xmlns:r="http://schemas.openxmlformats.org/officeDocument/2006/relationships" xmlns:p="http://schemas.openxmlformats.org/presentationml/2006/main">
+  <p:cSld>
+    <p:spTree>
+      <p:nvGrpSpPr>
+        <p:cNvPr id="1" name=""/>
+        <p:cNvGrpSpPr/>
+        <p:nvPr/>
+      </p:nvGrpSpPr>
+      <p:grpSpPr>
+        <a:xfrm>
+          <a:off x="0" y="0"/>
+          <a:ext cx="0" cy="0"/>
+          <a:chOff x="0" y="0"/>
+          <a:chExt cx="0" cy="0"/>
+        </a:xfrm>
+      </p:grpSpPr>
+      <p:sp>
+        <p:nvSpPr>
+          <p:cNvPr id="2" name="Slide Image Placeholder 1"/>
+          <p:cNvSpPr>
+            <a:spLocks noGrp="1" noRot="1" noChangeAspect="1"/>
+          </p:cNvSpPr>
+          <p:nvPr>
+            <p:ph type="sldImg"/>
+          </p:nvPr>
+        </p:nvSpPr>
+        <p:spPr/>
+      </p:sp>
+      <p:sp>
+        <p:nvSpPr>
+          <p:cNvPr id="3" name="Notes Placeholder 2"/>
+          <p:cNvSpPr>
+            <a:spLocks noGrp="1"/>
+          </p:cNvSpPr>
+          <p:nvPr>
+            <p:ph type="body" idx="1"/>
+          </p:nvPr>
+        </p:nvSpPr>
+        <p:spPr/>
+        <p:txBody>
+          <a:bodyPr/>
+          <a:lstStyle/>
+          <a:p>
+            <a:r>
+              <a:rPr lang="en-US" dirty="0"/>
+              <a:t>Label ._.</a:t>
+            </a:r>
+          </a:p>
+        </p:txBody>
+      </p:sp>
+      <p:sp>
+        <p:nvSpPr>
+          <p:cNvPr id="4" name="Slide Number Placeholder 3"/>
+          <p:cNvSpPr>
+            <a:spLocks noGrp="1"/>
+          </p:cNvSpPr>
+          <p:nvPr>
+            <p:ph type="sldNum" sz="quarter" idx="5"/>
+          </p:nvPr>
+        </p:nvSpPr>
+        <p:spPr/>
+        <p:txBody>
+          <a:bodyPr/>
+          <a:lstStyle/>
+          <a:p>
+            <a:fld id="{DEA2FB39-1398-40D8-9A7E-B2F7B9CEAD5C}" type="slidenum">
+              <a:rPr lang="en-US" smtClean="0"/>
+              <a:t>20</a:t>
+            </a:fld>
+            <a:endParaRPr lang="en-US"/>
+          </a:p>
+        </p:txBody>
+      </p:sp>
+    </p:spTree>
+    <p:extLst>
+      <p:ext uri="{BB962C8B-B14F-4D97-AF65-F5344CB8AC3E}">
+        <p14:creationId xmlns:p14="http://schemas.microsoft.com/office/powerpoint/2010/main" val="1800719855"/>
       </p:ext>
     </p:extLst>
   </p:cSld>
@@ -5524,13 +5982,6 @@
   <p:clrMapOvr>
     <a:masterClrMapping/>
   </p:clrMapOvr>
-  <p:timing>
-    <p:tnLst>
-      <p:par>
-        <p:cTn id="1" dur="indefinite" restart="never" nodeType="tmRoot"/>
-      </p:par>
-    </p:tnLst>
-  </p:timing>
 </p:sld>
 </file>
 
@@ -5553,6 +6004,525 @@
       </p:grpSpPr>
       <p:sp>
         <p:nvSpPr>
+          <p:cNvPr id="2" name="Title 1"/>
+          <p:cNvSpPr>
+            <a:spLocks noGrp="1"/>
+          </p:cNvSpPr>
+          <p:nvPr>
+            <p:ph type="title"/>
+          </p:nvPr>
+        </p:nvSpPr>
+        <p:spPr/>
+        <p:txBody>
+          <a:bodyPr/>
+          <a:lstStyle/>
+          <a:p>
+            <a:r>
+              <a:rPr lang="en-US" dirty="0"/>
+              <a:t>Methods</a:t>
+            </a:r>
+          </a:p>
+        </p:txBody>
+      </p:sp>
+      <p:sp>
+        <p:nvSpPr>
+          <p:cNvPr id="3" name="Text Placeholder 2"/>
+          <p:cNvSpPr>
+            <a:spLocks noGrp="1"/>
+          </p:cNvSpPr>
+          <p:nvPr>
+            <p:ph type="body" idx="1"/>
+          </p:nvPr>
+        </p:nvSpPr>
+        <p:spPr/>
+        <p:txBody>
+          <a:bodyPr/>
+          <a:lstStyle/>
+          <a:p>
+            <a:r>
+              <a:rPr lang="en-US" dirty="0"/>
+              <a:t>Function Analysis</a:t>
+            </a:r>
+          </a:p>
+        </p:txBody>
+      </p:sp>
+      <p:sp>
+        <p:nvSpPr>
+          <p:cNvPr id="4" name="Content Placeholder 3"/>
+          <p:cNvSpPr>
+            <a:spLocks noGrp="1"/>
+          </p:cNvSpPr>
+          <p:nvPr>
+            <p:ph sz="half" idx="2"/>
+          </p:nvPr>
+        </p:nvSpPr>
+        <p:spPr/>
+        <p:txBody>
+          <a:bodyPr/>
+          <a:lstStyle/>
+          <a:p>
+            <a:r>
+              <a:rPr lang="en-US" dirty="0"/>
+              <a:t>Clusters were analyzed within </a:t>
+            </a:r>
+            <a:r>
+              <a:rPr lang="en-US" dirty="0" err="1"/>
+              <a:t>Cytoscape</a:t>
+            </a:r>
+            <a:r>
+              <a:rPr lang="en-US" dirty="0"/>
+              <a:t> using </a:t>
+            </a:r>
+            <a:r>
+              <a:rPr lang="en-US" dirty="0" err="1"/>
+              <a:t>BinGO</a:t>
+            </a:r>
+            <a:r>
+              <a:rPr lang="en-US" dirty="0"/>
+              <a:t> app</a:t>
+            </a:r>
+          </a:p>
+          <a:p>
+            <a:pPr lvl="1"/>
+            <a:r>
+              <a:rPr lang="en-US" dirty="0"/>
+              <a:t>Yielded function results</a:t>
+            </a:r>
+          </a:p>
+          <a:p>
+            <a:r>
+              <a:rPr lang="en-US" dirty="0"/>
+              <a:t>Clusters were extracted from </a:t>
+            </a:r>
+            <a:r>
+              <a:rPr lang="en-US" dirty="0" err="1"/>
+              <a:t>Cytoscape</a:t>
+            </a:r>
+            <a:r>
+              <a:rPr lang="en-US" dirty="0"/>
+              <a:t> and processed in </a:t>
+            </a:r>
+            <a:r>
+              <a:rPr lang="en-US" dirty="0" err="1"/>
+              <a:t>GeneOntology</a:t>
+            </a:r>
+            <a:endParaRPr lang="en-US" dirty="0"/>
+          </a:p>
+          <a:p>
+            <a:pPr lvl="1"/>
+            <a:r>
+              <a:rPr lang="en-US" dirty="0"/>
+              <a:t>Yielded function and disease connections</a:t>
+            </a:r>
+          </a:p>
+          <a:p>
+            <a:endParaRPr lang="en-US" dirty="0"/>
+          </a:p>
+        </p:txBody>
+      </p:sp>
+      <p:sp>
+        <p:nvSpPr>
+          <p:cNvPr id="5" name="Text Placeholder 4"/>
+          <p:cNvSpPr>
+            <a:spLocks noGrp="1"/>
+          </p:cNvSpPr>
+          <p:nvPr>
+            <p:ph type="body" sz="quarter" idx="3"/>
+          </p:nvPr>
+        </p:nvSpPr>
+        <p:spPr/>
+        <p:txBody>
+          <a:bodyPr/>
+          <a:lstStyle/>
+          <a:p>
+            <a:r>
+              <a:rPr lang="en-US" dirty="0"/>
+              <a:t>Pathway Analysis</a:t>
+            </a:r>
+          </a:p>
+        </p:txBody>
+      </p:sp>
+      <p:sp>
+        <p:nvSpPr>
+          <p:cNvPr id="6" name="Content Placeholder 5"/>
+          <p:cNvSpPr>
+            <a:spLocks noGrp="1"/>
+          </p:cNvSpPr>
+          <p:nvPr>
+            <p:ph sz="quarter" idx="4"/>
+          </p:nvPr>
+        </p:nvSpPr>
+        <p:spPr/>
+        <p:txBody>
+          <a:bodyPr/>
+          <a:lstStyle/>
+          <a:p>
+            <a:r>
+              <a:rPr lang="en-US" dirty="0"/>
+              <a:t>Clusters were processed in DAVID and Ingenuity to search for pathways</a:t>
+            </a:r>
+          </a:p>
+        </p:txBody>
+      </p:sp>
+      <p:grpSp>
+        <p:nvGrpSpPr>
+          <p:cNvPr id="7" name="Group 6"/>
+          <p:cNvGrpSpPr/>
+          <p:nvPr/>
+        </p:nvGrpSpPr>
+        <p:grpSpPr>
+          <a:xfrm>
+            <a:off x="10341032" y="613849"/>
+            <a:ext cx="1138843" cy="606368"/>
+            <a:chOff x="2601884" y="806332"/>
+            <a:chExt cx="6365150" cy="3389076"/>
+          </a:xfrm>
+        </p:grpSpPr>
+        <p:sp>
+          <p:nvSpPr>
+            <p:cNvPr id="8" name="Rounded Rectangle 7"/>
+            <p:cNvSpPr/>
+            <p:nvPr/>
+          </p:nvSpPr>
+          <p:spPr>
+            <a:xfrm>
+              <a:off x="2601884" y="806332"/>
+              <a:ext cx="1737359" cy="2086496"/>
+            </a:xfrm>
+            <a:prstGeom prst="roundRect">
+              <a:avLst/>
+            </a:prstGeom>
+            <a:solidFill>
+              <a:schemeClr val="bg1"/>
+            </a:solidFill>
+            <a:ln>
+              <a:solidFill>
+                <a:srgbClr val="A75F0A"/>
+              </a:solidFill>
+            </a:ln>
+          </p:spPr>
+          <p:style>
+            <a:lnRef idx="2">
+              <a:schemeClr val="accent1">
+                <a:shade val="50000"/>
+              </a:schemeClr>
+            </a:lnRef>
+            <a:fillRef idx="1">
+              <a:schemeClr val="accent1"/>
+            </a:fillRef>
+            <a:effectRef idx="0">
+              <a:schemeClr val="accent1"/>
+            </a:effectRef>
+            <a:fontRef idx="minor">
+              <a:schemeClr val="lt1"/>
+            </a:fontRef>
+          </p:style>
+          <p:txBody>
+            <a:bodyPr rtlCol="0" anchor="ctr"/>
+            <a:lstStyle/>
+            <a:p>
+              <a:pPr algn="ctr"/>
+              <a:endParaRPr lang="en-US" sz="1100" dirty="0">
+                <a:solidFill>
+                  <a:sysClr val="windowText" lastClr="000000"/>
+                </a:solidFill>
+              </a:endParaRPr>
+            </a:p>
+          </p:txBody>
+        </p:sp>
+        <p:sp>
+          <p:nvSpPr>
+            <p:cNvPr id="9" name="Rounded Rectangle 8"/>
+            <p:cNvSpPr/>
+            <p:nvPr/>
+          </p:nvSpPr>
+          <p:spPr>
+            <a:xfrm>
+              <a:off x="4915780" y="806332"/>
+              <a:ext cx="1737359" cy="2086496"/>
+            </a:xfrm>
+            <a:prstGeom prst="roundRect">
+              <a:avLst/>
+            </a:prstGeom>
+            <a:solidFill>
+              <a:schemeClr val="bg1"/>
+            </a:solidFill>
+          </p:spPr>
+          <p:style>
+            <a:lnRef idx="2">
+              <a:schemeClr val="accent1">
+                <a:shade val="50000"/>
+              </a:schemeClr>
+            </a:lnRef>
+            <a:fillRef idx="1">
+              <a:schemeClr val="accent1"/>
+            </a:fillRef>
+            <a:effectRef idx="0">
+              <a:schemeClr val="accent1"/>
+            </a:effectRef>
+            <a:fontRef idx="minor">
+              <a:schemeClr val="lt1"/>
+            </a:fontRef>
+          </p:style>
+          <p:txBody>
+            <a:bodyPr rtlCol="0" anchor="ctr"/>
+            <a:lstStyle/>
+            <a:p>
+              <a:pPr algn="ctr"/>
+              <a:endParaRPr lang="en-US" sz="1100" dirty="0">
+                <a:solidFill>
+                  <a:sysClr val="windowText" lastClr="000000"/>
+                </a:solidFill>
+              </a:endParaRPr>
+            </a:p>
+          </p:txBody>
+        </p:sp>
+        <p:sp>
+          <p:nvSpPr>
+            <p:cNvPr id="10" name="Rounded Rectangle 9"/>
+            <p:cNvSpPr/>
+            <p:nvPr/>
+          </p:nvSpPr>
+          <p:spPr>
+            <a:xfrm>
+              <a:off x="7229675" y="806332"/>
+              <a:ext cx="1737359" cy="2086496"/>
+            </a:xfrm>
+            <a:prstGeom prst="roundRect">
+              <a:avLst/>
+            </a:prstGeom>
+            <a:solidFill>
+              <a:srgbClr val="FF0000"/>
+            </a:solidFill>
+          </p:spPr>
+          <p:style>
+            <a:lnRef idx="2">
+              <a:schemeClr val="accent1">
+                <a:shade val="50000"/>
+              </a:schemeClr>
+            </a:lnRef>
+            <a:fillRef idx="1">
+              <a:schemeClr val="accent1"/>
+            </a:fillRef>
+            <a:effectRef idx="0">
+              <a:schemeClr val="accent1"/>
+            </a:effectRef>
+            <a:fontRef idx="minor">
+              <a:schemeClr val="lt1"/>
+            </a:fontRef>
+          </p:style>
+          <p:txBody>
+            <a:bodyPr rtlCol="0" anchor="ctr"/>
+            <a:lstStyle/>
+            <a:p>
+              <a:pPr algn="ctr"/>
+              <a:endParaRPr lang="en-US" sz="1100" dirty="0">
+                <a:solidFill>
+                  <a:sysClr val="windowText" lastClr="000000"/>
+                </a:solidFill>
+              </a:endParaRPr>
+            </a:p>
+          </p:txBody>
+        </p:sp>
+        <p:sp>
+          <p:nvSpPr>
+            <p:cNvPr id="11" name="Oval 10"/>
+            <p:cNvSpPr/>
+            <p:nvPr/>
+          </p:nvSpPr>
+          <p:spPr>
+            <a:xfrm>
+              <a:off x="6459427" y="3150547"/>
+              <a:ext cx="1044861" cy="1044861"/>
+            </a:xfrm>
+            <a:prstGeom prst="ellipse">
+              <a:avLst/>
+            </a:prstGeom>
+            <a:solidFill>
+              <a:srgbClr val="FF0000"/>
+            </a:solidFill>
+            <a:ln>
+              <a:solidFill>
+                <a:srgbClr val="A75F0A"/>
+              </a:solidFill>
+            </a:ln>
+          </p:spPr>
+          <p:style>
+            <a:lnRef idx="2">
+              <a:schemeClr val="accent1">
+                <a:shade val="50000"/>
+              </a:schemeClr>
+            </a:lnRef>
+            <a:fillRef idx="1">
+              <a:schemeClr val="accent1"/>
+            </a:fillRef>
+            <a:effectRef idx="0">
+              <a:schemeClr val="accent1"/>
+            </a:effectRef>
+            <a:fontRef idx="minor">
+              <a:schemeClr val="lt1"/>
+            </a:fontRef>
+          </p:style>
+          <p:txBody>
+            <a:bodyPr rtlCol="0" anchor="ctr"/>
+            <a:lstStyle/>
+            <a:p>
+              <a:pPr algn="ctr"/>
+              <a:endParaRPr lang="en-US" sz="1100" dirty="0">
+                <a:solidFill>
+                  <a:schemeClr val="tx1"/>
+                </a:solidFill>
+              </a:endParaRPr>
+            </a:p>
+          </p:txBody>
+        </p:sp>
+        <p:cxnSp>
+          <p:nvCxnSpPr>
+            <p:cNvPr id="12" name="Straight Arrow Connector 11"/>
+            <p:cNvCxnSpPr>
+              <a:stCxn id="8" idx="3"/>
+              <a:endCxn id="9" idx="1"/>
+            </p:cNvCxnSpPr>
+            <p:nvPr/>
+          </p:nvCxnSpPr>
+          <p:spPr>
+            <a:xfrm flipV="1">
+              <a:off x="4339244" y="1849580"/>
+              <a:ext cx="576535" cy="1"/>
+            </a:xfrm>
+            <a:prstGeom prst="straightConnector1">
+              <a:avLst/>
+            </a:prstGeom>
+            <a:ln>
+              <a:solidFill>
+                <a:srgbClr val="E48312"/>
+              </a:solidFill>
+              <a:tailEnd type="triangle"/>
+            </a:ln>
+          </p:spPr>
+          <p:style>
+            <a:lnRef idx="1">
+              <a:schemeClr val="accent1"/>
+            </a:lnRef>
+            <a:fillRef idx="0">
+              <a:schemeClr val="accent1"/>
+            </a:fillRef>
+            <a:effectRef idx="0">
+              <a:schemeClr val="accent1"/>
+            </a:effectRef>
+            <a:fontRef idx="minor">
+              <a:schemeClr val="tx1"/>
+            </a:fontRef>
+          </p:style>
+        </p:cxnSp>
+        <p:cxnSp>
+          <p:nvCxnSpPr>
+            <p:cNvPr id="13" name="Straight Arrow Connector 12"/>
+            <p:cNvCxnSpPr>
+              <a:stCxn id="9" idx="3"/>
+              <a:endCxn id="10" idx="1"/>
+            </p:cNvCxnSpPr>
+            <p:nvPr/>
+          </p:nvCxnSpPr>
+          <p:spPr>
+            <a:xfrm>
+              <a:off x="6653139" y="1849580"/>
+              <a:ext cx="576535" cy="0"/>
+            </a:xfrm>
+            <a:prstGeom prst="straightConnector1">
+              <a:avLst/>
+            </a:prstGeom>
+            <a:ln>
+              <a:tailEnd type="triangle"/>
+            </a:ln>
+          </p:spPr>
+          <p:style>
+            <a:lnRef idx="1">
+              <a:schemeClr val="accent1"/>
+            </a:lnRef>
+            <a:fillRef idx="0">
+              <a:schemeClr val="accent1"/>
+            </a:fillRef>
+            <a:effectRef idx="0">
+              <a:schemeClr val="accent1"/>
+            </a:effectRef>
+            <a:fontRef idx="minor">
+              <a:schemeClr val="tx1"/>
+            </a:fontRef>
+          </p:style>
+        </p:cxnSp>
+        <p:cxnSp>
+          <p:nvCxnSpPr>
+            <p:cNvPr id="14" name="Elbow Connector 13"/>
+            <p:cNvCxnSpPr>
+              <a:stCxn id="9" idx="2"/>
+              <a:endCxn id="11" idx="2"/>
+            </p:cNvCxnSpPr>
+            <p:nvPr/>
+          </p:nvCxnSpPr>
+          <p:spPr>
+            <a:xfrm rot="16200000" flipH="1">
+              <a:off x="5731867" y="2945418"/>
+              <a:ext cx="780151" cy="674967"/>
+            </a:xfrm>
+            <a:prstGeom prst="bentConnector2">
+              <a:avLst/>
+            </a:prstGeom>
+            <a:ln>
+              <a:solidFill>
+                <a:srgbClr val="E48312"/>
+              </a:solidFill>
+              <a:tailEnd type="triangle"/>
+            </a:ln>
+          </p:spPr>
+          <p:style>
+            <a:lnRef idx="1">
+              <a:schemeClr val="accent1"/>
+            </a:lnRef>
+            <a:fillRef idx="0">
+              <a:schemeClr val="accent1"/>
+            </a:fillRef>
+            <a:effectRef idx="0">
+              <a:schemeClr val="accent1"/>
+            </a:effectRef>
+            <a:fontRef idx="minor">
+              <a:schemeClr val="tx1"/>
+            </a:fontRef>
+          </p:style>
+        </p:cxnSp>
+      </p:grpSp>
+    </p:spTree>
+    <p:extLst>
+      <p:ext uri="{BB962C8B-B14F-4D97-AF65-F5344CB8AC3E}">
+        <p14:creationId xmlns:p14="http://schemas.microsoft.com/office/powerpoint/2010/main" val="2821775083"/>
+      </p:ext>
+    </p:extLst>
+  </p:cSld>
+  <p:clrMapOvr>
+    <a:masterClrMapping/>
+  </p:clrMapOvr>
+</p:sld>
+</file>
+
+<file path=ppt/slides/slide11.xml><?xml version="1.0" encoding="utf-8"?>
+<p:sld xmlns:a="http://schemas.openxmlformats.org/drawingml/2006/main" xmlns:r="http://schemas.openxmlformats.org/officeDocument/2006/relationships" xmlns:p="http://schemas.openxmlformats.org/presentationml/2006/main">
+  <p:cSld>
+    <p:spTree>
+      <p:nvGrpSpPr>
+        <p:cNvPr id="1" name=""/>
+        <p:cNvGrpSpPr/>
+        <p:nvPr/>
+      </p:nvGrpSpPr>
+      <p:grpSpPr>
+        <a:xfrm>
+          <a:off x="0" y="0"/>
+          <a:ext cx="0" cy="0"/>
+          <a:chOff x="0" y="0"/>
+          <a:chExt cx="0" cy="0"/>
+        </a:xfrm>
+      </p:grpSpPr>
+      <p:sp>
+        <p:nvSpPr>
           <p:cNvPr id="3" name="Text Placeholder 2"/>
           <p:cNvSpPr>
             <a:spLocks noGrp="1"/>
@@ -5583,17 +6553,10 @@
   <p:clrMapOvr>
     <a:masterClrMapping/>
   </p:clrMapOvr>
-  <p:timing>
-    <p:tnLst>
-      <p:par>
-        <p:cTn id="1" dur="indefinite" restart="never" nodeType="tmRoot"/>
-      </p:par>
-    </p:tnLst>
-  </p:timing>
 </p:sld>
 </file>
 
-<file path=ppt/slides/slide11.xml><?xml version="1.0" encoding="utf-8"?>
+<file path=ppt/slides/slide12.xml><?xml version="1.0" encoding="utf-8"?>
 <p:sld xmlns:a="http://schemas.openxmlformats.org/drawingml/2006/main" xmlns:r="http://schemas.openxmlformats.org/officeDocument/2006/relationships" xmlns:p="http://schemas.openxmlformats.org/presentationml/2006/main">
   <p:cSld>
     <p:spTree>
@@ -5619,7 +6582,7 @@
           <p:nvPr/>
         </p:nvPicPr>
         <p:blipFill>
-          <a:blip r:embed="rId2"/>
+          <a:blip r:embed="rId3"/>
           <a:stretch>
             <a:fillRect/>
           </a:stretch>
@@ -5643,122 +6606,6 @@
           <p:nvPr/>
         </p:nvPicPr>
         <p:blipFill>
-          <a:blip r:embed="rId3"/>
-          <a:stretch>
-            <a:fillRect/>
-          </a:stretch>
-        </p:blipFill>
-        <p:spPr>
-          <a:xfrm>
-            <a:off x="414704" y="193431"/>
-            <a:ext cx="3723772" cy="2725615"/>
-          </a:xfrm>
-          <a:prstGeom prst="rect">
-            <a:avLst/>
-          </a:prstGeom>
-        </p:spPr>
-      </p:pic>
-      <p:sp>
-        <p:nvSpPr>
-          <p:cNvPr id="2" name="Title 1"/>
-          <p:cNvSpPr>
-            <a:spLocks noGrp="1"/>
-          </p:cNvSpPr>
-          <p:nvPr>
-            <p:ph type="title"/>
-          </p:nvPr>
-        </p:nvSpPr>
-        <p:spPr/>
-        <p:txBody>
-          <a:bodyPr/>
-          <a:lstStyle/>
-          <a:p>
-            <a:r>
-              <a:rPr lang="en-US" dirty="0"/>
-              <a:t>Clusters</a:t>
-            </a:r>
-          </a:p>
-        </p:txBody>
-      </p:sp>
-      <p:sp>
-        <p:nvSpPr>
-          <p:cNvPr id="5" name="TextBox 4"/>
-          <p:cNvSpPr txBox="1"/>
-          <p:nvPr/>
-        </p:nvSpPr>
-        <p:spPr>
-          <a:xfrm>
-            <a:off x="1012015" y="1172088"/>
-            <a:ext cx="2127738" cy="553998"/>
-          </a:xfrm>
-          <a:prstGeom prst="rect">
-            <a:avLst/>
-          </a:prstGeom>
-          <a:noFill/>
-        </p:spPr>
-        <p:txBody>
-          <a:bodyPr wrap="square" rtlCol="0">
-            <a:spAutoFit/>
-          </a:bodyPr>
-          <a:lstStyle/>
-          <a:p>
-            <a:r>
-              <a:rPr lang="en-US" dirty="0"/>
-              <a:t>Cluster 7</a:t>
-            </a:r>
-          </a:p>
-          <a:p>
-            <a:r>
-              <a:rPr lang="en-US" sz="1200" dirty="0"/>
-              <a:t>p=2.896e-4</a:t>
-            </a:r>
-          </a:p>
-        </p:txBody>
-      </p:sp>
-      <p:sp>
-        <p:nvSpPr>
-          <p:cNvPr id="8" name="TextBox 7"/>
-          <p:cNvSpPr txBox="1"/>
-          <p:nvPr/>
-        </p:nvSpPr>
-        <p:spPr>
-          <a:xfrm>
-            <a:off x="4094657" y="2541355"/>
-            <a:ext cx="1009956" cy="553998"/>
-          </a:xfrm>
-          <a:prstGeom prst="rect">
-            <a:avLst/>
-          </a:prstGeom>
-          <a:noFill/>
-        </p:spPr>
-        <p:txBody>
-          <a:bodyPr wrap="none" rtlCol="0">
-            <a:spAutoFit/>
-          </a:bodyPr>
-          <a:lstStyle/>
-          <a:p>
-            <a:r>
-              <a:rPr lang="en-US" dirty="0"/>
-              <a:t>Cluster 8</a:t>
-            </a:r>
-          </a:p>
-          <a:p>
-            <a:r>
-              <a:rPr lang="en-US" sz="1200" dirty="0"/>
-              <a:t>p=7.329e-7</a:t>
-            </a:r>
-          </a:p>
-        </p:txBody>
-      </p:sp>
-      <p:pic>
-        <p:nvPicPr>
-          <p:cNvPr id="9" name="Picture 8"/>
-          <p:cNvPicPr>
-            <a:picLocks noChangeAspect="1"/>
-          </p:cNvPicPr>
-          <p:nvPr/>
-        </p:nvPicPr>
-        <p:blipFill>
           <a:blip r:embed="rId4"/>
           <a:stretch>
             <a:fillRect/>
@@ -5766,8 +6613,8 @@
         </p:blipFill>
         <p:spPr>
           <a:xfrm>
-            <a:off x="6878453" y="618090"/>
-            <a:ext cx="1687790" cy="1691630"/>
+            <a:off x="414704" y="193431"/>
+            <a:ext cx="3723772" cy="2725615"/>
           </a:xfrm>
           <a:prstGeom prst="rect">
             <a:avLst/>
@@ -5776,14 +6623,36 @@
       </p:pic>
       <p:sp>
         <p:nvSpPr>
-          <p:cNvPr id="10" name="TextBox 9"/>
+          <p:cNvPr id="2" name="Title 1"/>
+          <p:cNvSpPr>
+            <a:spLocks noGrp="1"/>
+          </p:cNvSpPr>
+          <p:nvPr>
+            <p:ph type="title"/>
+          </p:nvPr>
+        </p:nvSpPr>
+        <p:spPr/>
+        <p:txBody>
+          <a:bodyPr/>
+          <a:lstStyle/>
+          <a:p>
+            <a:r>
+              <a:rPr lang="en-US" dirty="0"/>
+              <a:t>Clusters</a:t>
+            </a:r>
+          </a:p>
+        </p:txBody>
+      </p:sp>
+      <p:sp>
+        <p:nvSpPr>
+          <p:cNvPr id="5" name="TextBox 4"/>
           <p:cNvSpPr txBox="1"/>
           <p:nvPr/>
         </p:nvSpPr>
         <p:spPr>
           <a:xfrm>
-            <a:off x="6427177" y="618090"/>
-            <a:ext cx="1126975" cy="553998"/>
+            <a:off x="1012015" y="1172088"/>
+            <a:ext cx="2127738" cy="553998"/>
           </a:xfrm>
           <a:prstGeom prst="rect">
             <a:avLst/>
@@ -5791,6 +6660,41 @@
           <a:noFill/>
         </p:spPr>
         <p:txBody>
+          <a:bodyPr wrap="square" rtlCol="0">
+            <a:spAutoFit/>
+          </a:bodyPr>
+          <a:lstStyle/>
+          <a:p>
+            <a:r>
+              <a:rPr lang="en-US" dirty="0"/>
+              <a:t>Cluster 7</a:t>
+            </a:r>
+          </a:p>
+          <a:p>
+            <a:r>
+              <a:rPr lang="en-US" sz="1200" dirty="0"/>
+              <a:t>p=2.896e-4</a:t>
+            </a:r>
+          </a:p>
+        </p:txBody>
+      </p:sp>
+      <p:sp>
+        <p:nvSpPr>
+          <p:cNvPr id="8" name="TextBox 7"/>
+          <p:cNvSpPr txBox="1"/>
+          <p:nvPr/>
+        </p:nvSpPr>
+        <p:spPr>
+          <a:xfrm>
+            <a:off x="4094657" y="2541355"/>
+            <a:ext cx="1009956" cy="553998"/>
+          </a:xfrm>
+          <a:prstGeom prst="rect">
+            <a:avLst/>
+          </a:prstGeom>
+          <a:noFill/>
+        </p:spPr>
+        <p:txBody>
           <a:bodyPr wrap="none" rtlCol="0">
             <a:spAutoFit/>
           </a:bodyPr>
@@ -5798,20 +6702,20 @@
           <a:p>
             <a:r>
               <a:rPr lang="en-US" dirty="0"/>
-              <a:t>Cluster 20</a:t>
+              <a:t>Cluster 8</a:t>
             </a:r>
           </a:p>
           <a:p>
             <a:r>
               <a:rPr lang="en-US" sz="1200" dirty="0"/>
-              <a:t>p=0.010</a:t>
+              <a:t>p=7.329e-7</a:t>
             </a:r>
           </a:p>
         </p:txBody>
       </p:sp>
       <p:pic>
         <p:nvPicPr>
-          <p:cNvPr id="11" name="Picture 10"/>
+          <p:cNvPr id="9" name="Picture 8"/>
           <p:cNvPicPr>
             <a:picLocks noChangeAspect="1"/>
           </p:cNvPicPr>
@@ -5825,6 +6729,65 @@
         </p:blipFill>
         <p:spPr>
           <a:xfrm>
+            <a:off x="6878453" y="618090"/>
+            <a:ext cx="1687790" cy="1691630"/>
+          </a:xfrm>
+          <a:prstGeom prst="rect">
+            <a:avLst/>
+          </a:prstGeom>
+        </p:spPr>
+      </p:pic>
+      <p:sp>
+        <p:nvSpPr>
+          <p:cNvPr id="10" name="TextBox 9"/>
+          <p:cNvSpPr txBox="1"/>
+          <p:nvPr/>
+        </p:nvSpPr>
+        <p:spPr>
+          <a:xfrm>
+            <a:off x="6427177" y="618090"/>
+            <a:ext cx="1126975" cy="553998"/>
+          </a:xfrm>
+          <a:prstGeom prst="rect">
+            <a:avLst/>
+          </a:prstGeom>
+          <a:noFill/>
+        </p:spPr>
+        <p:txBody>
+          <a:bodyPr wrap="none" rtlCol="0">
+            <a:spAutoFit/>
+          </a:bodyPr>
+          <a:lstStyle/>
+          <a:p>
+            <a:r>
+              <a:rPr lang="en-US" dirty="0"/>
+              <a:t>Cluster 20</a:t>
+            </a:r>
+          </a:p>
+          <a:p>
+            <a:r>
+              <a:rPr lang="en-US" sz="1200" dirty="0"/>
+              <a:t>p=0.010</a:t>
+            </a:r>
+          </a:p>
+        </p:txBody>
+      </p:sp>
+      <p:pic>
+        <p:nvPicPr>
+          <p:cNvPr id="11" name="Picture 10"/>
+          <p:cNvPicPr>
+            <a:picLocks noChangeAspect="1"/>
+          </p:cNvPicPr>
+          <p:nvPr/>
+        </p:nvPicPr>
+        <p:blipFill>
+          <a:blip r:embed="rId6"/>
+          <a:stretch>
+            <a:fillRect/>
+          </a:stretch>
+        </p:blipFill>
+        <p:spPr>
+          <a:xfrm>
             <a:off x="9626420" y="3528403"/>
             <a:ext cx="1584123" cy="1460363"/>
           </a:xfrm>
@@ -5878,173 +6841,6 @@
   <p:clrMapOvr>
     <a:masterClrMapping/>
   </p:clrMapOvr>
-  <p:timing>
-    <p:tnLst>
-      <p:par>
-        <p:cTn id="1" dur="indefinite" restart="never" nodeType="tmRoot"/>
-      </p:par>
-    </p:tnLst>
-  </p:timing>
-</p:sld>
-</file>
-
-<file path=ppt/slides/slide12.xml><?xml version="1.0" encoding="utf-8"?>
-<p:sld xmlns:a="http://schemas.openxmlformats.org/drawingml/2006/main" xmlns:r="http://schemas.openxmlformats.org/officeDocument/2006/relationships" xmlns:p="http://schemas.openxmlformats.org/presentationml/2006/main">
-  <p:cSld>
-    <p:spTree>
-      <p:nvGrpSpPr>
-        <p:cNvPr id="1" name=""/>
-        <p:cNvGrpSpPr/>
-        <p:nvPr/>
-      </p:nvGrpSpPr>
-      <p:grpSpPr>
-        <a:xfrm>
-          <a:off x="0" y="0"/>
-          <a:ext cx="0" cy="0"/>
-          <a:chOff x="0" y="0"/>
-          <a:chExt cx="0" cy="0"/>
-        </a:xfrm>
-      </p:grpSpPr>
-      <p:sp>
-        <p:nvSpPr>
-          <p:cNvPr id="2" name="Title 1"/>
-          <p:cNvSpPr>
-            <a:spLocks noGrp="1"/>
-          </p:cNvSpPr>
-          <p:nvPr>
-            <p:ph type="title"/>
-          </p:nvPr>
-        </p:nvSpPr>
-        <p:spPr/>
-        <p:txBody>
-          <a:bodyPr/>
-          <a:lstStyle/>
-          <a:p>
-            <a:r>
-              <a:rPr lang="en-US" dirty="0"/>
-              <a:t>Network 7-1</a:t>
-            </a:r>
-          </a:p>
-        </p:txBody>
-      </p:sp>
-      <p:sp>
-        <p:nvSpPr>
-          <p:cNvPr id="4" name="Text Placeholder 3"/>
-          <p:cNvSpPr>
-            <a:spLocks noGrp="1"/>
-          </p:cNvSpPr>
-          <p:nvPr>
-            <p:ph type="body" sz="half" idx="2"/>
-          </p:nvPr>
-        </p:nvSpPr>
-        <p:spPr>
-          <a:xfrm>
-            <a:off x="457200" y="1234816"/>
-            <a:ext cx="3200400" cy="5070389"/>
-          </a:xfrm>
-        </p:spPr>
-        <p:txBody>
-          <a:bodyPr/>
-          <a:lstStyle/>
-          <a:p>
-            <a:endParaRPr lang="en-US" dirty="0"/>
-          </a:p>
-          <a:p>
-            <a:endParaRPr lang="en-US" dirty="0"/>
-          </a:p>
-          <a:p>
-            <a:endParaRPr lang="en-US" dirty="0"/>
-          </a:p>
-          <a:p>
-            <a:endParaRPr lang="en-US" dirty="0"/>
-          </a:p>
-          <a:p>
-            <a:endParaRPr lang="en-US" dirty="0"/>
-          </a:p>
-          <a:p>
-            <a:endParaRPr lang="en-US" dirty="0"/>
-          </a:p>
-          <a:p>
-            <a:endParaRPr lang="en-US" dirty="0"/>
-          </a:p>
-          <a:p>
-            <a:r>
-              <a:rPr lang="en-US" dirty="0"/>
-              <a:t>A standard cataract-related network. </a:t>
-            </a:r>
-          </a:p>
-        </p:txBody>
-      </p:sp>
-      <p:pic>
-        <p:nvPicPr>
-          <p:cNvPr id="8" name="Content Placeholder 7"/>
-          <p:cNvPicPr>
-            <a:picLocks noGrp="1" noChangeAspect="1"/>
-          </p:cNvPicPr>
-          <p:nvPr>
-            <p:ph idx="1"/>
-          </p:nvPr>
-        </p:nvPicPr>
-        <p:blipFill>
-          <a:blip r:embed="rId2" cstate="print">
-            <a:extLst>
-              <a:ext uri="{28A0092B-C50C-407E-A947-70E740481C1C}">
-                <a14:useLocalDpi xmlns:a14="http://schemas.microsoft.com/office/drawing/2010/main" val="0"/>
-              </a:ext>
-            </a:extLst>
-          </a:blip>
-          <a:stretch>
-            <a:fillRect/>
-          </a:stretch>
-        </p:blipFill>
-        <p:spPr>
-          <a:xfrm>
-            <a:off x="5058224" y="731838"/>
-            <a:ext cx="5977627" cy="5257800"/>
-          </a:xfrm>
-        </p:spPr>
-      </p:pic>
-      <p:pic>
-        <p:nvPicPr>
-          <p:cNvPr id="9" name="Picture 8"/>
-          <p:cNvPicPr>
-            <a:picLocks noChangeAspect="1"/>
-          </p:cNvPicPr>
-          <p:nvPr/>
-        </p:nvPicPr>
-        <p:blipFill>
-          <a:blip r:embed="rId3"/>
-          <a:stretch>
-            <a:fillRect/>
-          </a:stretch>
-        </p:blipFill>
-        <p:spPr>
-          <a:xfrm>
-            <a:off x="321307" y="1127987"/>
-            <a:ext cx="3472185" cy="2642023"/>
-          </a:xfrm>
-          <a:prstGeom prst="rect">
-            <a:avLst/>
-          </a:prstGeom>
-        </p:spPr>
-      </p:pic>
-    </p:spTree>
-    <p:extLst>
-      <p:ext uri="{BB962C8B-B14F-4D97-AF65-F5344CB8AC3E}">
-        <p14:creationId xmlns:p14="http://schemas.microsoft.com/office/powerpoint/2010/main" val="4180889026"/>
-      </p:ext>
-    </p:extLst>
-  </p:cSld>
-  <p:clrMapOvr>
-    <a:masterClrMapping/>
-  </p:clrMapOvr>
-  <p:timing>
-    <p:tnLst>
-      <p:par>
-        <p:cTn id="1" dur="indefinite" restart="never" nodeType="tmRoot"/>
-      </p:par>
-    </p:tnLst>
-  </p:timing>
 </p:sld>
 </file>
 
@@ -6082,7 +6878,7 @@
           <a:p>
             <a:r>
               <a:rPr lang="en-US" dirty="0"/>
-              <a:t>Network 7-2</a:t>
+              <a:t>Network 7-1</a:t>
             </a:r>
           </a:p>
         </p:txBody>
@@ -6097,7 +6893,12 @@
             <p:ph type="body" sz="half" idx="2"/>
           </p:nvPr>
         </p:nvSpPr>
-        <p:spPr/>
+        <p:spPr>
+          <a:xfrm>
+            <a:off x="457200" y="1234816"/>
+            <a:ext cx="3200400" cy="5070389"/>
+          </a:xfrm>
+        </p:spPr>
         <p:txBody>
           <a:bodyPr/>
           <a:lstStyle/>
@@ -6125,20 +6926,14 @@
           <a:p>
             <a:r>
               <a:rPr lang="en-US" dirty="0"/>
-              <a:t>This network shows many functions related to keratinization (insertion of keratin into skin/hair cells).</a:t>
-            </a:r>
-          </a:p>
-          <a:p>
-            <a:r>
-              <a:rPr lang="en-US" dirty="0"/>
-              <a:t>Keratin is present in the lens epithelium, and forms a significant part of its structural integrity (Quinlan et al, 1999). This network may imply that keratin in the epithelial and early fiber cells plays a role in later cataract formation.</a:t>
+              <a:t>A standard cataract-related network. </a:t>
             </a:r>
           </a:p>
         </p:txBody>
       </p:sp>
       <p:pic>
         <p:nvPicPr>
-          <p:cNvPr id="7" name="Content Placeholder 6"/>
+          <p:cNvPr id="8" name="Content Placeholder 7"/>
           <p:cNvPicPr>
             <a:picLocks noGrp="1" noChangeAspect="1"/>
           </p:cNvPicPr>
@@ -6160,14 +6955,14 @@
         </p:blipFill>
         <p:spPr>
           <a:xfrm>
-            <a:off x="1652468" y="731838"/>
-            <a:ext cx="4965938" cy="5257800"/>
+            <a:off x="5058224" y="731838"/>
+            <a:ext cx="5977627" cy="5257800"/>
           </a:xfrm>
         </p:spPr>
       </p:pic>
       <p:pic>
         <p:nvPicPr>
-          <p:cNvPr id="3" name="Picture 2"/>
+          <p:cNvPr id="9" name="Picture 8"/>
           <p:cNvPicPr>
             <a:picLocks noChangeAspect="1"/>
           </p:cNvPicPr>
@@ -6181,7 +6976,7 @@
         </p:blipFill>
         <p:spPr>
           <a:xfrm>
-            <a:off x="8406127" y="1115631"/>
+            <a:off x="321307" y="1127987"/>
             <a:ext cx="3472185" cy="2642023"/>
           </a:xfrm>
           <a:prstGeom prst="rect">
@@ -6192,20 +6987,13 @@
     </p:spTree>
     <p:extLst>
       <p:ext uri="{BB962C8B-B14F-4D97-AF65-F5344CB8AC3E}">
-        <p14:creationId xmlns:p14="http://schemas.microsoft.com/office/powerpoint/2010/main" val="2213459273"/>
+        <p14:creationId xmlns:p14="http://schemas.microsoft.com/office/powerpoint/2010/main" val="4180889026"/>
       </p:ext>
     </p:extLst>
   </p:cSld>
   <p:clrMapOvr>
     <a:masterClrMapping/>
   </p:clrMapOvr>
-  <p:timing>
-    <p:tnLst>
-      <p:par>
-        <p:cTn id="1" dur="indefinite" restart="never" nodeType="tmRoot"/>
-      </p:par>
-    </p:tnLst>
-  </p:timing>
 </p:sld>
 </file>
 
@@ -6243,7 +7031,7 @@
           <a:p>
             <a:r>
               <a:rPr lang="en-US" dirty="0"/>
-              <a:t>Network 8-1</a:t>
+              <a:t>Network 7-2</a:t>
             </a:r>
           </a:p>
         </p:txBody>
@@ -6286,14 +7074,20 @@
           <a:p>
             <a:r>
               <a:rPr lang="en-US" dirty="0"/>
-              <a:t>Another cataract-focused network.</a:t>
+              <a:t>This network shows many functions related to keratinization (insertion of keratin into skin/hair cells).</a:t>
+            </a:r>
+          </a:p>
+          <a:p>
+            <a:r>
+              <a:rPr lang="en-US" dirty="0"/>
+              <a:t>Keratin is present in the lens epithelium, and forms a significant part of its structural integrity (Quinlan et al, 1999). This network may imply that keratin in the epithelial and early fiber cells plays a role in later cataract formation.</a:t>
             </a:r>
           </a:p>
         </p:txBody>
       </p:sp>
       <p:pic>
         <p:nvPicPr>
-          <p:cNvPr id="8" name="Content Placeholder 7"/>
+          <p:cNvPr id="7" name="Content Placeholder 6"/>
           <p:cNvPicPr>
             <a:picLocks noGrp="1" noChangeAspect="1"/>
           </p:cNvPicPr>
@@ -6315,14 +7109,14 @@
         </p:blipFill>
         <p:spPr>
           <a:xfrm>
-            <a:off x="4800600" y="797347"/>
-            <a:ext cx="6492875" cy="5126782"/>
+            <a:off x="1652468" y="731838"/>
+            <a:ext cx="4965938" cy="5257800"/>
           </a:xfrm>
         </p:spPr>
       </p:pic>
       <p:pic>
         <p:nvPicPr>
-          <p:cNvPr id="7" name="Picture 6"/>
+          <p:cNvPr id="3" name="Picture 2"/>
           <p:cNvPicPr>
             <a:picLocks noChangeAspect="1"/>
           </p:cNvPicPr>
@@ -6336,7 +7130,7 @@
         </p:blipFill>
         <p:spPr>
           <a:xfrm>
-            <a:off x="321307" y="1234816"/>
+            <a:off x="8406127" y="1115631"/>
             <a:ext cx="3472185" cy="2642023"/>
           </a:xfrm>
           <a:prstGeom prst="rect">
@@ -6347,20 +7141,13 @@
     </p:spTree>
     <p:extLst>
       <p:ext uri="{BB962C8B-B14F-4D97-AF65-F5344CB8AC3E}">
-        <p14:creationId xmlns:p14="http://schemas.microsoft.com/office/powerpoint/2010/main" val="2712752138"/>
+        <p14:creationId xmlns:p14="http://schemas.microsoft.com/office/powerpoint/2010/main" val="2213459273"/>
       </p:ext>
     </p:extLst>
   </p:cSld>
   <p:clrMapOvr>
     <a:masterClrMapping/>
   </p:clrMapOvr>
-  <p:timing>
-    <p:tnLst>
-      <p:par>
-        <p:cTn id="1" dur="indefinite" restart="never" nodeType="tmRoot"/>
-      </p:par>
-    </p:tnLst>
-  </p:timing>
 </p:sld>
 </file>
 
@@ -6398,7 +7185,7 @@
           <a:p>
             <a:r>
               <a:rPr lang="en-US" dirty="0"/>
-              <a:t>Network 8-2</a:t>
+              <a:t>Network 8-1</a:t>
             </a:r>
           </a:p>
         </p:txBody>
@@ -6418,13 +7205,37 @@
           <a:bodyPr/>
           <a:lstStyle/>
           <a:p>
-            <a:endParaRPr lang="en-US"/>
+            <a:endParaRPr lang="en-US" dirty="0"/>
+          </a:p>
+          <a:p>
+            <a:endParaRPr lang="en-US" dirty="0"/>
+          </a:p>
+          <a:p>
+            <a:endParaRPr lang="en-US" dirty="0"/>
+          </a:p>
+          <a:p>
+            <a:endParaRPr lang="en-US" dirty="0"/>
+          </a:p>
+          <a:p>
+            <a:endParaRPr lang="en-US" dirty="0"/>
+          </a:p>
+          <a:p>
+            <a:endParaRPr lang="en-US" dirty="0"/>
+          </a:p>
+          <a:p>
+            <a:endParaRPr lang="en-US" dirty="0"/>
+          </a:p>
+          <a:p>
+            <a:r>
+              <a:rPr lang="en-US" dirty="0"/>
+              <a:t>Another cataract-focused network.</a:t>
+            </a:r>
           </a:p>
         </p:txBody>
       </p:sp>
       <p:pic>
         <p:nvPicPr>
-          <p:cNvPr id="7" name="Content Placeholder 6"/>
+          <p:cNvPr id="8" name="Content Placeholder 7"/>
           <p:cNvPicPr>
             <a:picLocks noGrp="1" noChangeAspect="1"/>
           </p:cNvPicPr>
@@ -6446,14 +7257,14 @@
         </p:blipFill>
         <p:spPr>
           <a:xfrm>
-            <a:off x="1259208" y="868184"/>
-            <a:ext cx="5752458" cy="4985108"/>
+            <a:off x="4800600" y="797347"/>
+            <a:ext cx="6492875" cy="5126782"/>
           </a:xfrm>
         </p:spPr>
       </p:pic>
       <p:pic>
         <p:nvPicPr>
-          <p:cNvPr id="8" name="Picture 7"/>
+          <p:cNvPr id="7" name="Picture 6"/>
           <p:cNvPicPr>
             <a:picLocks noChangeAspect="1"/>
           </p:cNvPicPr>
@@ -6467,7 +7278,7 @@
         </p:blipFill>
         <p:spPr>
           <a:xfrm>
-            <a:off x="8406127" y="1218340"/>
+            <a:off x="321307" y="1234816"/>
             <a:ext cx="3472185" cy="2642023"/>
           </a:xfrm>
           <a:prstGeom prst="rect">
@@ -6478,20 +7289,13 @@
     </p:spTree>
     <p:extLst>
       <p:ext uri="{BB962C8B-B14F-4D97-AF65-F5344CB8AC3E}">
-        <p14:creationId xmlns:p14="http://schemas.microsoft.com/office/powerpoint/2010/main" val="1475227174"/>
+        <p14:creationId xmlns:p14="http://schemas.microsoft.com/office/powerpoint/2010/main" val="2712752138"/>
       </p:ext>
     </p:extLst>
   </p:cSld>
   <p:clrMapOvr>
     <a:masterClrMapping/>
   </p:clrMapOvr>
-  <p:timing>
-    <p:tnLst>
-      <p:par>
-        <p:cTn id="1" dur="indefinite" restart="never" nodeType="tmRoot"/>
-      </p:par>
-    </p:tnLst>
-  </p:timing>
 </p:sld>
 </file>
 
@@ -6529,7 +7333,7 @@
           <a:p>
             <a:r>
               <a:rPr lang="en-US" dirty="0"/>
-              <a:t>Network 20-1</a:t>
+              <a:t>Network 8-2</a:t>
             </a:r>
           </a:p>
         </p:txBody>
@@ -6549,71 +7353,7 @@
           <a:bodyPr/>
           <a:lstStyle/>
           <a:p>
-            <a:endParaRPr lang="en-US" dirty="0"/>
-          </a:p>
-          <a:p>
-            <a:endParaRPr lang="en-US" dirty="0"/>
-          </a:p>
-          <a:p>
-            <a:endParaRPr lang="en-US" dirty="0"/>
-          </a:p>
-          <a:p>
-            <a:endParaRPr lang="en-US" dirty="0"/>
-          </a:p>
-          <a:p>
-            <a:endParaRPr lang="en-US" dirty="0"/>
-          </a:p>
-          <a:p>
-            <a:endParaRPr lang="en-US" dirty="0"/>
-          </a:p>
-          <a:p>
-            <a:endParaRPr lang="en-US" dirty="0"/>
-          </a:p>
-          <a:p>
-            <a:r>
-              <a:rPr lang="en-US" dirty="0"/>
-              <a:t>A network related to metabolism, especially of </a:t>
-            </a:r>
-            <a:r>
-              <a:rPr lang="en-US" dirty="0" smtClean="0"/>
-              <a:t>sugars, fats, and amino acids. </a:t>
-            </a:r>
-            <a:r>
-              <a:rPr lang="en-US" dirty="0"/>
-              <a:t>Fatty acids affect the expression of lutein, which is shown to prevent cataract formation (</a:t>
-            </a:r>
-            <a:r>
-              <a:rPr lang="en-US" dirty="0" err="1"/>
-              <a:t>Padmanabha</a:t>
-            </a:r>
-            <a:r>
-              <a:rPr lang="en-US" dirty="0"/>
-              <a:t> &amp; </a:t>
-            </a:r>
-            <a:r>
-              <a:rPr lang="en-US" dirty="0" err="1"/>
-              <a:t>Vallikannan</a:t>
-            </a:r>
-            <a:r>
-              <a:rPr lang="en-US" dirty="0"/>
-              <a:t>, 2018); sugars are known to cause cataract, since an increased blood sugar concentration affects the concentration of the fiber cell cytoplasm (</a:t>
-            </a:r>
-            <a:r>
-              <a:rPr lang="en-US" dirty="0" err="1"/>
-              <a:t>Pollreisz</a:t>
-            </a:r>
-            <a:r>
-              <a:rPr lang="en-US" dirty="0"/>
-              <a:t> &amp; Schmidt-</a:t>
-            </a:r>
-            <a:r>
-              <a:rPr lang="en-US" dirty="0" err="1"/>
-              <a:t>Erfurth</a:t>
-            </a:r>
-            <a:r>
-              <a:rPr lang="en-US" dirty="0"/>
-              <a:t>, 2010)</a:t>
-            </a:r>
+            <a:endParaRPr lang="en-US"/>
           </a:p>
         </p:txBody>
       </p:sp>
@@ -6628,7 +7368,7 @@
           </p:nvPr>
         </p:nvPicPr>
         <p:blipFill>
-          <a:blip r:embed="rId2">
+          <a:blip r:embed="rId3" cstate="print">
             <a:extLst>
               <a:ext uri="{28A0092B-C50C-407E-A947-70E740481C1C}">
                 <a14:useLocalDpi xmlns:a14="http://schemas.microsoft.com/office/drawing/2010/main" val="0"/>
@@ -6641,29 +7381,29 @@
         </p:blipFill>
         <p:spPr>
           <a:xfrm>
-            <a:off x="5704674" y="731838"/>
-            <a:ext cx="4684727" cy="5257800"/>
+            <a:off x="1259208" y="868184"/>
+            <a:ext cx="5752458" cy="4985108"/>
           </a:xfrm>
         </p:spPr>
       </p:pic>
       <p:pic>
         <p:nvPicPr>
-          <p:cNvPr id="5" name="Picture 4"/>
+          <p:cNvPr id="8" name="Picture 7"/>
           <p:cNvPicPr>
             <a:picLocks noChangeAspect="1"/>
           </p:cNvPicPr>
           <p:nvPr/>
         </p:nvPicPr>
         <p:blipFill>
-          <a:blip r:embed="rId3"/>
+          <a:blip r:embed="rId4"/>
           <a:stretch>
             <a:fillRect/>
           </a:stretch>
         </p:blipFill>
         <p:spPr>
           <a:xfrm>
-            <a:off x="317392" y="1122028"/>
-            <a:ext cx="3480016" cy="2647982"/>
+            <a:off x="8406127" y="1218340"/>
+            <a:ext cx="3472185" cy="2642023"/>
           </a:xfrm>
           <a:prstGeom prst="rect">
             <a:avLst/>
@@ -6673,20 +7413,13 @@
     </p:spTree>
     <p:extLst>
       <p:ext uri="{BB962C8B-B14F-4D97-AF65-F5344CB8AC3E}">
-        <p14:creationId xmlns:p14="http://schemas.microsoft.com/office/powerpoint/2010/main" val="2012370489"/>
+        <p14:creationId xmlns:p14="http://schemas.microsoft.com/office/powerpoint/2010/main" val="1475227174"/>
       </p:ext>
     </p:extLst>
   </p:cSld>
   <p:clrMapOvr>
     <a:masterClrMapping/>
   </p:clrMapOvr>
-  <p:timing>
-    <p:tnLst>
-      <p:par>
-        <p:cTn id="1" dur="indefinite" restart="never" nodeType="tmRoot"/>
-      </p:par>
-    </p:tnLst>
-  </p:timing>
 </p:sld>
 </file>
 
@@ -6724,7 +7457,7 @@
           <a:p>
             <a:r>
               <a:rPr lang="en-US" dirty="0"/>
-              <a:t>Network 21-1</a:t>
+              <a:t>Network 20-1</a:t>
             </a:r>
           </a:p>
         </p:txBody>
@@ -6744,40 +7477,63 @@
           <a:bodyPr/>
           <a:lstStyle/>
           <a:p>
-            <a:endParaRPr lang="en-US" dirty="0" smtClean="0"/>
-          </a:p>
-          <a:p>
             <a:endParaRPr lang="en-US" dirty="0"/>
           </a:p>
           <a:p>
-            <a:endParaRPr lang="en-US" dirty="0" smtClean="0"/>
-          </a:p>
-          <a:p>
             <a:endParaRPr lang="en-US" dirty="0"/>
           </a:p>
           <a:p>
-            <a:endParaRPr lang="en-US" dirty="0" smtClean="0"/>
-          </a:p>
-          <a:p>
             <a:endParaRPr lang="en-US" dirty="0"/>
           </a:p>
           <a:p>
-            <a:endParaRPr lang="en-US" dirty="0" smtClean="0"/>
-          </a:p>
-          <a:p>
-            <a:r>
-              <a:rPr lang="en-US" dirty="0" smtClean="0"/>
-              <a:t>This network is heavily centered around the TNF (tumor necrosis factor) gene, which has many functions varying from tissue regeneration to apoptosis (</a:t>
-            </a:r>
-            <a:r>
-              <a:rPr lang="en-US" dirty="0" err="1" smtClean="0"/>
-              <a:t>Wajant</a:t>
-            </a:r>
-            <a:r>
-              <a:rPr lang="en-US" dirty="0" smtClean="0"/>
-              <a:t>, et al). </a:t>
-            </a:r>
             <a:endParaRPr lang="en-US" dirty="0"/>
+          </a:p>
+          <a:p>
+            <a:endParaRPr lang="en-US" dirty="0"/>
+          </a:p>
+          <a:p>
+            <a:endParaRPr lang="en-US" dirty="0"/>
+          </a:p>
+          <a:p>
+            <a:endParaRPr lang="en-US" dirty="0"/>
+          </a:p>
+          <a:p>
+            <a:r>
+              <a:rPr lang="en-US" dirty="0"/>
+              <a:t>A network related to metabolism, especially of sugars, fats, and amino acids. Fatty acids affect the expression of lutein, which is shown to prevent cataract formation (</a:t>
+            </a:r>
+            <a:r>
+              <a:rPr lang="en-US" dirty="0" err="1"/>
+              <a:t>Padmanabha</a:t>
+            </a:r>
+            <a:r>
+              <a:rPr lang="en-US" dirty="0"/>
+              <a:t> &amp; </a:t>
+            </a:r>
+            <a:r>
+              <a:rPr lang="en-US" dirty="0" err="1"/>
+              <a:t>Vallikannan</a:t>
+            </a:r>
+            <a:r>
+              <a:rPr lang="en-US" dirty="0"/>
+              <a:t>, 2018); sugars are known to cause cataract, since an increased blood sugar concentration affects the concentration of the fiber cell cytoplasm (</a:t>
+            </a:r>
+            <a:r>
+              <a:rPr lang="en-US" dirty="0" err="1"/>
+              <a:t>Pollreisz</a:t>
+            </a:r>
+            <a:r>
+              <a:rPr lang="en-US" dirty="0"/>
+              <a:t> &amp; Schmidt-</a:t>
+            </a:r>
+            <a:r>
+              <a:rPr lang="en-US" dirty="0" err="1"/>
+              <a:t>Erfurth</a:t>
+            </a:r>
+            <a:r>
+              <a:rPr lang="en-US" dirty="0"/>
+              <a:t>, 2010)</a:t>
+            </a:r>
           </a:p>
         </p:txBody>
       </p:sp>
@@ -6792,7 +7548,7 @@
           </p:nvPr>
         </p:nvPicPr>
         <p:blipFill>
-          <a:blip r:embed="rId2" cstate="print">
+          <a:blip r:embed="rId3">
             <a:extLst>
               <a:ext uri="{28A0092B-C50C-407E-A947-70E740481C1C}">
                 <a14:useLocalDpi xmlns:a14="http://schemas.microsoft.com/office/drawing/2010/main" val="0"/>
@@ -6805,28 +7561,28 @@
         </p:blipFill>
         <p:spPr>
           <a:xfrm>
-            <a:off x="1017483" y="731838"/>
-            <a:ext cx="6235908" cy="5257800"/>
+            <a:off x="5704674" y="731838"/>
+            <a:ext cx="4684727" cy="5257800"/>
           </a:xfrm>
         </p:spPr>
       </p:pic>
       <p:pic>
         <p:nvPicPr>
-          <p:cNvPr id="6" name="Picture 5"/>
+          <p:cNvPr id="5" name="Picture 4"/>
           <p:cNvPicPr>
             <a:picLocks noChangeAspect="1"/>
           </p:cNvPicPr>
           <p:nvPr/>
         </p:nvPicPr>
         <p:blipFill>
-          <a:blip r:embed="rId3"/>
+          <a:blip r:embed="rId4"/>
           <a:stretch>
             <a:fillRect/>
           </a:stretch>
         </p:blipFill>
         <p:spPr>
           <a:xfrm>
-            <a:off x="8402212" y="1109672"/>
+            <a:off x="317392" y="1122028"/>
             <a:ext cx="3480016" cy="2647982"/>
           </a:xfrm>
           <a:prstGeom prst="rect">
@@ -6837,20 +7593,13 @@
     </p:spTree>
     <p:extLst>
       <p:ext uri="{BB962C8B-B14F-4D97-AF65-F5344CB8AC3E}">
-        <p14:creationId xmlns:p14="http://schemas.microsoft.com/office/powerpoint/2010/main" val="2042388585"/>
+        <p14:creationId xmlns:p14="http://schemas.microsoft.com/office/powerpoint/2010/main" val="2012370489"/>
       </p:ext>
     </p:extLst>
   </p:cSld>
   <p:clrMapOvr>
     <a:masterClrMapping/>
   </p:clrMapOvr>
-  <p:timing>
-    <p:tnLst>
-      <p:par>
-        <p:cTn id="1" dur="indefinite" restart="never" nodeType="tmRoot"/>
-      </p:par>
-    </p:tnLst>
-  </p:timing>
 </p:sld>
 </file>
 
@@ -6883,21 +7632,70 @@
         </p:nvSpPr>
         <p:spPr/>
         <p:txBody>
-          <a:bodyPr>
-            <a:normAutofit/>
-          </a:bodyPr>
+          <a:bodyPr/>
           <a:lstStyle/>
           <a:p>
             <a:r>
-              <a:rPr lang="en-US" sz="4000" dirty="0"/>
-              <a:t>Cluster 20 – fructose metabolism pathway</a:t>
+              <a:rPr lang="en-US" dirty="0"/>
+              <a:t>Network 21-1</a:t>
+            </a:r>
+          </a:p>
+        </p:txBody>
+      </p:sp>
+      <p:sp>
+        <p:nvSpPr>
+          <p:cNvPr id="4" name="Text Placeholder 3"/>
+          <p:cNvSpPr>
+            <a:spLocks noGrp="1"/>
+          </p:cNvSpPr>
+          <p:nvPr>
+            <p:ph type="body" sz="half" idx="2"/>
+          </p:nvPr>
+        </p:nvSpPr>
+        <p:spPr/>
+        <p:txBody>
+          <a:bodyPr/>
+          <a:lstStyle/>
+          <a:p>
+            <a:endParaRPr lang="en-US" dirty="0"/>
+          </a:p>
+          <a:p>
+            <a:endParaRPr lang="en-US" dirty="0"/>
+          </a:p>
+          <a:p>
+            <a:endParaRPr lang="en-US" dirty="0"/>
+          </a:p>
+          <a:p>
+            <a:endParaRPr lang="en-US" dirty="0"/>
+          </a:p>
+          <a:p>
+            <a:endParaRPr lang="en-US" dirty="0"/>
+          </a:p>
+          <a:p>
+            <a:endParaRPr lang="en-US" dirty="0"/>
+          </a:p>
+          <a:p>
+            <a:endParaRPr lang="en-US" dirty="0"/>
+          </a:p>
+          <a:p>
+            <a:r>
+              <a:rPr lang="en-US" dirty="0"/>
+              <a:t>This network is heavily centered around the TNF (tumor necrosis factor) gene, which has many functions varying from tissue regeneration to apoptosis (</a:t>
+            </a:r>
+            <a:r>
+              <a:rPr lang="en-US" dirty="0" err="1"/>
+              <a:t>Wajant</a:t>
+            </a:r>
+            <a:r>
+              <a:rPr lang="en-US" dirty="0"/>
+              <a:t>, et al). </a:t>
             </a:r>
           </a:p>
         </p:txBody>
       </p:sp>
       <p:pic>
         <p:nvPicPr>
-          <p:cNvPr id="4" name="Content Placeholder 3"/>
+          <p:cNvPr id="7" name="Content Placeholder 6"/>
           <p:cNvPicPr>
             <a:picLocks noGrp="1" noChangeAspect="1"/>
           </p:cNvPicPr>
@@ -6919,6 +7717,113 @@
         </p:blipFill>
         <p:spPr>
           <a:xfrm>
+            <a:off x="1017483" y="731838"/>
+            <a:ext cx="6235908" cy="5257800"/>
+          </a:xfrm>
+        </p:spPr>
+      </p:pic>
+      <p:pic>
+        <p:nvPicPr>
+          <p:cNvPr id="6" name="Picture 5"/>
+          <p:cNvPicPr>
+            <a:picLocks noChangeAspect="1"/>
+          </p:cNvPicPr>
+          <p:nvPr/>
+        </p:nvPicPr>
+        <p:blipFill>
+          <a:blip r:embed="rId3"/>
+          <a:stretch>
+            <a:fillRect/>
+          </a:stretch>
+        </p:blipFill>
+        <p:spPr>
+          <a:xfrm>
+            <a:off x="8402212" y="1109672"/>
+            <a:ext cx="3480016" cy="2647982"/>
+          </a:xfrm>
+          <a:prstGeom prst="rect">
+            <a:avLst/>
+          </a:prstGeom>
+        </p:spPr>
+      </p:pic>
+    </p:spTree>
+    <p:extLst>
+      <p:ext uri="{BB962C8B-B14F-4D97-AF65-F5344CB8AC3E}">
+        <p14:creationId xmlns:p14="http://schemas.microsoft.com/office/powerpoint/2010/main" val="2042388585"/>
+      </p:ext>
+    </p:extLst>
+  </p:cSld>
+  <p:clrMapOvr>
+    <a:masterClrMapping/>
+  </p:clrMapOvr>
+</p:sld>
+</file>
+
+<file path=ppt/slides/slide19.xml><?xml version="1.0" encoding="utf-8"?>
+<p:sld xmlns:a="http://schemas.openxmlformats.org/drawingml/2006/main" xmlns:r="http://schemas.openxmlformats.org/officeDocument/2006/relationships" xmlns:p="http://schemas.openxmlformats.org/presentationml/2006/main">
+  <p:cSld>
+    <p:spTree>
+      <p:nvGrpSpPr>
+        <p:cNvPr id="1" name=""/>
+        <p:cNvGrpSpPr/>
+        <p:nvPr/>
+      </p:nvGrpSpPr>
+      <p:grpSpPr>
+        <a:xfrm>
+          <a:off x="0" y="0"/>
+          <a:ext cx="0" cy="0"/>
+          <a:chOff x="0" y="0"/>
+          <a:chExt cx="0" cy="0"/>
+        </a:xfrm>
+      </p:grpSpPr>
+      <p:sp>
+        <p:nvSpPr>
+          <p:cNvPr id="2" name="Title 1"/>
+          <p:cNvSpPr>
+            <a:spLocks noGrp="1"/>
+          </p:cNvSpPr>
+          <p:nvPr>
+            <p:ph type="title"/>
+          </p:nvPr>
+        </p:nvSpPr>
+        <p:spPr/>
+        <p:txBody>
+          <a:bodyPr>
+            <a:normAutofit/>
+          </a:bodyPr>
+          <a:lstStyle/>
+          <a:p>
+            <a:r>
+              <a:rPr lang="en-US" sz="4000" dirty="0"/>
+              <a:t>Cluster 20 – fructose metabolism pathway</a:t>
+            </a:r>
+          </a:p>
+        </p:txBody>
+      </p:sp>
+      <p:pic>
+        <p:nvPicPr>
+          <p:cNvPr id="4" name="Content Placeholder 3"/>
+          <p:cNvPicPr>
+            <a:picLocks noGrp="1" noChangeAspect="1"/>
+          </p:cNvPicPr>
+          <p:nvPr>
+            <p:ph idx="1"/>
+          </p:nvPr>
+        </p:nvPicPr>
+        <p:blipFill>
+          <a:blip r:embed="rId3" cstate="print">
+            <a:extLst>
+              <a:ext uri="{28A0092B-C50C-407E-A947-70E740481C1C}">
+                <a14:useLocalDpi xmlns:a14="http://schemas.microsoft.com/office/drawing/2010/main" val="0"/>
+              </a:ext>
+            </a:extLst>
+          </a:blip>
+          <a:stretch>
+            <a:fillRect/>
+          </a:stretch>
+        </p:blipFill>
+        <p:spPr>
+          <a:xfrm>
             <a:off x="3941309" y="1846263"/>
             <a:ext cx="4369708" cy="4022725"/>
           </a:xfrm>
@@ -6934,17 +7839,93 @@
   <p:clrMapOvr>
     <a:masterClrMapping/>
   </p:clrMapOvr>
-  <p:timing>
-    <p:tnLst>
-      <p:par>
-        <p:cTn id="1" dur="indefinite" restart="never" nodeType="tmRoot"/>
-      </p:par>
-    </p:tnLst>
-  </p:timing>
 </p:sld>
 </file>
 
-<file path=ppt/slides/slide19.xml><?xml version="1.0" encoding="utf-8"?>
+<file path=ppt/slides/slide2.xml><?xml version="1.0" encoding="utf-8"?>
+<p:sld xmlns:a="http://schemas.openxmlformats.org/drawingml/2006/main" xmlns:r="http://schemas.openxmlformats.org/officeDocument/2006/relationships" xmlns:p="http://schemas.openxmlformats.org/presentationml/2006/main" show="0">
+  <p:cSld>
+    <p:spTree>
+      <p:nvGrpSpPr>
+        <p:cNvPr id="1" name=""/>
+        <p:cNvGrpSpPr/>
+        <p:nvPr/>
+      </p:nvGrpSpPr>
+      <p:grpSpPr>
+        <a:xfrm>
+          <a:off x="0" y="0"/>
+          <a:ext cx="0" cy="0"/>
+          <a:chOff x="0" y="0"/>
+          <a:chExt cx="0" cy="0"/>
+        </a:xfrm>
+      </p:grpSpPr>
+      <p:sp>
+        <p:nvSpPr>
+          <p:cNvPr id="2" name="Title 1">
+            <a:extLst>
+              <a:ext uri="{FF2B5EF4-FFF2-40B4-BE49-F238E27FC236}">
+                <a16:creationId xmlns:a16="http://schemas.microsoft.com/office/drawing/2014/main" id="{7141D95F-53D4-4289-808E-BA42F55CEC78}"/>
+              </a:ext>
+            </a:extLst>
+          </p:cNvPr>
+          <p:cNvSpPr>
+            <a:spLocks noGrp="1"/>
+          </p:cNvSpPr>
+          <p:nvPr>
+            <p:ph type="title"/>
+          </p:nvPr>
+        </p:nvSpPr>
+        <p:spPr/>
+        <p:txBody>
+          <a:bodyPr/>
+          <a:lstStyle/>
+          <a:p>
+            <a:r>
+              <a:rPr lang="en-US" dirty="0"/>
+              <a:t>Abstract</a:t>
+            </a:r>
+          </a:p>
+        </p:txBody>
+      </p:sp>
+      <p:sp>
+        <p:nvSpPr>
+          <p:cNvPr id="3" name="Content Placeholder 2">
+            <a:extLst>
+              <a:ext uri="{FF2B5EF4-FFF2-40B4-BE49-F238E27FC236}">
+                <a16:creationId xmlns:a16="http://schemas.microsoft.com/office/drawing/2014/main" id="{21AEB97F-9559-463B-AEF5-0E9DFD571442}"/>
+              </a:ext>
+            </a:extLst>
+          </p:cNvPr>
+          <p:cNvSpPr>
+            <a:spLocks noGrp="1"/>
+          </p:cNvSpPr>
+          <p:nvPr>
+            <p:ph idx="1"/>
+          </p:nvPr>
+        </p:nvSpPr>
+        <p:spPr/>
+        <p:txBody>
+          <a:bodyPr/>
+          <a:lstStyle/>
+          <a:p>
+            <a:endParaRPr lang="en-US" dirty="0"/>
+          </a:p>
+        </p:txBody>
+      </p:sp>
+    </p:spTree>
+    <p:extLst>
+      <p:ext uri="{BB962C8B-B14F-4D97-AF65-F5344CB8AC3E}">
+        <p14:creationId xmlns:p14="http://schemas.microsoft.com/office/powerpoint/2010/main" val="3729086341"/>
+      </p:ext>
+    </p:extLst>
+  </p:cSld>
+  <p:clrMapOvr>
+    <a:masterClrMapping/>
+  </p:clrMapOvr>
+</p:sld>
+</file>
+
+<file path=ppt/slides/slide20.xml><?xml version="1.0" encoding="utf-8"?>
 <p:sld xmlns:a="http://schemas.openxmlformats.org/drawingml/2006/main" xmlns:r="http://schemas.openxmlformats.org/officeDocument/2006/relationships" xmlns:p="http://schemas.openxmlformats.org/presentationml/2006/main">
   <p:cSld>
     <p:spTree>
@@ -6970,36 +7951,6 @@
           <p:nvPr/>
         </p:nvPicPr>
         <p:blipFill>
-          <a:blip r:embed="rId2">
-            <a:extLst>
-              <a:ext uri="{28A0092B-C50C-407E-A947-70E740481C1C}">
-                <a14:useLocalDpi xmlns:a14="http://schemas.microsoft.com/office/drawing/2010/main" val="0"/>
-              </a:ext>
-            </a:extLst>
-          </a:blip>
-          <a:stretch>
-            <a:fillRect/>
-          </a:stretch>
-        </p:blipFill>
-        <p:spPr>
-          <a:xfrm>
-            <a:off x="101112" y="477715"/>
-            <a:ext cx="4634280" cy="2291862"/>
-          </a:xfrm>
-          <a:prstGeom prst="rect">
-            <a:avLst/>
-          </a:prstGeom>
-        </p:spPr>
-      </p:pic>
-      <p:pic>
-        <p:nvPicPr>
-          <p:cNvPr id="3" name="Picture 2"/>
-          <p:cNvPicPr>
-            <a:picLocks noChangeAspect="1"/>
-          </p:cNvPicPr>
-          <p:nvPr/>
-        </p:nvPicPr>
-        <p:blipFill>
           <a:blip r:embed="rId3">
             <a:extLst>
               <a:ext uri="{28A0092B-C50C-407E-A947-70E740481C1C}">
@@ -7013,8 +7964,8 @@
         </p:blipFill>
         <p:spPr>
           <a:xfrm>
-            <a:off x="6375685" y="482477"/>
-            <a:ext cx="4641592" cy="2287100"/>
+            <a:off x="101112" y="477715"/>
+            <a:ext cx="4634280" cy="2291862"/>
           </a:xfrm>
           <a:prstGeom prst="rect">
             <a:avLst/>
@@ -7023,7 +7974,7 @@
       </p:pic>
       <p:pic>
         <p:nvPicPr>
-          <p:cNvPr id="4" name="Picture 3"/>
+          <p:cNvPr id="3" name="Picture 2"/>
           <p:cNvPicPr>
             <a:picLocks noChangeAspect="1"/>
           </p:cNvPicPr>
@@ -7043,8 +7994,8 @@
         </p:blipFill>
         <p:spPr>
           <a:xfrm>
-            <a:off x="110834" y="3625362"/>
-            <a:ext cx="4624558" cy="2287100"/>
+            <a:off x="6375685" y="482477"/>
+            <a:ext cx="4641592" cy="2287100"/>
           </a:xfrm>
           <a:prstGeom prst="rect">
             <a:avLst/>
@@ -7053,7 +8004,7 @@
       </p:pic>
       <p:pic>
         <p:nvPicPr>
-          <p:cNvPr id="5" name="Picture 4"/>
+          <p:cNvPr id="4" name="Picture 3"/>
           <p:cNvPicPr>
             <a:picLocks noChangeAspect="1"/>
           </p:cNvPicPr>
@@ -7073,8 +8024,8 @@
         </p:blipFill>
         <p:spPr>
           <a:xfrm>
-            <a:off x="6369294" y="3625362"/>
-            <a:ext cx="4654375" cy="2287100"/>
+            <a:off x="110834" y="3625362"/>
+            <a:ext cx="4624558" cy="2287100"/>
           </a:xfrm>
           <a:prstGeom prst="rect">
             <a:avLst/>
@@ -7083,14 +8034,14 @@
       </p:pic>
       <p:pic>
         <p:nvPicPr>
-          <p:cNvPr id="6" name="Picture 5"/>
+          <p:cNvPr id="5" name="Picture 4"/>
           <p:cNvPicPr>
             <a:picLocks noChangeAspect="1"/>
           </p:cNvPicPr>
           <p:nvPr/>
         </p:nvPicPr>
         <p:blipFill>
-          <a:blip r:embed="rId6" cstate="print">
+          <a:blip r:embed="rId6">
             <a:extLst>
               <a:ext uri="{28A0092B-C50C-407E-A947-70E740481C1C}">
                 <a14:useLocalDpi xmlns:a14="http://schemas.microsoft.com/office/drawing/2010/main" val="0"/>
@@ -7103,8 +8054,8 @@
         </p:blipFill>
         <p:spPr>
           <a:xfrm>
-            <a:off x="4823315" y="477715"/>
-            <a:ext cx="1016376" cy="500796"/>
+            <a:off x="6369294" y="3625362"/>
+            <a:ext cx="4654375" cy="2287100"/>
           </a:xfrm>
           <a:prstGeom prst="rect">
             <a:avLst/>
@@ -7113,7 +8064,7 @@
       </p:pic>
       <p:pic>
         <p:nvPicPr>
-          <p:cNvPr id="7" name="Picture 6"/>
+          <p:cNvPr id="6" name="Picture 5"/>
           <p:cNvPicPr>
             <a:picLocks noChangeAspect="1"/>
           </p:cNvPicPr>
@@ -7133,8 +8084,8 @@
         </p:blipFill>
         <p:spPr>
           <a:xfrm>
-            <a:off x="4822420" y="1122850"/>
-            <a:ext cx="1017271" cy="500796"/>
+            <a:off x="4823315" y="477715"/>
+            <a:ext cx="1016376" cy="500796"/>
           </a:xfrm>
           <a:prstGeom prst="rect">
             <a:avLst/>
@@ -7143,7 +8094,7 @@
       </p:pic>
       <p:pic>
         <p:nvPicPr>
-          <p:cNvPr id="8" name="Picture 7"/>
+          <p:cNvPr id="7" name="Picture 6"/>
           <p:cNvPicPr>
             <a:picLocks noChangeAspect="1"/>
           </p:cNvPicPr>
@@ -7163,8 +8114,8 @@
         </p:blipFill>
         <p:spPr>
           <a:xfrm>
-            <a:off x="11144090" y="477715"/>
-            <a:ext cx="977228" cy="301504"/>
+            <a:off x="4822420" y="1122850"/>
+            <a:ext cx="1017271" cy="500796"/>
           </a:xfrm>
           <a:prstGeom prst="rect">
             <a:avLst/>
@@ -7173,7 +8124,7 @@
       </p:pic>
       <p:pic>
         <p:nvPicPr>
-          <p:cNvPr id="9" name="Picture 8"/>
+          <p:cNvPr id="8" name="Picture 7"/>
           <p:cNvPicPr>
             <a:picLocks noChangeAspect="1"/>
           </p:cNvPicPr>
@@ -7193,8 +8144,8 @@
         </p:blipFill>
         <p:spPr>
           <a:xfrm>
-            <a:off x="11144090" y="978511"/>
-            <a:ext cx="1018193" cy="500796"/>
+            <a:off x="11144090" y="477715"/>
+            <a:ext cx="977228" cy="301504"/>
           </a:xfrm>
           <a:prstGeom prst="rect">
             <a:avLst/>
@@ -7203,7 +8154,7 @@
       </p:pic>
       <p:pic>
         <p:nvPicPr>
-          <p:cNvPr id="10" name="Picture 9"/>
+          <p:cNvPr id="9" name="Picture 8"/>
           <p:cNvPicPr>
             <a:picLocks noChangeAspect="1"/>
           </p:cNvPicPr>
@@ -7223,8 +8174,8 @@
         </p:blipFill>
         <p:spPr>
           <a:xfrm>
-            <a:off x="4822420" y="3625362"/>
-            <a:ext cx="1017271" cy="501719"/>
+            <a:off x="11144090" y="978511"/>
+            <a:ext cx="1018193" cy="500796"/>
           </a:xfrm>
           <a:prstGeom prst="rect">
             <a:avLst/>
@@ -7233,7 +8184,7 @@
       </p:pic>
       <p:pic>
         <p:nvPicPr>
-          <p:cNvPr id="11" name="Picture 10"/>
+          <p:cNvPr id="10" name="Picture 9"/>
           <p:cNvPicPr>
             <a:picLocks noChangeAspect="1"/>
           </p:cNvPicPr>
@@ -7253,8 +8204,8 @@
         </p:blipFill>
         <p:spPr>
           <a:xfrm>
-            <a:off x="11104020" y="3625361"/>
-            <a:ext cx="1017298" cy="501719"/>
+            <a:off x="4822420" y="3625362"/>
+            <a:ext cx="1017271" cy="501719"/>
           </a:xfrm>
           <a:prstGeom prst="rect">
             <a:avLst/>
@@ -7263,7 +8214,7 @@
       </p:pic>
       <p:pic>
         <p:nvPicPr>
-          <p:cNvPr id="12" name="Picture 11"/>
+          <p:cNvPr id="11" name="Picture 10"/>
           <p:cNvPicPr>
             <a:picLocks noChangeAspect="1"/>
           </p:cNvPicPr>
@@ -7283,8 +8234,8 @@
         </p:blipFill>
         <p:spPr>
           <a:xfrm>
-            <a:off x="11102171" y="4325449"/>
-            <a:ext cx="1019147" cy="500796"/>
+            <a:off x="11104020" y="3625361"/>
+            <a:ext cx="1017298" cy="501719"/>
           </a:xfrm>
           <a:prstGeom prst="rect">
             <a:avLst/>
@@ -7293,7 +8244,7 @@
       </p:pic>
       <p:pic>
         <p:nvPicPr>
-          <p:cNvPr id="13" name="Picture 12"/>
+          <p:cNvPr id="12" name="Picture 11"/>
           <p:cNvPicPr>
             <a:picLocks noChangeAspect="1"/>
           </p:cNvPicPr>
@@ -7313,6 +8264,36 @@
         </p:blipFill>
         <p:spPr>
           <a:xfrm>
+            <a:off x="11102171" y="4325449"/>
+            <a:ext cx="1019147" cy="500796"/>
+          </a:xfrm>
+          <a:prstGeom prst="rect">
+            <a:avLst/>
+          </a:prstGeom>
+        </p:spPr>
+      </p:pic>
+      <p:pic>
+        <p:nvPicPr>
+          <p:cNvPr id="13" name="Picture 12"/>
+          <p:cNvPicPr>
+            <a:picLocks noChangeAspect="1"/>
+          </p:cNvPicPr>
+          <p:nvPr/>
+        </p:nvPicPr>
+        <p:blipFill>
+          <a:blip r:embed="rId14" cstate="print">
+            <a:extLst>
+              <a:ext uri="{28A0092B-C50C-407E-A947-70E740481C1C}">
+                <a14:useLocalDpi xmlns:a14="http://schemas.microsoft.com/office/drawing/2010/main" val="0"/>
+              </a:ext>
+            </a:extLst>
+          </a:blip>
+          <a:stretch>
+            <a:fillRect/>
+          </a:stretch>
+        </p:blipFill>
+        <p:spPr>
+          <a:xfrm>
             <a:off x="11102171" y="5024614"/>
             <a:ext cx="1017271" cy="501706"/>
           </a:xfrm>
@@ -7331,139 +8312,6 @@
   <p:clrMapOvr>
     <a:masterClrMapping/>
   </p:clrMapOvr>
-  <p:timing>
-    <p:tnLst>
-      <p:par>
-        <p:cTn id="1" dur="indefinite" restart="never" nodeType="tmRoot"/>
-      </p:par>
-    </p:tnLst>
-  </p:timing>
-</p:sld>
-</file>
-
-<file path=ppt/slides/slide2.xml><?xml version="1.0" encoding="utf-8"?>
-<p:sld xmlns:a="http://schemas.openxmlformats.org/drawingml/2006/main" xmlns:r="http://schemas.openxmlformats.org/officeDocument/2006/relationships" xmlns:p="http://schemas.openxmlformats.org/presentationml/2006/main">
-  <p:cSld>
-    <p:spTree>
-      <p:nvGrpSpPr>
-        <p:cNvPr id="1" name=""/>
-        <p:cNvGrpSpPr/>
-        <p:nvPr/>
-      </p:nvGrpSpPr>
-      <p:grpSpPr>
-        <a:xfrm>
-          <a:off x="0" y="0"/>
-          <a:ext cx="0" cy="0"/>
-          <a:chOff x="0" y="0"/>
-          <a:chExt cx="0" cy="0"/>
-        </a:xfrm>
-      </p:grpSpPr>
-      <p:sp>
-        <p:nvSpPr>
-          <p:cNvPr id="3" name="Text Placeholder 2"/>
-          <p:cNvSpPr>
-            <a:spLocks noGrp="1"/>
-          </p:cNvSpPr>
-          <p:nvPr>
-            <p:ph type="body" idx="1"/>
-          </p:nvPr>
-        </p:nvSpPr>
-        <p:spPr/>
-        <p:txBody>
-          <a:bodyPr/>
-          <a:lstStyle/>
-          <a:p>
-            <a:r>
-              <a:rPr lang="en-US" dirty="0"/>
-              <a:t>Introduction</a:t>
-            </a:r>
-          </a:p>
-        </p:txBody>
-      </p:sp>
-    </p:spTree>
-    <p:extLst>
-      <p:ext uri="{BB962C8B-B14F-4D97-AF65-F5344CB8AC3E}">
-        <p14:creationId xmlns:p14="http://schemas.microsoft.com/office/powerpoint/2010/main" val="939011183"/>
-      </p:ext>
-    </p:extLst>
-  </p:cSld>
-  <p:clrMapOvr>
-    <a:masterClrMapping/>
-  </p:clrMapOvr>
-  <p:timing>
-    <p:tnLst>
-      <p:par>
-        <p:cTn id="1" dur="indefinite" restart="never" nodeType="tmRoot"/>
-      </p:par>
-    </p:tnLst>
-  </p:timing>
-</p:sld>
-</file>
-
-<file path=ppt/slides/slide20.xml><?xml version="1.0" encoding="utf-8"?>
-<p:sld xmlns:a="http://schemas.openxmlformats.org/drawingml/2006/main" xmlns:r="http://schemas.openxmlformats.org/officeDocument/2006/relationships" xmlns:p="http://schemas.openxmlformats.org/presentationml/2006/main">
-  <p:cSld>
-    <p:spTree>
-      <p:nvGrpSpPr>
-        <p:cNvPr id="1" name=""/>
-        <p:cNvGrpSpPr/>
-        <p:nvPr/>
-      </p:nvGrpSpPr>
-      <p:grpSpPr>
-        <a:xfrm>
-          <a:off x="0" y="0"/>
-          <a:ext cx="0" cy="0"/>
-          <a:chOff x="0" y="0"/>
-          <a:chExt cx="0" cy="0"/>
-        </a:xfrm>
-      </p:grpSpPr>
-      <p:sp>
-        <p:nvSpPr>
-          <p:cNvPr id="3" name="Text Placeholder 2"/>
-          <p:cNvSpPr>
-            <a:spLocks noGrp="1"/>
-          </p:cNvSpPr>
-          <p:nvPr>
-            <p:ph type="body" idx="1"/>
-          </p:nvPr>
-        </p:nvSpPr>
-        <p:spPr/>
-        <p:txBody>
-          <a:bodyPr/>
-          <a:lstStyle/>
-          <a:p>
-            <a:r>
-              <a:rPr lang="en-US" dirty="0"/>
-              <a:t>Discussion</a:t>
-            </a:r>
-          </a:p>
-        </p:txBody>
-      </p:sp>
-    </p:spTree>
-    <p:extLst>
-      <p:ext uri="{BB962C8B-B14F-4D97-AF65-F5344CB8AC3E}">
-        <p14:creationId xmlns:p14="http://schemas.microsoft.com/office/powerpoint/2010/main" val="2471942181"/>
-      </p:ext>
-    </p:extLst>
-  </p:cSld>
-  <p:clrMapOvr>
-    <a:masterClrMapping/>
-  </p:clrMapOvr>
-  <mc:AlternateContent xmlns:mc="http://schemas.openxmlformats.org/markup-compatibility/2006">
-    <mc:Choice xmlns:p14="http://schemas.microsoft.com/office/powerpoint/2010/main" Requires="p14">
-      <p:transition spd="slow" p14:dur="2000"/>
-    </mc:Choice>
-    <mc:Fallback>
-      <p:transition spd="slow"/>
-    </mc:Fallback>
-  </mc:AlternateContent>
-  <p:timing>
-    <p:tnLst>
-      <p:par>
-        <p:cTn id="1" dur="indefinite" restart="never" nodeType="tmRoot"/>
-      </p:par>
-    </p:tnLst>
-  </p:timing>
 </p:sld>
 </file>
 
@@ -7486,12 +8334,12 @@
       </p:grpSpPr>
       <p:sp>
         <p:nvSpPr>
-          <p:cNvPr id="2" name="Title 1"/>
-          <p:cNvSpPr>
-            <a:spLocks noGrp="1"/>
-          </p:cNvSpPr>
-          <p:nvPr>
-            <p:ph type="title"/>
+          <p:cNvPr id="3" name="Text Placeholder 2"/>
+          <p:cNvSpPr>
+            <a:spLocks noGrp="1"/>
+          </p:cNvSpPr>
+          <p:nvPr>
+            <p:ph type="body" idx="1"/>
           </p:nvPr>
         </p:nvSpPr>
         <p:spPr/>
@@ -7500,10 +8348,61 @@
           <a:lstStyle/>
           <a:p>
             <a:r>
-              <a:rPr lang="en-US" dirty="0" smtClean="0"/>
+              <a:rPr lang="en-US" dirty="0"/>
+              <a:t>Discussion</a:t>
+            </a:r>
+          </a:p>
+        </p:txBody>
+      </p:sp>
+    </p:spTree>
+    <p:extLst>
+      <p:ext uri="{BB962C8B-B14F-4D97-AF65-F5344CB8AC3E}">
+        <p14:creationId xmlns:p14="http://schemas.microsoft.com/office/powerpoint/2010/main" val="2471942181"/>
+      </p:ext>
+    </p:extLst>
+  </p:cSld>
+  <p:clrMapOvr>
+    <a:masterClrMapping/>
+  </p:clrMapOvr>
+</p:sld>
+</file>
+
+<file path=ppt/slides/slide22.xml><?xml version="1.0" encoding="utf-8"?>
+<p:sld xmlns:a="http://schemas.openxmlformats.org/drawingml/2006/main" xmlns:r="http://schemas.openxmlformats.org/officeDocument/2006/relationships" xmlns:p="http://schemas.openxmlformats.org/presentationml/2006/main">
+  <p:cSld>
+    <p:spTree>
+      <p:nvGrpSpPr>
+        <p:cNvPr id="1" name=""/>
+        <p:cNvGrpSpPr/>
+        <p:nvPr/>
+      </p:nvGrpSpPr>
+      <p:grpSpPr>
+        <a:xfrm>
+          <a:off x="0" y="0"/>
+          <a:ext cx="0" cy="0"/>
+          <a:chOff x="0" y="0"/>
+          <a:chExt cx="0" cy="0"/>
+        </a:xfrm>
+      </p:grpSpPr>
+      <p:sp>
+        <p:nvSpPr>
+          <p:cNvPr id="2" name="Title 1"/>
+          <p:cNvSpPr>
+            <a:spLocks noGrp="1"/>
+          </p:cNvSpPr>
+          <p:nvPr>
+            <p:ph type="title"/>
+          </p:nvPr>
+        </p:nvSpPr>
+        <p:spPr/>
+        <p:txBody>
+          <a:bodyPr/>
+          <a:lstStyle/>
+          <a:p>
+            <a:r>
+              <a:rPr lang="en-US" dirty="0"/>
               <a:t>Networks</a:t>
             </a:r>
-            <a:endParaRPr lang="en-US" dirty="0"/>
           </a:p>
         </p:txBody>
       </p:sp>
@@ -7528,15 +8427,15 @@
           <a:lstStyle/>
           <a:p>
             <a:r>
-              <a:rPr lang="en-US" dirty="0" smtClean="0"/>
+              <a:rPr lang="en-US" dirty="0"/>
               <a:t>The prevalence of keratin genes and keratin-related functions within this network implies that keratin genes play a role in </a:t>
             </a:r>
             <a:r>
-              <a:rPr lang="en-US" dirty="0" err="1" smtClean="0"/>
+              <a:rPr lang="en-US" dirty="0" err="1"/>
               <a:t>cataractogenesis</a:t>
             </a:r>
             <a:r>
-              <a:rPr lang="en-US" dirty="0" smtClean="0"/>
+              <a:rPr lang="en-US" dirty="0"/>
               <a:t>. As previously stated, keratin is found in lens epithelial and young fiber cells, and this presence may leave structural and/or chemical remnants that lead to development of cataract.</a:t>
             </a:r>
           </a:p>
@@ -7545,10 +8444,9 @@
           </a:p>
           <a:p>
             <a:r>
-              <a:rPr lang="en-US" dirty="0" smtClean="0"/>
+              <a:rPr lang="en-US" dirty="0"/>
               <a:t>Other genes here (LIM2, BFSP1, BFSP2) also encode lens structural proteins, reinforcing the hypothesis that the structural protein keratin is associated with cataract.</a:t>
             </a:r>
-            <a:endParaRPr lang="en-US" dirty="0"/>
           </a:p>
         </p:txBody>
       </p:sp>
@@ -7605,10 +8503,9 @@
           <a:lstStyle/>
           <a:p>
             <a:r>
-              <a:rPr lang="en-US" sz="1600" dirty="0" smtClean="0"/>
+              <a:rPr lang="en-US" sz="1600" dirty="0"/>
               <a:t>Network 7-2</a:t>
             </a:r>
-            <a:endParaRPr lang="en-US" sz="1600" dirty="0"/>
           </a:p>
         </p:txBody>
       </p:sp>
@@ -7622,17 +8519,10 @@
   <p:clrMapOvr>
     <a:masterClrMapping/>
   </p:clrMapOvr>
-  <p:timing>
-    <p:tnLst>
-      <p:par>
-        <p:cTn id="1" dur="indefinite" restart="never" nodeType="tmRoot"/>
-      </p:par>
-    </p:tnLst>
-  </p:timing>
 </p:sld>
 </file>
 
-<file path=ppt/slides/slide22.xml><?xml version="1.0" encoding="utf-8"?>
+<file path=ppt/slides/slide23.xml><?xml version="1.0" encoding="utf-8"?>
 <p:sld xmlns:a="http://schemas.openxmlformats.org/drawingml/2006/main" xmlns:r="http://schemas.openxmlformats.org/officeDocument/2006/relationships" xmlns:p="http://schemas.openxmlformats.org/presentationml/2006/main">
   <p:cSld>
     <p:spTree>
@@ -7665,10 +8555,9 @@
           <a:lstStyle/>
           <a:p>
             <a:r>
-              <a:rPr lang="en-US" dirty="0" smtClean="0"/>
+              <a:rPr lang="en-US" dirty="0"/>
               <a:t>Networks</a:t>
             </a:r>
-            <a:endParaRPr lang="en-US" dirty="0"/>
           </a:p>
         </p:txBody>
       </p:sp>
@@ -7693,35 +8582,34 @@
           <a:lstStyle/>
           <a:p>
             <a:r>
-              <a:rPr lang="en-US" dirty="0" smtClean="0"/>
+              <a:rPr lang="en-US" dirty="0"/>
               <a:t>TNF affects many of the genes in this network; it causes an increase in DEFB4A/DEFB4B and CHI3L1 genes, and it and CRYBA4/CRYBB2 are both impacted by D-galactose. </a:t>
             </a:r>
           </a:p>
           <a:p>
-            <a:endParaRPr lang="en-US" dirty="0" smtClean="0"/>
-          </a:p>
-          <a:p>
-            <a:r>
-              <a:rPr lang="en-US" dirty="0" smtClean="0"/>
+            <a:endParaRPr lang="en-US" dirty="0"/>
+          </a:p>
+          <a:p>
+            <a:r>
+              <a:rPr lang="en-US" dirty="0"/>
               <a:t>The DEFB4 genes encode </a:t>
             </a:r>
             <a:r>
-              <a:rPr lang="en-US" dirty="0" err="1" smtClean="0"/>
+              <a:rPr lang="en-US" dirty="0" err="1"/>
               <a:t>defensin</a:t>
             </a:r>
             <a:r>
-              <a:rPr lang="en-US" dirty="0" smtClean="0"/>
+              <a:rPr lang="en-US" dirty="0"/>
               <a:t> antimicrobial protein, and CHI3L1 encodes a chitin-</a:t>
             </a:r>
             <a:r>
-              <a:rPr lang="en-US" dirty="0" err="1" smtClean="0"/>
+              <a:rPr lang="en-US" dirty="0" err="1"/>
               <a:t>hydrolysing</a:t>
             </a:r>
             <a:r>
-              <a:rPr lang="en-US" dirty="0" smtClean="0"/>
+              <a:rPr lang="en-US" dirty="0"/>
               <a:t> enzyme; this may mean that antimicrobial pathways play a role in cataract, and may even imply that cataract is affected by microbial factors.</a:t>
             </a:r>
-            <a:endParaRPr lang="en-US" dirty="0"/>
           </a:p>
         </p:txBody>
       </p:sp>
@@ -7778,10 +8666,9 @@
           <a:lstStyle/>
           <a:p>
             <a:r>
-              <a:rPr lang="en-US" sz="1600" dirty="0" smtClean="0"/>
+              <a:rPr lang="en-US" sz="1600" dirty="0"/>
               <a:t>Network 21-1</a:t>
             </a:r>
-            <a:endParaRPr lang="en-US" sz="1600" dirty="0"/>
           </a:p>
         </p:txBody>
       </p:sp>
@@ -7795,17 +8682,10 @@
   <p:clrMapOvr>
     <a:masterClrMapping/>
   </p:clrMapOvr>
-  <p:timing>
-    <p:tnLst>
-      <p:par>
-        <p:cTn id="1" dur="indefinite" restart="never" nodeType="tmRoot"/>
-      </p:par>
-    </p:tnLst>
-  </p:timing>
 </p:sld>
 </file>
 
-<file path=ppt/slides/slide23.xml><?xml version="1.0" encoding="utf-8"?>
+<file path=ppt/slides/slide24.xml><?xml version="1.0" encoding="utf-8"?>
 <p:sld xmlns:a="http://schemas.openxmlformats.org/drawingml/2006/main" xmlns:r="http://schemas.openxmlformats.org/officeDocument/2006/relationships" xmlns:p="http://schemas.openxmlformats.org/presentationml/2006/main">
   <p:cSld>
     <p:spTree>
@@ -7827,6 +8707,109 @@
           <p:cNvPr id="2" name="Title 1">
             <a:extLst>
               <a:ext uri="{FF2B5EF4-FFF2-40B4-BE49-F238E27FC236}">
+                <a16:creationId xmlns:a16="http://schemas.microsoft.com/office/drawing/2014/main" id="{35AFF18C-29BB-4C3D-BA5D-42FDB124503E}"/>
+              </a:ext>
+            </a:extLst>
+          </p:cNvPr>
+          <p:cNvSpPr>
+            <a:spLocks noGrp="1"/>
+          </p:cNvSpPr>
+          <p:nvPr>
+            <p:ph type="title"/>
+          </p:nvPr>
+        </p:nvSpPr>
+        <p:spPr/>
+        <p:txBody>
+          <a:bodyPr/>
+          <a:lstStyle/>
+          <a:p>
+            <a:r>
+              <a:rPr lang="en-US" dirty="0"/>
+              <a:t>Conclusion</a:t>
+            </a:r>
+          </a:p>
+        </p:txBody>
+      </p:sp>
+      <p:sp>
+        <p:nvSpPr>
+          <p:cNvPr id="3" name="Content Placeholder 2">
+            <a:extLst>
+              <a:ext uri="{FF2B5EF4-FFF2-40B4-BE49-F238E27FC236}">
+                <a16:creationId xmlns:a16="http://schemas.microsoft.com/office/drawing/2014/main" id="{3C3BBF61-6E16-4748-B4AB-8585E431704D}"/>
+              </a:ext>
+            </a:extLst>
+          </p:cNvPr>
+          <p:cNvSpPr>
+            <a:spLocks noGrp="1"/>
+          </p:cNvSpPr>
+          <p:nvPr>
+            <p:ph idx="1"/>
+          </p:nvPr>
+        </p:nvSpPr>
+        <p:spPr/>
+        <p:txBody>
+          <a:bodyPr/>
+          <a:lstStyle/>
+          <a:p>
+            <a:r>
+              <a:rPr lang="en-US" dirty="0"/>
+              <a:t>We have found two functions previously unassociated with </a:t>
+            </a:r>
+            <a:r>
+              <a:rPr lang="en-US" dirty="0" err="1"/>
+              <a:t>cataractogenesis</a:t>
+            </a:r>
+            <a:r>
+              <a:rPr lang="en-US" dirty="0"/>
+              <a:t>. The impact of keratin on epithelial and fiber cells may be an important factor in cataract formation during old age. In addition, the action of TNF genes and their impact on other genes may also influence cataract. Of course, further investigation is needed to confirm these links.</a:t>
+            </a:r>
+          </a:p>
+          <a:p>
+            <a:r>
+              <a:rPr lang="en-US" dirty="0"/>
+              <a:t>Cataract remains a highly prevalent problem around the world. Further elucidation of the causes and pathways leading to cataract can lead to development of therapies and treatments aimed at these causes, helping to prevent and ultimately treat cataracts non-surgically. Such a breakthrough will have large impacts on cataract prevalence, especially in third-world countries and among people with poor healthcare or socioeconomic status.</a:t>
+            </a:r>
+          </a:p>
+          <a:p>
+            <a:endParaRPr lang="en-US" dirty="0"/>
+          </a:p>
+        </p:txBody>
+      </p:sp>
+    </p:spTree>
+    <p:extLst>
+      <p:ext uri="{BB962C8B-B14F-4D97-AF65-F5344CB8AC3E}">
+        <p14:creationId xmlns:p14="http://schemas.microsoft.com/office/powerpoint/2010/main" val="420357700"/>
+      </p:ext>
+    </p:extLst>
+  </p:cSld>
+  <p:clrMapOvr>
+    <a:masterClrMapping/>
+  </p:clrMapOvr>
+</p:sld>
+</file>
+
+<file path=ppt/slides/slide25.xml><?xml version="1.0" encoding="utf-8"?>
+<p:sld xmlns:a="http://schemas.openxmlformats.org/drawingml/2006/main" xmlns:r="http://schemas.openxmlformats.org/officeDocument/2006/relationships" xmlns:p="http://schemas.openxmlformats.org/presentationml/2006/main">
+  <p:cSld>
+    <p:spTree>
+      <p:nvGrpSpPr>
+        <p:cNvPr id="1" name=""/>
+        <p:cNvGrpSpPr/>
+        <p:nvPr/>
+      </p:nvGrpSpPr>
+      <p:grpSpPr>
+        <a:xfrm>
+          <a:off x="0" y="0"/>
+          <a:ext cx="0" cy="0"/>
+          <a:chOff x="0" y="0"/>
+          <a:chExt cx="0" cy="0"/>
+        </a:xfrm>
+      </p:grpSpPr>
+      <p:sp>
+        <p:nvSpPr>
+          <p:cNvPr id="2" name="Title 1">
+            <a:extLst>
+              <a:ext uri="{FF2B5EF4-FFF2-40B4-BE49-F238E27FC236}">
                 <a16:creationId xmlns:a16="http://schemas.microsoft.com/office/drawing/2014/main" id="{31524436-7470-4F18-B985-FED8070CCDCC}"/>
               </a:ext>
             </a:extLst>
@@ -7868,35 +8851,25 @@
         </p:nvSpPr>
         <p:spPr/>
         <p:txBody>
-          <a:bodyPr/>
+          <a:bodyPr>
+            <a:normAutofit lnSpcReduction="10000"/>
+          </a:bodyPr>
           <a:lstStyle/>
           <a:p>
             <a:pPr marL="574675" indent="-457200">
               <a:buNone/>
             </a:pPr>
             <a:r>
-              <a:rPr lang="en-US" dirty="0" err="1"/>
-              <a:t>Padmanabha</a:t>
-            </a:r>
-            <a:r>
               <a:rPr lang="en-US" dirty="0"/>
-              <a:t>, Smitha, and Baskaran </a:t>
-            </a:r>
-            <a:r>
-              <a:rPr lang="en-US" dirty="0" err="1"/>
-              <a:t>Vallikannan</a:t>
+              <a:t>Congdon, Nathan G. “Important Causes of Visual Impairment in the World Today.” </a:t>
+            </a:r>
+            <a:r>
+              <a:rPr lang="en-US" i="1" dirty="0"/>
+              <a:t>Jama</a:t>
             </a:r>
             <a:r>
               <a:rPr lang="en-US" dirty="0"/>
-              <a:t>. “Fatty Acids Modulate the Efficacy of Lutein in Cataract Prevention: Assessment of Oxidative and Inflammatory Parameters in Rats.” </a:t>
-            </a:r>
-            <a:r>
-              <a:rPr lang="en-US" i="1" dirty="0"/>
-              <a:t>Biochemical and Biophysical Research Communications</a:t>
-            </a:r>
-            <a:r>
-              <a:rPr lang="en-US" dirty="0"/>
-              <a:t>, vol. 500, no. 2, 2 June 2018, pp. 435–442., doi:10.1016/j.bbrc.2018.04.098.</a:t>
+              <a:t>, vol. 290, no. 15, 15 Oct. 2003, pp. 2057–2060., doi:10.1001/jama.290.15.2057.</a:t>
             </a:r>
           </a:p>
           <a:p>
@@ -7905,27 +8878,27 @@
             </a:pPr>
             <a:r>
               <a:rPr lang="en-US" dirty="0" err="1"/>
-              <a:t>Pollreisz</a:t>
+              <a:t>Padmanabha</a:t>
             </a:r>
             <a:r>
               <a:rPr lang="en-US" dirty="0"/>
-              <a:t>, Andreas, and Ursula Schmidt-</a:t>
+              <a:t>, Smitha, and Baskaran </a:t>
             </a:r>
             <a:r>
               <a:rPr lang="en-US" dirty="0" err="1"/>
-              <a:t>Erfurth</a:t>
+              <a:t>Vallikannan</a:t>
             </a:r>
             <a:r>
               <a:rPr lang="en-US" dirty="0"/>
-              <a:t>. “Diabetic Cataract—Pathogenesis, Epidemiology and Treatment.” </a:t>
+              <a:t>. “Fatty Acids Modulate the Efficacy of Lutein in Cataract Prevention: Assessment of Oxidative and Inflammatory Parameters in Rats.” </a:t>
             </a:r>
             <a:r>
               <a:rPr lang="en-US" i="1" dirty="0"/>
-              <a:t>Journal of Ophthalmology</a:t>
+              <a:t>Biochemical and Biophysical Research Communications</a:t>
             </a:r>
             <a:r>
               <a:rPr lang="en-US" dirty="0"/>
-              <a:t>, vol. 2010, 2 Apr. 2010, pp. 1–8., doi:10.1155/2010/608751.</a:t>
+              <a:t>, vol. 500, no. 2, 2 June 2018, pp. 435–442., doi:10.1016/j.bbrc.2018.04.098.</a:t>
             </a:r>
           </a:p>
           <a:p>
@@ -7933,6 +8906,35 @@
               <a:buNone/>
             </a:pPr>
             <a:r>
+              <a:rPr lang="en-US" dirty="0" err="1"/>
+              <a:t>Pollreisz</a:t>
+            </a:r>
+            <a:r>
+              <a:rPr lang="en-US" dirty="0"/>
+              <a:t>, Andreas, and Ursula Schmidt-</a:t>
+            </a:r>
+            <a:r>
+              <a:rPr lang="en-US" dirty="0" err="1"/>
+              <a:t>Erfurth</a:t>
+            </a:r>
+            <a:r>
+              <a:rPr lang="en-US" dirty="0"/>
+              <a:t>. “Diabetic Cataract—Pathogenesis, Epidemiology and Treatment.” </a:t>
+            </a:r>
+            <a:r>
+              <a:rPr lang="en-US" i="1" dirty="0"/>
+              <a:t>Journal of Ophthalmology</a:t>
+            </a:r>
+            <a:r>
+              <a:rPr lang="en-US" dirty="0"/>
+              <a:t>, vol. 2010, 2 Apr. 2010, pp. 1–8., doi:10.1155/2010/608751.</a:t>
+            </a:r>
+          </a:p>
+          <a:p>
+            <a:pPr marL="574675" indent="-457200">
+              <a:buNone/>
+            </a:pPr>
+            <a:r>
               <a:rPr lang="en-US" dirty="0"/>
               <a:t>Quinlan, R A, et al. “The Eye Lens Cytoskeleton.” </a:t>
             </a:r>
@@ -7942,11 +8944,7 @@
             </a:r>
             <a:r>
               <a:rPr lang="en-US" dirty="0"/>
-              <a:t>, vol. 13, no. 3, May 1999, pp. 409–416., doi:10.1038/eye.1999.115</a:t>
-            </a:r>
-            <a:r>
-              <a:rPr lang="en-US" dirty="0" smtClean="0"/>
-              <a:t>.</a:t>
+              <a:t>, vol. 13, no. 3, May 1999, pp. 409–416., doi:10.1038/eye.1999.115.</a:t>
             </a:r>
           </a:p>
           <a:p>
@@ -8002,6 +9000,58 @@
   <p:cSld>
     <p:spTree>
       <p:nvGrpSpPr>
+        <p:cNvPr id="1" name=""/>
+        <p:cNvGrpSpPr/>
+        <p:nvPr/>
+      </p:nvGrpSpPr>
+      <p:grpSpPr>
+        <a:xfrm>
+          <a:off x="0" y="0"/>
+          <a:ext cx="0" cy="0"/>
+          <a:chOff x="0" y="0"/>
+          <a:chExt cx="0" cy="0"/>
+        </a:xfrm>
+      </p:grpSpPr>
+      <p:sp>
+        <p:nvSpPr>
+          <p:cNvPr id="3" name="Text Placeholder 2"/>
+          <p:cNvSpPr>
+            <a:spLocks noGrp="1"/>
+          </p:cNvSpPr>
+          <p:nvPr>
+            <p:ph type="body" idx="1"/>
+          </p:nvPr>
+        </p:nvSpPr>
+        <p:spPr/>
+        <p:txBody>
+          <a:bodyPr/>
+          <a:lstStyle/>
+          <a:p>
+            <a:r>
+              <a:rPr lang="en-US" dirty="0"/>
+              <a:t>Introduction</a:t>
+            </a:r>
+          </a:p>
+        </p:txBody>
+      </p:sp>
+    </p:spTree>
+    <p:extLst>
+      <p:ext uri="{BB962C8B-B14F-4D97-AF65-F5344CB8AC3E}">
+        <p14:creationId xmlns:p14="http://schemas.microsoft.com/office/powerpoint/2010/main" val="939011183"/>
+      </p:ext>
+    </p:extLst>
+  </p:cSld>
+  <p:clrMapOvr>
+    <a:masterClrMapping/>
+  </p:clrMapOvr>
+</p:sld>
+</file>
+
+<file path=ppt/slides/slide4.xml><?xml version="1.0" encoding="utf-8"?>
+<p:sld xmlns:a="http://schemas.openxmlformats.org/drawingml/2006/main" xmlns:r="http://schemas.openxmlformats.org/officeDocument/2006/relationships" xmlns:p="http://schemas.openxmlformats.org/presentationml/2006/main">
+  <p:cSld>
+    <p:spTree>
+      <p:nvGrpSpPr>
         <p:cNvPr id="1" name="Shape 59"/>
         <p:cNvGrpSpPr/>
         <p:nvPr/>
@@ -8107,21 +9157,30 @@
           <a:p>
             <a:r>
               <a:rPr lang="en" sz="2400" dirty="0"/>
-              <a:t>Lens is located in front of eye. Focuses light on back of eye.</a:t>
+              <a:t>Lens is located in front of eye; </a:t>
+            </a:r>
+            <a:r>
+              <a:rPr lang="en-US" sz="2400" dirty="0"/>
+              <a:t>its function is to focus incoming light onto the retina.</a:t>
             </a:r>
             <a:endParaRPr sz="2400" dirty="0"/>
           </a:p>
           <a:p>
-            <a:r>
-              <a:rPr lang="en" sz="2400" dirty="0"/>
-              <a:t>To focus, we change the curvature of the lens (more or less spherical) </a:t>
-            </a:r>
             <a:endParaRPr sz="2400" dirty="0"/>
           </a:p>
           <a:p>
             <a:r>
               <a:rPr lang="en" sz="2400" dirty="0"/>
               <a:t>Three parts: capsule (outer elastic layer of cells), epithelium (cells that divide to produce fiber cells), fiber cells (clear, organelle-free cells)</a:t>
+            </a:r>
+          </a:p>
+          <a:p>
+            <a:endParaRPr lang="en" sz="2400" dirty="0"/>
+          </a:p>
+          <a:p>
+            <a:r>
+              <a:rPr lang="en" sz="2400" dirty="0"/>
+              <a:t>To focus, we change the curvature of the lens</a:t>
             </a:r>
             <a:endParaRPr sz="2400" dirty="0"/>
           </a:p>
@@ -8383,17 +9442,10 @@
   <p:clrMapOvr>
     <a:masterClrMapping/>
   </p:clrMapOvr>
-  <p:timing>
-    <p:tnLst>
-      <p:par>
-        <p:cTn id="1" dur="indefinite" restart="never" nodeType="tmRoot"/>
-      </p:par>
-    </p:tnLst>
-  </p:timing>
 </p:sld>
 </file>
 
-<file path=ppt/slides/slide4.xml><?xml version="1.0" encoding="utf-8"?>
+<file path=ppt/slides/slide5.xml><?xml version="1.0" encoding="utf-8"?>
 <p:sld xmlns:a="http://schemas.openxmlformats.org/drawingml/2006/main" xmlns:r="http://schemas.openxmlformats.org/officeDocument/2006/relationships" xmlns:p="http://schemas.openxmlformats.org/presentationml/2006/main">
   <p:cSld>
     <p:spTree>
@@ -8772,17 +9824,10 @@
   <p:clrMapOvr>
     <a:masterClrMapping/>
   </p:clrMapOvr>
-  <p:timing>
-    <p:tnLst>
-      <p:par>
-        <p:cTn id="1" dur="indefinite" restart="never" nodeType="tmRoot"/>
-      </p:par>
-    </p:tnLst>
-  </p:timing>
 </p:sld>
 </file>
 
-<file path=ppt/slides/slide5.xml><?xml version="1.0" encoding="utf-8"?>
+<file path=ppt/slides/slide6.xml><?xml version="1.0" encoding="utf-8"?>
 <p:sld xmlns:a="http://schemas.openxmlformats.org/drawingml/2006/main" xmlns:r="http://schemas.openxmlformats.org/officeDocument/2006/relationships" xmlns:p="http://schemas.openxmlformats.org/presentationml/2006/main">
   <p:cSld>
     <p:spTree>
@@ -8945,6 +9990,39 @@
                 <a:spcPct val="120000"/>
               </a:lnSpc>
             </a:pPr>
+            <a:r>
+              <a:rPr lang="en-US" sz="2400" dirty="0"/>
+              <a:t>Leading cause of blindness worldwide</a:t>
+            </a:r>
+          </a:p>
+          <a:p>
+            <a:pPr lvl="1" algn="just">
+              <a:lnSpc>
+                <a:spcPct val="120000"/>
+              </a:lnSpc>
+              <a:spcBef>
+                <a:spcPts val="0"/>
+              </a:spcBef>
+            </a:pPr>
+            <a:r>
+              <a:rPr lang="en-US" sz="2200" dirty="0"/>
+              <a:t>Estimated 17 million people with bilateral cataracts (Congdon et al, 2003)</a:t>
+            </a:r>
+          </a:p>
+          <a:p>
+            <a:pPr algn="just">
+              <a:lnSpc>
+                <a:spcPct val="120000"/>
+              </a:lnSpc>
+            </a:pPr>
+            <a:endParaRPr lang="en-US" sz="2400" dirty="0"/>
+          </a:p>
+          <a:p>
+            <a:pPr algn="just">
+              <a:lnSpc>
+                <a:spcPct val="120000"/>
+              </a:lnSpc>
+            </a:pPr>
             <a:endParaRPr lang="en-US" sz="2400" dirty="0"/>
           </a:p>
           <a:p>
@@ -8994,17 +10072,10 @@
   <p:clrMapOvr>
     <a:masterClrMapping/>
   </p:clrMapOvr>
-  <p:timing>
-    <p:tnLst>
-      <p:par>
-        <p:cTn id="1" dur="indefinite" restart="never" nodeType="tmRoot"/>
-      </p:par>
-    </p:tnLst>
-  </p:timing>
 </p:sld>
 </file>
 
-<file path=ppt/slides/slide6.xml><?xml version="1.0" encoding="utf-8"?>
+<file path=ppt/slides/slide7.xml><?xml version="1.0" encoding="utf-8"?>
 <p:sld xmlns:a="http://schemas.openxmlformats.org/drawingml/2006/main" xmlns:r="http://schemas.openxmlformats.org/officeDocument/2006/relationships" xmlns:p="http://schemas.openxmlformats.org/presentationml/2006/main">
   <p:cSld>
     <p:spTree>
@@ -9207,17 +10278,10 @@
   <p:clrMapOvr>
     <a:masterClrMapping/>
   </p:clrMapOvr>
-  <p:timing>
-    <p:tnLst>
-      <p:par>
-        <p:cTn id="1" dur="indefinite" restart="never" nodeType="tmRoot"/>
-      </p:par>
-    </p:tnLst>
-  </p:timing>
 </p:sld>
 </file>
 
-<file path=ppt/slides/slide7.xml><?xml version="1.0" encoding="utf-8"?>
+<file path=ppt/slides/slide8.xml><?xml version="1.0" encoding="utf-8"?>
 <p:sld xmlns:a="http://schemas.openxmlformats.org/drawingml/2006/main" xmlns:r="http://schemas.openxmlformats.org/officeDocument/2006/relationships" xmlns:p="http://schemas.openxmlformats.org/presentationml/2006/main">
   <p:cSld>
     <p:spTree>
@@ -9323,15 +10387,15 @@
               <a:lstStyle/>
               <a:p>
                 <a:pPr algn="ctr"/>
-                <a:endParaRPr lang="en-US" dirty="0" smtClean="0"/>
+                <a:endParaRPr lang="en-US" dirty="0"/>
               </a:p>
               <a:p>
                 <a:pPr algn="ctr"/>
-                <a:endParaRPr lang="en-US" dirty="0" smtClean="0"/>
+                <a:endParaRPr lang="en-US" dirty="0"/>
               </a:p>
               <a:p>
                 <a:pPr algn="ctr"/>
-                <a:endParaRPr lang="en-US" sz="1100" dirty="0" smtClean="0">
+                <a:endParaRPr lang="en-US" sz="1100" dirty="0">
                   <a:solidFill>
                     <a:sysClr val="windowText" lastClr="000000"/>
                   </a:solidFill>
@@ -9347,7 +10411,7 @@
               </a:p>
               <a:p>
                 <a:pPr algn="ctr"/>
-                <a:endParaRPr lang="en-US" sz="1100" dirty="0" smtClean="0">
+                <a:endParaRPr lang="en-US" sz="1100" dirty="0">
                   <a:solidFill>
                     <a:sysClr val="windowText" lastClr="000000"/>
                   </a:solidFill>
@@ -9355,7 +10419,7 @@
               </a:p>
               <a:p>
                 <a:pPr algn="ctr"/>
-                <a:endParaRPr lang="en-US" sz="1100" dirty="0" smtClean="0">
+                <a:endParaRPr lang="en-US" sz="1100" dirty="0">
                   <a:solidFill>
                     <a:sysClr val="windowText" lastClr="000000"/>
                   </a:solidFill>
@@ -9372,18 +10436,13 @@
               <a:p>
                 <a:pPr algn="ctr"/>
                 <a:r>
-                  <a:rPr lang="en-US" sz="1100" dirty="0" smtClean="0">
+                  <a:rPr lang="en-US" sz="1100" dirty="0">
                     <a:solidFill>
                       <a:sysClr val="windowText" lastClr="000000"/>
                     </a:solidFill>
                   </a:rPr>
                   <a:t>Gene Collection</a:t>
                 </a:r>
-                <a:endParaRPr lang="en-US" sz="1100" dirty="0">
-                  <a:solidFill>
-                    <a:sysClr val="windowText" lastClr="000000"/>
-                  </a:solidFill>
-                </a:endParaRPr>
               </a:p>
             </p:txBody>
           </p:sp>
@@ -9501,15 +10560,15 @@
               <a:lstStyle/>
               <a:p>
                 <a:pPr algn="ctr"/>
-                <a:endParaRPr lang="en-US" dirty="0" smtClean="0"/>
+                <a:endParaRPr lang="en-US" dirty="0"/>
               </a:p>
               <a:p>
                 <a:pPr algn="ctr"/>
-                <a:endParaRPr lang="en-US" dirty="0" smtClean="0"/>
+                <a:endParaRPr lang="en-US" dirty="0"/>
               </a:p>
               <a:p>
                 <a:pPr algn="ctr"/>
-                <a:endParaRPr lang="en-US" sz="1100" dirty="0" smtClean="0">
+                <a:endParaRPr lang="en-US" sz="1100" dirty="0">
                   <a:solidFill>
                     <a:sysClr val="windowText" lastClr="000000"/>
                   </a:solidFill>
@@ -9525,7 +10584,7 @@
               </a:p>
               <a:p>
                 <a:pPr algn="ctr"/>
-                <a:endParaRPr lang="en-US" sz="1100" dirty="0" smtClean="0">
+                <a:endParaRPr lang="en-US" sz="1100" dirty="0">
                   <a:solidFill>
                     <a:sysClr val="windowText" lastClr="000000"/>
                   </a:solidFill>
@@ -9533,7 +10592,7 @@
               </a:p>
               <a:p>
                 <a:pPr algn="ctr"/>
-                <a:endParaRPr lang="en-US" sz="1100" dirty="0" smtClean="0">
+                <a:endParaRPr lang="en-US" sz="1100" dirty="0">
                   <a:solidFill>
                     <a:sysClr val="windowText" lastClr="000000"/>
                   </a:solidFill>
@@ -9550,18 +10609,13 @@
               <a:p>
                 <a:pPr algn="ctr"/>
                 <a:r>
-                  <a:rPr lang="en-US" sz="1100" dirty="0" smtClean="0">
+                  <a:rPr lang="en-US" sz="1100" dirty="0">
                     <a:solidFill>
                       <a:sysClr val="windowText" lastClr="000000"/>
                     </a:solidFill>
                   </a:rPr>
                   <a:t>Gene Clustering</a:t>
                 </a:r>
-                <a:endParaRPr lang="en-US" sz="1100" dirty="0">
-                  <a:solidFill>
-                    <a:sysClr val="windowText" lastClr="000000"/>
-                  </a:solidFill>
-                </a:endParaRPr>
               </a:p>
             </p:txBody>
           </p:sp>
@@ -9709,15 +10763,15 @@
               <a:lstStyle/>
               <a:p>
                 <a:pPr algn="ctr"/>
-                <a:endParaRPr lang="en-US" dirty="0" smtClean="0"/>
+                <a:endParaRPr lang="en-US" dirty="0"/>
               </a:p>
               <a:p>
                 <a:pPr algn="ctr"/>
-                <a:endParaRPr lang="en-US" dirty="0" smtClean="0"/>
+                <a:endParaRPr lang="en-US" dirty="0"/>
               </a:p>
               <a:p>
                 <a:pPr algn="ctr"/>
-                <a:endParaRPr lang="en-US" sz="1100" dirty="0" smtClean="0">
+                <a:endParaRPr lang="en-US" sz="1100" dirty="0">
                   <a:solidFill>
                     <a:sysClr val="windowText" lastClr="000000"/>
                   </a:solidFill>
@@ -9733,7 +10787,7 @@
               </a:p>
               <a:p>
                 <a:pPr algn="ctr"/>
-                <a:endParaRPr lang="en-US" sz="1100" dirty="0" smtClean="0">
+                <a:endParaRPr lang="en-US" sz="1100" dirty="0">
                   <a:solidFill>
                     <a:sysClr val="windowText" lastClr="000000"/>
                   </a:solidFill>
@@ -9741,7 +10795,7 @@
               </a:p>
               <a:p>
                 <a:pPr algn="ctr"/>
-                <a:endParaRPr lang="en-US" sz="1100" dirty="0" smtClean="0">
+                <a:endParaRPr lang="en-US" sz="1100" dirty="0">
                   <a:solidFill>
                     <a:sysClr val="windowText" lastClr="000000"/>
                   </a:solidFill>
@@ -9758,18 +10812,13 @@
               <a:p>
                 <a:pPr algn="ctr"/>
                 <a:r>
-                  <a:rPr lang="en-US" sz="1100" dirty="0" smtClean="0">
+                  <a:rPr lang="en-US" sz="1100" dirty="0">
                     <a:solidFill>
                       <a:sysClr val="windowText" lastClr="000000"/>
                     </a:solidFill>
                   </a:rPr>
                   <a:t>Function Analysis</a:t>
                 </a:r>
-                <a:endParaRPr lang="en-US" sz="1100" dirty="0">
-                  <a:solidFill>
-                    <a:sysClr val="windowText" lastClr="000000"/>
-                  </a:solidFill>
-                </a:endParaRPr>
               </a:p>
             </p:txBody>
           </p:sp>
@@ -9922,7 +10971,7 @@
               <a:lstStyle/>
               <a:p>
                 <a:pPr algn="ctr"/>
-                <a:endParaRPr lang="en-US" sz="1100" dirty="0" smtClean="0"/>
+                <a:endParaRPr lang="en-US" sz="1100" dirty="0"/>
               </a:p>
               <a:p>
                 <a:pPr algn="ctr"/>
@@ -9931,18 +10980,13 @@
               <a:p>
                 <a:pPr algn="ctr"/>
                 <a:r>
-                  <a:rPr lang="en-US" sz="1100" dirty="0" smtClean="0">
+                  <a:rPr lang="en-US" sz="1100" dirty="0">
                     <a:solidFill>
                       <a:schemeClr val="tx1"/>
                     </a:solidFill>
                   </a:rPr>
                   <a:t>Pathway Analysis</a:t>
                 </a:r>
-                <a:endParaRPr lang="en-US" sz="1100" dirty="0">
-                  <a:solidFill>
-                    <a:schemeClr val="tx1"/>
-                  </a:solidFill>
-                </a:endParaRPr>
               </a:p>
             </p:txBody>
           </p:sp>
@@ -10102,17 +11146,10 @@
   <p:clrMapOvr>
     <a:masterClrMapping/>
   </p:clrMapOvr>
-  <p:timing>
-    <p:tnLst>
-      <p:par>
-        <p:cTn id="1" dur="indefinite" restart="never" nodeType="tmRoot"/>
-      </p:par>
-    </p:tnLst>
-  </p:timing>
 </p:sld>
 </file>
 
-<file path=ppt/slides/slide8.xml><?xml version="1.0" encoding="utf-8"?>
+<file path=ppt/slides/slide9.xml><?xml version="1.0" encoding="utf-8"?>
 <p:sld xmlns:a="http://schemas.openxmlformats.org/drawingml/2006/main" xmlns:r="http://schemas.openxmlformats.org/officeDocument/2006/relationships" xmlns:p="http://schemas.openxmlformats.org/presentationml/2006/main">
   <p:cSld>
     <p:spTree>
@@ -10658,539 +11695,6 @@
   <p:clrMapOvr>
     <a:masterClrMapping/>
   </p:clrMapOvr>
-  <p:timing>
-    <p:tnLst>
-      <p:par>
-        <p:cTn id="1" dur="indefinite" restart="never" nodeType="tmRoot"/>
-      </p:par>
-    </p:tnLst>
-  </p:timing>
-</p:sld>
-</file>
-
-<file path=ppt/slides/slide9.xml><?xml version="1.0" encoding="utf-8"?>
-<p:sld xmlns:a="http://schemas.openxmlformats.org/drawingml/2006/main" xmlns:r="http://schemas.openxmlformats.org/officeDocument/2006/relationships" xmlns:p="http://schemas.openxmlformats.org/presentationml/2006/main">
-  <p:cSld>
-    <p:spTree>
-      <p:nvGrpSpPr>
-        <p:cNvPr id="1" name=""/>
-        <p:cNvGrpSpPr/>
-        <p:nvPr/>
-      </p:nvGrpSpPr>
-      <p:grpSpPr>
-        <a:xfrm>
-          <a:off x="0" y="0"/>
-          <a:ext cx="0" cy="0"/>
-          <a:chOff x="0" y="0"/>
-          <a:chExt cx="0" cy="0"/>
-        </a:xfrm>
-      </p:grpSpPr>
-      <p:sp>
-        <p:nvSpPr>
-          <p:cNvPr id="2" name="Title 1"/>
-          <p:cNvSpPr>
-            <a:spLocks noGrp="1"/>
-          </p:cNvSpPr>
-          <p:nvPr>
-            <p:ph type="title"/>
-          </p:nvPr>
-        </p:nvSpPr>
-        <p:spPr/>
-        <p:txBody>
-          <a:bodyPr/>
-          <a:lstStyle/>
-          <a:p>
-            <a:r>
-              <a:rPr lang="en-US" dirty="0"/>
-              <a:t>Methods</a:t>
-            </a:r>
-          </a:p>
-        </p:txBody>
-      </p:sp>
-      <p:sp>
-        <p:nvSpPr>
-          <p:cNvPr id="3" name="Text Placeholder 2"/>
-          <p:cNvSpPr>
-            <a:spLocks noGrp="1"/>
-          </p:cNvSpPr>
-          <p:nvPr>
-            <p:ph type="body" idx="1"/>
-          </p:nvPr>
-        </p:nvSpPr>
-        <p:spPr/>
-        <p:txBody>
-          <a:bodyPr/>
-          <a:lstStyle/>
-          <a:p>
-            <a:r>
-              <a:rPr lang="en-US" dirty="0"/>
-              <a:t>Function Analysis</a:t>
-            </a:r>
-          </a:p>
-        </p:txBody>
-      </p:sp>
-      <p:sp>
-        <p:nvSpPr>
-          <p:cNvPr id="4" name="Content Placeholder 3"/>
-          <p:cNvSpPr>
-            <a:spLocks noGrp="1"/>
-          </p:cNvSpPr>
-          <p:nvPr>
-            <p:ph sz="half" idx="2"/>
-          </p:nvPr>
-        </p:nvSpPr>
-        <p:spPr/>
-        <p:txBody>
-          <a:bodyPr/>
-          <a:lstStyle/>
-          <a:p>
-            <a:r>
-              <a:rPr lang="en-US" dirty="0"/>
-              <a:t>Clusters were analyzed within </a:t>
-            </a:r>
-            <a:r>
-              <a:rPr lang="en-US" dirty="0" err="1"/>
-              <a:t>Cytoscape</a:t>
-            </a:r>
-            <a:r>
-              <a:rPr lang="en-US" dirty="0"/>
-              <a:t> using </a:t>
-            </a:r>
-            <a:r>
-              <a:rPr lang="en-US" dirty="0" err="1"/>
-              <a:t>BinGO</a:t>
-            </a:r>
-            <a:r>
-              <a:rPr lang="en-US" dirty="0"/>
-              <a:t> app</a:t>
-            </a:r>
-          </a:p>
-          <a:p>
-            <a:pPr lvl="1"/>
-            <a:r>
-              <a:rPr lang="en-US" dirty="0"/>
-              <a:t>Yielded function results</a:t>
-            </a:r>
-          </a:p>
-          <a:p>
-            <a:r>
-              <a:rPr lang="en-US" dirty="0"/>
-              <a:t>Clusters were extracted from </a:t>
-            </a:r>
-            <a:r>
-              <a:rPr lang="en-US" dirty="0" err="1"/>
-              <a:t>Cytoscape</a:t>
-            </a:r>
-            <a:r>
-              <a:rPr lang="en-US" dirty="0"/>
-              <a:t> and processed in </a:t>
-            </a:r>
-            <a:r>
-              <a:rPr lang="en-US" dirty="0" err="1"/>
-              <a:t>GeneOntology</a:t>
-            </a:r>
-            <a:endParaRPr lang="en-US" dirty="0"/>
-          </a:p>
-          <a:p>
-            <a:pPr lvl="1"/>
-            <a:r>
-              <a:rPr lang="en-US" dirty="0"/>
-              <a:t>Yielded function and disease connections</a:t>
-            </a:r>
-          </a:p>
-          <a:p>
-            <a:endParaRPr lang="en-US" dirty="0"/>
-          </a:p>
-        </p:txBody>
-      </p:sp>
-      <p:sp>
-        <p:nvSpPr>
-          <p:cNvPr id="5" name="Text Placeholder 4"/>
-          <p:cNvSpPr>
-            <a:spLocks noGrp="1"/>
-          </p:cNvSpPr>
-          <p:nvPr>
-            <p:ph type="body" sz="quarter" idx="3"/>
-          </p:nvPr>
-        </p:nvSpPr>
-        <p:spPr/>
-        <p:txBody>
-          <a:bodyPr/>
-          <a:lstStyle/>
-          <a:p>
-            <a:r>
-              <a:rPr lang="en-US" dirty="0"/>
-              <a:t>Pathway Analysis</a:t>
-            </a:r>
-          </a:p>
-        </p:txBody>
-      </p:sp>
-      <p:sp>
-        <p:nvSpPr>
-          <p:cNvPr id="6" name="Content Placeholder 5"/>
-          <p:cNvSpPr>
-            <a:spLocks noGrp="1"/>
-          </p:cNvSpPr>
-          <p:nvPr>
-            <p:ph sz="quarter" idx="4"/>
-          </p:nvPr>
-        </p:nvSpPr>
-        <p:spPr/>
-        <p:txBody>
-          <a:bodyPr/>
-          <a:lstStyle/>
-          <a:p>
-            <a:r>
-              <a:rPr lang="en-US" dirty="0"/>
-              <a:t>Clusters were processed in DAVID and Ingenuity to search for pathways</a:t>
-            </a:r>
-          </a:p>
-        </p:txBody>
-      </p:sp>
-      <p:grpSp>
-        <p:nvGrpSpPr>
-          <p:cNvPr id="7" name="Group 6"/>
-          <p:cNvGrpSpPr/>
-          <p:nvPr/>
-        </p:nvGrpSpPr>
-        <p:grpSpPr>
-          <a:xfrm>
-            <a:off x="10341032" y="613849"/>
-            <a:ext cx="1138843" cy="606368"/>
-            <a:chOff x="2601884" y="806332"/>
-            <a:chExt cx="6365150" cy="3389076"/>
-          </a:xfrm>
-        </p:grpSpPr>
-        <p:sp>
-          <p:nvSpPr>
-            <p:cNvPr id="8" name="Rounded Rectangle 7"/>
-            <p:cNvSpPr/>
-            <p:nvPr/>
-          </p:nvSpPr>
-          <p:spPr>
-            <a:xfrm>
-              <a:off x="2601884" y="806332"/>
-              <a:ext cx="1737359" cy="2086496"/>
-            </a:xfrm>
-            <a:prstGeom prst="roundRect">
-              <a:avLst/>
-            </a:prstGeom>
-            <a:solidFill>
-              <a:schemeClr val="bg1"/>
-            </a:solidFill>
-            <a:ln>
-              <a:solidFill>
-                <a:srgbClr val="A75F0A"/>
-              </a:solidFill>
-            </a:ln>
-          </p:spPr>
-          <p:style>
-            <a:lnRef idx="2">
-              <a:schemeClr val="accent1">
-                <a:shade val="50000"/>
-              </a:schemeClr>
-            </a:lnRef>
-            <a:fillRef idx="1">
-              <a:schemeClr val="accent1"/>
-            </a:fillRef>
-            <a:effectRef idx="0">
-              <a:schemeClr val="accent1"/>
-            </a:effectRef>
-            <a:fontRef idx="minor">
-              <a:schemeClr val="lt1"/>
-            </a:fontRef>
-          </p:style>
-          <p:txBody>
-            <a:bodyPr rtlCol="0" anchor="ctr"/>
-            <a:lstStyle/>
-            <a:p>
-              <a:pPr algn="ctr"/>
-              <a:endParaRPr lang="en-US" sz="1100" dirty="0">
-                <a:solidFill>
-                  <a:sysClr val="windowText" lastClr="000000"/>
-                </a:solidFill>
-              </a:endParaRPr>
-            </a:p>
-          </p:txBody>
-        </p:sp>
-        <p:sp>
-          <p:nvSpPr>
-            <p:cNvPr id="9" name="Rounded Rectangle 8"/>
-            <p:cNvSpPr/>
-            <p:nvPr/>
-          </p:nvSpPr>
-          <p:spPr>
-            <a:xfrm>
-              <a:off x="4915780" y="806332"/>
-              <a:ext cx="1737359" cy="2086496"/>
-            </a:xfrm>
-            <a:prstGeom prst="roundRect">
-              <a:avLst/>
-            </a:prstGeom>
-            <a:solidFill>
-              <a:schemeClr val="bg1"/>
-            </a:solidFill>
-          </p:spPr>
-          <p:style>
-            <a:lnRef idx="2">
-              <a:schemeClr val="accent1">
-                <a:shade val="50000"/>
-              </a:schemeClr>
-            </a:lnRef>
-            <a:fillRef idx="1">
-              <a:schemeClr val="accent1"/>
-            </a:fillRef>
-            <a:effectRef idx="0">
-              <a:schemeClr val="accent1"/>
-            </a:effectRef>
-            <a:fontRef idx="minor">
-              <a:schemeClr val="lt1"/>
-            </a:fontRef>
-          </p:style>
-          <p:txBody>
-            <a:bodyPr rtlCol="0" anchor="ctr"/>
-            <a:lstStyle/>
-            <a:p>
-              <a:pPr algn="ctr"/>
-              <a:endParaRPr lang="en-US" sz="1100" dirty="0">
-                <a:solidFill>
-                  <a:sysClr val="windowText" lastClr="000000"/>
-                </a:solidFill>
-              </a:endParaRPr>
-            </a:p>
-          </p:txBody>
-        </p:sp>
-        <p:sp>
-          <p:nvSpPr>
-            <p:cNvPr id="10" name="Rounded Rectangle 9"/>
-            <p:cNvSpPr/>
-            <p:nvPr/>
-          </p:nvSpPr>
-          <p:spPr>
-            <a:xfrm>
-              <a:off x="7229675" y="806332"/>
-              <a:ext cx="1737359" cy="2086496"/>
-            </a:xfrm>
-            <a:prstGeom prst="roundRect">
-              <a:avLst/>
-            </a:prstGeom>
-            <a:solidFill>
-              <a:srgbClr val="FF0000"/>
-            </a:solidFill>
-          </p:spPr>
-          <p:style>
-            <a:lnRef idx="2">
-              <a:schemeClr val="accent1">
-                <a:shade val="50000"/>
-              </a:schemeClr>
-            </a:lnRef>
-            <a:fillRef idx="1">
-              <a:schemeClr val="accent1"/>
-            </a:fillRef>
-            <a:effectRef idx="0">
-              <a:schemeClr val="accent1"/>
-            </a:effectRef>
-            <a:fontRef idx="minor">
-              <a:schemeClr val="lt1"/>
-            </a:fontRef>
-          </p:style>
-          <p:txBody>
-            <a:bodyPr rtlCol="0" anchor="ctr"/>
-            <a:lstStyle/>
-            <a:p>
-              <a:pPr algn="ctr"/>
-              <a:endParaRPr lang="en-US" sz="1100" dirty="0">
-                <a:solidFill>
-                  <a:sysClr val="windowText" lastClr="000000"/>
-                </a:solidFill>
-              </a:endParaRPr>
-            </a:p>
-          </p:txBody>
-        </p:sp>
-        <p:sp>
-          <p:nvSpPr>
-            <p:cNvPr id="11" name="Oval 10"/>
-            <p:cNvSpPr/>
-            <p:nvPr/>
-          </p:nvSpPr>
-          <p:spPr>
-            <a:xfrm>
-              <a:off x="6459427" y="3150547"/>
-              <a:ext cx="1044861" cy="1044861"/>
-            </a:xfrm>
-            <a:prstGeom prst="ellipse">
-              <a:avLst/>
-            </a:prstGeom>
-            <a:solidFill>
-              <a:srgbClr val="FF0000"/>
-            </a:solidFill>
-            <a:ln>
-              <a:solidFill>
-                <a:srgbClr val="A75F0A"/>
-              </a:solidFill>
-            </a:ln>
-          </p:spPr>
-          <p:style>
-            <a:lnRef idx="2">
-              <a:schemeClr val="accent1">
-                <a:shade val="50000"/>
-              </a:schemeClr>
-            </a:lnRef>
-            <a:fillRef idx="1">
-              <a:schemeClr val="accent1"/>
-            </a:fillRef>
-            <a:effectRef idx="0">
-              <a:schemeClr val="accent1"/>
-            </a:effectRef>
-            <a:fontRef idx="minor">
-              <a:schemeClr val="lt1"/>
-            </a:fontRef>
-          </p:style>
-          <p:txBody>
-            <a:bodyPr rtlCol="0" anchor="ctr"/>
-            <a:lstStyle/>
-            <a:p>
-              <a:pPr algn="ctr"/>
-              <a:endParaRPr lang="en-US" sz="1100" dirty="0">
-                <a:solidFill>
-                  <a:schemeClr val="tx1"/>
-                </a:solidFill>
-              </a:endParaRPr>
-            </a:p>
-          </p:txBody>
-        </p:sp>
-        <p:cxnSp>
-          <p:nvCxnSpPr>
-            <p:cNvPr id="12" name="Straight Arrow Connector 11"/>
-            <p:cNvCxnSpPr>
-              <a:stCxn id="8" idx="3"/>
-              <a:endCxn id="9" idx="1"/>
-            </p:cNvCxnSpPr>
-            <p:nvPr/>
-          </p:nvCxnSpPr>
-          <p:spPr>
-            <a:xfrm flipV="1">
-              <a:off x="4339244" y="1849580"/>
-              <a:ext cx="576535" cy="1"/>
-            </a:xfrm>
-            <a:prstGeom prst="straightConnector1">
-              <a:avLst/>
-            </a:prstGeom>
-            <a:ln>
-              <a:solidFill>
-                <a:srgbClr val="E48312"/>
-              </a:solidFill>
-              <a:tailEnd type="triangle"/>
-            </a:ln>
-          </p:spPr>
-          <p:style>
-            <a:lnRef idx="1">
-              <a:schemeClr val="accent1"/>
-            </a:lnRef>
-            <a:fillRef idx="0">
-              <a:schemeClr val="accent1"/>
-            </a:fillRef>
-            <a:effectRef idx="0">
-              <a:schemeClr val="accent1"/>
-            </a:effectRef>
-            <a:fontRef idx="minor">
-              <a:schemeClr val="tx1"/>
-            </a:fontRef>
-          </p:style>
-        </p:cxnSp>
-        <p:cxnSp>
-          <p:nvCxnSpPr>
-            <p:cNvPr id="13" name="Straight Arrow Connector 12"/>
-            <p:cNvCxnSpPr>
-              <a:stCxn id="9" idx="3"/>
-              <a:endCxn id="10" idx="1"/>
-            </p:cNvCxnSpPr>
-            <p:nvPr/>
-          </p:nvCxnSpPr>
-          <p:spPr>
-            <a:xfrm>
-              <a:off x="6653139" y="1849580"/>
-              <a:ext cx="576535" cy="0"/>
-            </a:xfrm>
-            <a:prstGeom prst="straightConnector1">
-              <a:avLst/>
-            </a:prstGeom>
-            <a:ln>
-              <a:tailEnd type="triangle"/>
-            </a:ln>
-          </p:spPr>
-          <p:style>
-            <a:lnRef idx="1">
-              <a:schemeClr val="accent1"/>
-            </a:lnRef>
-            <a:fillRef idx="0">
-              <a:schemeClr val="accent1"/>
-            </a:fillRef>
-            <a:effectRef idx="0">
-              <a:schemeClr val="accent1"/>
-            </a:effectRef>
-            <a:fontRef idx="minor">
-              <a:schemeClr val="tx1"/>
-            </a:fontRef>
-          </p:style>
-        </p:cxnSp>
-        <p:cxnSp>
-          <p:nvCxnSpPr>
-            <p:cNvPr id="14" name="Elbow Connector 13"/>
-            <p:cNvCxnSpPr>
-              <a:stCxn id="9" idx="2"/>
-              <a:endCxn id="11" idx="2"/>
-            </p:cNvCxnSpPr>
-            <p:nvPr/>
-          </p:nvCxnSpPr>
-          <p:spPr>
-            <a:xfrm rot="16200000" flipH="1">
-              <a:off x="5731867" y="2945418"/>
-              <a:ext cx="780151" cy="674967"/>
-            </a:xfrm>
-            <a:prstGeom prst="bentConnector2">
-              <a:avLst/>
-            </a:prstGeom>
-            <a:ln>
-              <a:solidFill>
-                <a:srgbClr val="E48312"/>
-              </a:solidFill>
-              <a:tailEnd type="triangle"/>
-            </a:ln>
-          </p:spPr>
-          <p:style>
-            <a:lnRef idx="1">
-              <a:schemeClr val="accent1"/>
-            </a:lnRef>
-            <a:fillRef idx="0">
-              <a:schemeClr val="accent1"/>
-            </a:fillRef>
-            <a:effectRef idx="0">
-              <a:schemeClr val="accent1"/>
-            </a:effectRef>
-            <a:fontRef idx="minor">
-              <a:schemeClr val="tx1"/>
-            </a:fontRef>
-          </p:style>
-        </p:cxnSp>
-      </p:grpSp>
-    </p:spTree>
-    <p:extLst>
-      <p:ext uri="{BB962C8B-B14F-4D97-AF65-F5344CB8AC3E}">
-        <p14:creationId xmlns:p14="http://schemas.microsoft.com/office/powerpoint/2010/main" val="2821775083"/>
-      </p:ext>
-    </p:extLst>
-  </p:cSld>
-  <p:clrMapOvr>
-    <a:masterClrMapping/>
-  </p:clrMapOvr>
-  <p:timing>
-    <p:tnLst>
-      <p:par>
-        <p:cTn id="1" dur="indefinite" restart="never" nodeType="tmRoot"/>
-      </p:par>
-    </p:tnLst>
-  </p:timing>
 </p:sld>
 </file>
 

</xml_diff>